<commit_message>
update Winery component overview and their descriptions in the documentation
Signed-off-by: Karoline Saatkamp <karoline.saatkamp@iaas.uni-stuttgart.de>
</commit_message>
<xml_diff>
--- a/docs/user/graphics/pptx/components.pptx
+++ b/docs/user/graphics/pptx/components.pptx
@@ -4,10 +4,13 @@
   <p:sldMasterIdLst>
     <p:sldMasterId id="2147483648" r:id="rId1"/>
   </p:sldMasterIdLst>
+  <p:notesMasterIdLst>
+    <p:notesMasterId r:id="rId3"/>
+  </p:notesMasterIdLst>
   <p:sldIdLst>
     <p:sldId id="256" r:id="rId2"/>
   </p:sldIdLst>
-  <p:sldSz cx="9144000" cy="6858000" type="screen4x3"/>
+  <p:sldSz cx="10475913" cy="7091363"/>
   <p:notesSz cx="6858000" cy="9144000"/>
   <p:defaultTextStyle>
     <a:defPPr>
@@ -107,12 +110,12 @@
   <p:extLst>
     <p:ext uri="{EFAFB233-063F-42B5-8137-9DF3F51BA10A}">
       <p15:sldGuideLst xmlns:p15="http://schemas.microsoft.com/office/powerpoint/2012/main">
-        <p15:guide id="1" orient="horz" pos="2160">
+        <p15:guide id="1" orient="horz" pos="2234" userDrawn="1">
           <p15:clr>
             <a:srgbClr val="A4A3A4"/>
           </p15:clr>
         </p15:guide>
-        <p15:guide id="2" pos="2880">
+        <p15:guide id="2" pos="3300" userDrawn="1">
           <p15:clr>
             <a:srgbClr val="A4A3A4"/>
           </p15:clr>
@@ -121,6 +124,457 @@
     </p:ext>
   </p:extLst>
 </p:presentation>
+</file>
+
+<file path=ppt/commentAuthors.xml><?xml version="1.0" encoding="utf-8"?>
+<p:cmAuthorLst xmlns:a="http://schemas.openxmlformats.org/drawingml/2006/main" xmlns:r="http://schemas.openxmlformats.org/officeDocument/2006/relationships" xmlns:p="http://schemas.openxmlformats.org/presentationml/2006/main">
+  <p:cmAuthor id="1" name="Karoline Saatkamp" initials="KS" lastIdx="1" clrIdx="0">
+    <p:extLst>
+      <p:ext uri="{19B8F6BF-5375-455C-9EA6-DF929625EA0E}">
+        <p15:presenceInfo xmlns:p15="http://schemas.microsoft.com/office/powerpoint/2012/main" userId="Karoline Saatkamp" providerId="None"/>
+      </p:ext>
+    </p:extLst>
+  </p:cmAuthor>
+</p:cmAuthorLst>
+</file>
+
+<file path=ppt/notesMasters/notesMaster1.xml><?xml version="1.0" encoding="utf-8"?>
+<p:notesMaster xmlns:a="http://schemas.openxmlformats.org/drawingml/2006/main" xmlns:r="http://schemas.openxmlformats.org/officeDocument/2006/relationships" xmlns:p="http://schemas.openxmlformats.org/presentationml/2006/main">
+  <p:cSld>
+    <p:bg>
+      <p:bgRef idx="1001">
+        <a:schemeClr val="bg1"/>
+      </p:bgRef>
+    </p:bg>
+    <p:spTree>
+      <p:nvGrpSpPr>
+        <p:cNvPr id="1" name=""/>
+        <p:cNvGrpSpPr/>
+        <p:nvPr/>
+      </p:nvGrpSpPr>
+      <p:grpSpPr>
+        <a:xfrm>
+          <a:off x="0" y="0"/>
+          <a:ext cx="0" cy="0"/>
+          <a:chOff x="0" y="0"/>
+          <a:chExt cx="0" cy="0"/>
+        </a:xfrm>
+      </p:grpSpPr>
+      <p:sp>
+        <p:nvSpPr>
+          <p:cNvPr id="2" name="Kopfzeilenplatzhalter 1"/>
+          <p:cNvSpPr>
+            <a:spLocks noGrp="1"/>
+          </p:cNvSpPr>
+          <p:nvPr>
+            <p:ph type="hdr" sz="quarter"/>
+          </p:nvPr>
+        </p:nvSpPr>
+        <p:spPr>
+          <a:xfrm>
+            <a:off x="0" y="0"/>
+            <a:ext cx="2971800" cy="458788"/>
+          </a:xfrm>
+          <a:prstGeom prst="rect">
+            <a:avLst/>
+          </a:prstGeom>
+        </p:spPr>
+        <p:txBody>
+          <a:bodyPr vert="horz" lIns="91440" tIns="45720" rIns="91440" bIns="45720" rtlCol="0"/>
+          <a:lstStyle>
+            <a:lvl1pPr algn="l">
+              <a:defRPr sz="1200"/>
+            </a:lvl1pPr>
+          </a:lstStyle>
+          <a:p>
+            <a:endParaRPr lang="de-DE"/>
+          </a:p>
+        </p:txBody>
+      </p:sp>
+      <p:sp>
+        <p:nvSpPr>
+          <p:cNvPr id="3" name="Datumsplatzhalter 2"/>
+          <p:cNvSpPr>
+            <a:spLocks noGrp="1"/>
+          </p:cNvSpPr>
+          <p:nvPr>
+            <p:ph type="dt" idx="1"/>
+          </p:nvPr>
+        </p:nvSpPr>
+        <p:spPr>
+          <a:xfrm>
+            <a:off x="3884613" y="0"/>
+            <a:ext cx="2971800" cy="458788"/>
+          </a:xfrm>
+          <a:prstGeom prst="rect">
+            <a:avLst/>
+          </a:prstGeom>
+        </p:spPr>
+        <p:txBody>
+          <a:bodyPr vert="horz" lIns="91440" tIns="45720" rIns="91440" bIns="45720" rtlCol="0"/>
+          <a:lstStyle>
+            <a:lvl1pPr algn="r">
+              <a:defRPr sz="1200"/>
+            </a:lvl1pPr>
+          </a:lstStyle>
+          <a:p>
+            <a:fld id="{4E77D8E0-C0BC-4A6F-93CA-871FC98A9542}" type="datetimeFigureOut">
+              <a:rPr lang="de-DE" smtClean="0"/>
+              <a:t>14.08.2018</a:t>
+            </a:fld>
+            <a:endParaRPr lang="de-DE"/>
+          </a:p>
+        </p:txBody>
+      </p:sp>
+      <p:sp>
+        <p:nvSpPr>
+          <p:cNvPr id="4" name="Folienbildplatzhalter 3"/>
+          <p:cNvSpPr>
+            <a:spLocks noGrp="1" noRot="1" noChangeAspect="1"/>
+          </p:cNvSpPr>
+          <p:nvPr>
+            <p:ph type="sldImg" idx="2"/>
+          </p:nvPr>
+        </p:nvSpPr>
+        <p:spPr>
+          <a:xfrm>
+            <a:off x="1150938" y="1143000"/>
+            <a:ext cx="4556125" cy="3086100"/>
+          </a:xfrm>
+          <a:prstGeom prst="rect">
+            <a:avLst/>
+          </a:prstGeom>
+          <a:noFill/>
+          <a:ln w="12700">
+            <a:solidFill>
+              <a:prstClr val="black"/>
+            </a:solidFill>
+          </a:ln>
+        </p:spPr>
+        <p:txBody>
+          <a:bodyPr vert="horz" lIns="91440" tIns="45720" rIns="91440" bIns="45720" rtlCol="0" anchor="ctr"/>
+          <a:lstStyle/>
+          <a:p>
+            <a:endParaRPr lang="de-DE"/>
+          </a:p>
+        </p:txBody>
+      </p:sp>
+      <p:sp>
+        <p:nvSpPr>
+          <p:cNvPr id="5" name="Notizenplatzhalter 4"/>
+          <p:cNvSpPr>
+            <a:spLocks noGrp="1"/>
+          </p:cNvSpPr>
+          <p:nvPr>
+            <p:ph type="body" sz="quarter" idx="3"/>
+          </p:nvPr>
+        </p:nvSpPr>
+        <p:spPr>
+          <a:xfrm>
+            <a:off x="685800" y="4400550"/>
+            <a:ext cx="5486400" cy="3600450"/>
+          </a:xfrm>
+          <a:prstGeom prst="rect">
+            <a:avLst/>
+          </a:prstGeom>
+        </p:spPr>
+        <p:txBody>
+          <a:bodyPr vert="horz" lIns="91440" tIns="45720" rIns="91440" bIns="45720" rtlCol="0"/>
+          <a:lstStyle/>
+          <a:p>
+            <a:pPr lvl="0"/>
+            <a:r>
+              <a:rPr lang="de-DE" smtClean="0"/>
+              <a:t>Formatvorlagen des Textmasters bearbeiten</a:t>
+            </a:r>
+          </a:p>
+          <a:p>
+            <a:pPr lvl="1"/>
+            <a:r>
+              <a:rPr lang="de-DE" smtClean="0"/>
+              <a:t>Zweite Ebene</a:t>
+            </a:r>
+          </a:p>
+          <a:p>
+            <a:pPr lvl="2"/>
+            <a:r>
+              <a:rPr lang="de-DE" smtClean="0"/>
+              <a:t>Dritte Ebene</a:t>
+            </a:r>
+          </a:p>
+          <a:p>
+            <a:pPr lvl="3"/>
+            <a:r>
+              <a:rPr lang="de-DE" smtClean="0"/>
+              <a:t>Vierte Ebene</a:t>
+            </a:r>
+          </a:p>
+          <a:p>
+            <a:pPr lvl="4"/>
+            <a:r>
+              <a:rPr lang="de-DE" smtClean="0"/>
+              <a:t>Fünfte Ebene</a:t>
+            </a:r>
+            <a:endParaRPr lang="de-DE"/>
+          </a:p>
+        </p:txBody>
+      </p:sp>
+      <p:sp>
+        <p:nvSpPr>
+          <p:cNvPr id="6" name="Fußzeilenplatzhalter 5"/>
+          <p:cNvSpPr>
+            <a:spLocks noGrp="1"/>
+          </p:cNvSpPr>
+          <p:nvPr>
+            <p:ph type="ftr" sz="quarter" idx="4"/>
+          </p:nvPr>
+        </p:nvSpPr>
+        <p:spPr>
+          <a:xfrm>
+            <a:off x="0" y="8685213"/>
+            <a:ext cx="2971800" cy="458787"/>
+          </a:xfrm>
+          <a:prstGeom prst="rect">
+            <a:avLst/>
+          </a:prstGeom>
+        </p:spPr>
+        <p:txBody>
+          <a:bodyPr vert="horz" lIns="91440" tIns="45720" rIns="91440" bIns="45720" rtlCol="0" anchor="b"/>
+          <a:lstStyle>
+            <a:lvl1pPr algn="l">
+              <a:defRPr sz="1200"/>
+            </a:lvl1pPr>
+          </a:lstStyle>
+          <a:p>
+            <a:endParaRPr lang="de-DE"/>
+          </a:p>
+        </p:txBody>
+      </p:sp>
+      <p:sp>
+        <p:nvSpPr>
+          <p:cNvPr id="7" name="Foliennummernplatzhalter 6"/>
+          <p:cNvSpPr>
+            <a:spLocks noGrp="1"/>
+          </p:cNvSpPr>
+          <p:nvPr>
+            <p:ph type="sldNum" sz="quarter" idx="5"/>
+          </p:nvPr>
+        </p:nvSpPr>
+        <p:spPr>
+          <a:xfrm>
+            <a:off x="3884613" y="8685213"/>
+            <a:ext cx="2971800" cy="458787"/>
+          </a:xfrm>
+          <a:prstGeom prst="rect">
+            <a:avLst/>
+          </a:prstGeom>
+        </p:spPr>
+        <p:txBody>
+          <a:bodyPr vert="horz" lIns="91440" tIns="45720" rIns="91440" bIns="45720" rtlCol="0" anchor="b"/>
+          <a:lstStyle>
+            <a:lvl1pPr algn="r">
+              <a:defRPr sz="1200"/>
+            </a:lvl1pPr>
+          </a:lstStyle>
+          <a:p>
+            <a:fld id="{CEC5B71D-80D6-4051-B7D2-850AE3DB8F5C}" type="slidenum">
+              <a:rPr lang="de-DE" smtClean="0"/>
+              <a:t>‹Nr.›</a:t>
+            </a:fld>
+            <a:endParaRPr lang="de-DE"/>
+          </a:p>
+        </p:txBody>
+      </p:sp>
+    </p:spTree>
+    <p:extLst>
+      <p:ext uri="{BB962C8B-B14F-4D97-AF65-F5344CB8AC3E}">
+        <p14:creationId xmlns:p14="http://schemas.microsoft.com/office/powerpoint/2010/main" val="1543317004"/>
+      </p:ext>
+    </p:extLst>
+  </p:cSld>
+  <p:clrMap bg1="lt1" tx1="dk1" bg2="lt2" tx2="dk2" accent1="accent1" accent2="accent2" accent3="accent3" accent4="accent4" accent5="accent5" accent6="accent6" hlink="hlink" folHlink="folHlink"/>
+  <p:notesStyle>
+    <a:lvl1pPr marL="0" algn="l" defTabSz="914400" rtl="0" eaLnBrk="1" latinLnBrk="0" hangingPunct="1">
+      <a:defRPr sz="1200" kern="1200">
+        <a:solidFill>
+          <a:schemeClr val="tx1"/>
+        </a:solidFill>
+        <a:latin typeface="+mn-lt"/>
+        <a:ea typeface="+mn-ea"/>
+        <a:cs typeface="+mn-cs"/>
+      </a:defRPr>
+    </a:lvl1pPr>
+    <a:lvl2pPr marL="457200" algn="l" defTabSz="914400" rtl="0" eaLnBrk="1" latinLnBrk="0" hangingPunct="1">
+      <a:defRPr sz="1200" kern="1200">
+        <a:solidFill>
+          <a:schemeClr val="tx1"/>
+        </a:solidFill>
+        <a:latin typeface="+mn-lt"/>
+        <a:ea typeface="+mn-ea"/>
+        <a:cs typeface="+mn-cs"/>
+      </a:defRPr>
+    </a:lvl2pPr>
+    <a:lvl3pPr marL="914400" algn="l" defTabSz="914400" rtl="0" eaLnBrk="1" latinLnBrk="0" hangingPunct="1">
+      <a:defRPr sz="1200" kern="1200">
+        <a:solidFill>
+          <a:schemeClr val="tx1"/>
+        </a:solidFill>
+        <a:latin typeface="+mn-lt"/>
+        <a:ea typeface="+mn-ea"/>
+        <a:cs typeface="+mn-cs"/>
+      </a:defRPr>
+    </a:lvl3pPr>
+    <a:lvl4pPr marL="1371600" algn="l" defTabSz="914400" rtl="0" eaLnBrk="1" latinLnBrk="0" hangingPunct="1">
+      <a:defRPr sz="1200" kern="1200">
+        <a:solidFill>
+          <a:schemeClr val="tx1"/>
+        </a:solidFill>
+        <a:latin typeface="+mn-lt"/>
+        <a:ea typeface="+mn-ea"/>
+        <a:cs typeface="+mn-cs"/>
+      </a:defRPr>
+    </a:lvl4pPr>
+    <a:lvl5pPr marL="1828800" algn="l" defTabSz="914400" rtl="0" eaLnBrk="1" latinLnBrk="0" hangingPunct="1">
+      <a:defRPr sz="1200" kern="1200">
+        <a:solidFill>
+          <a:schemeClr val="tx1"/>
+        </a:solidFill>
+        <a:latin typeface="+mn-lt"/>
+        <a:ea typeface="+mn-ea"/>
+        <a:cs typeface="+mn-cs"/>
+      </a:defRPr>
+    </a:lvl5pPr>
+    <a:lvl6pPr marL="2286000" algn="l" defTabSz="914400" rtl="0" eaLnBrk="1" latinLnBrk="0" hangingPunct="1">
+      <a:defRPr sz="1200" kern="1200">
+        <a:solidFill>
+          <a:schemeClr val="tx1"/>
+        </a:solidFill>
+        <a:latin typeface="+mn-lt"/>
+        <a:ea typeface="+mn-ea"/>
+        <a:cs typeface="+mn-cs"/>
+      </a:defRPr>
+    </a:lvl6pPr>
+    <a:lvl7pPr marL="2743200" algn="l" defTabSz="914400" rtl="0" eaLnBrk="1" latinLnBrk="0" hangingPunct="1">
+      <a:defRPr sz="1200" kern="1200">
+        <a:solidFill>
+          <a:schemeClr val="tx1"/>
+        </a:solidFill>
+        <a:latin typeface="+mn-lt"/>
+        <a:ea typeface="+mn-ea"/>
+        <a:cs typeface="+mn-cs"/>
+      </a:defRPr>
+    </a:lvl7pPr>
+    <a:lvl8pPr marL="3200400" algn="l" defTabSz="914400" rtl="0" eaLnBrk="1" latinLnBrk="0" hangingPunct="1">
+      <a:defRPr sz="1200" kern="1200">
+        <a:solidFill>
+          <a:schemeClr val="tx1"/>
+        </a:solidFill>
+        <a:latin typeface="+mn-lt"/>
+        <a:ea typeface="+mn-ea"/>
+        <a:cs typeface="+mn-cs"/>
+      </a:defRPr>
+    </a:lvl8pPr>
+    <a:lvl9pPr marL="3657600" algn="l" defTabSz="914400" rtl="0" eaLnBrk="1" latinLnBrk="0" hangingPunct="1">
+      <a:defRPr sz="1200" kern="1200">
+        <a:solidFill>
+          <a:schemeClr val="tx1"/>
+        </a:solidFill>
+        <a:latin typeface="+mn-lt"/>
+        <a:ea typeface="+mn-ea"/>
+        <a:cs typeface="+mn-cs"/>
+      </a:defRPr>
+    </a:lvl9pPr>
+  </p:notesStyle>
+</p:notesMaster>
+</file>
+
+<file path=ppt/notesSlides/notesSlide1.xml><?xml version="1.0" encoding="utf-8"?>
+<p:notes xmlns:a="http://schemas.openxmlformats.org/drawingml/2006/main" xmlns:r="http://schemas.openxmlformats.org/officeDocument/2006/relationships" xmlns:p="http://schemas.openxmlformats.org/presentationml/2006/main">
+  <p:cSld>
+    <p:spTree>
+      <p:nvGrpSpPr>
+        <p:cNvPr id="1" name=""/>
+        <p:cNvGrpSpPr/>
+        <p:nvPr/>
+      </p:nvGrpSpPr>
+      <p:grpSpPr>
+        <a:xfrm>
+          <a:off x="0" y="0"/>
+          <a:ext cx="0" cy="0"/>
+          <a:chOff x="0" y="0"/>
+          <a:chExt cx="0" cy="0"/>
+        </a:xfrm>
+      </p:grpSpPr>
+      <p:sp>
+        <p:nvSpPr>
+          <p:cNvPr id="2" name="Folienbildplatzhalter 1"/>
+          <p:cNvSpPr>
+            <a:spLocks noGrp="1" noRot="1" noChangeAspect="1"/>
+          </p:cNvSpPr>
+          <p:nvPr>
+            <p:ph type="sldImg"/>
+          </p:nvPr>
+        </p:nvSpPr>
+        <p:spPr>
+          <a:xfrm>
+            <a:off x="1150938" y="1143000"/>
+            <a:ext cx="4556125" cy="3086100"/>
+          </a:xfrm>
+        </p:spPr>
+      </p:sp>
+      <p:sp>
+        <p:nvSpPr>
+          <p:cNvPr id="3" name="Notizenplatzhalter 2"/>
+          <p:cNvSpPr>
+            <a:spLocks noGrp="1"/>
+          </p:cNvSpPr>
+          <p:nvPr>
+            <p:ph type="body" idx="1"/>
+          </p:nvPr>
+        </p:nvSpPr>
+        <p:spPr/>
+        <p:txBody>
+          <a:bodyPr/>
+          <a:lstStyle/>
+          <a:p>
+            <a:endParaRPr lang="de-DE" dirty="0"/>
+          </a:p>
+        </p:txBody>
+      </p:sp>
+      <p:sp>
+        <p:nvSpPr>
+          <p:cNvPr id="4" name="Foliennummernplatzhalter 3"/>
+          <p:cNvSpPr>
+            <a:spLocks noGrp="1"/>
+          </p:cNvSpPr>
+          <p:nvPr>
+            <p:ph type="sldNum" sz="quarter" idx="10"/>
+          </p:nvPr>
+        </p:nvSpPr>
+        <p:spPr/>
+        <p:txBody>
+          <a:bodyPr/>
+          <a:lstStyle/>
+          <a:p>
+            <a:fld id="{CEC5B71D-80D6-4051-B7D2-850AE3DB8F5C}" type="slidenum">
+              <a:rPr lang="de-DE" smtClean="0"/>
+              <a:t>1</a:t>
+            </a:fld>
+            <a:endParaRPr lang="de-DE"/>
+          </a:p>
+        </p:txBody>
+      </p:sp>
+    </p:spTree>
+    <p:extLst>
+      <p:ext uri="{BB962C8B-B14F-4D97-AF65-F5344CB8AC3E}">
+        <p14:creationId xmlns:p14="http://schemas.microsoft.com/office/powerpoint/2010/main" val="531137550"/>
+      </p:ext>
+    </p:extLst>
+  </p:cSld>
+  <p:clrMapOvr>
+    <a:masterClrMapping/>
+  </p:clrMapOvr>
+</p:notes>
 </file>
 
 <file path=ppt/slideLayouts/slideLayout1.xml><?xml version="1.0" encoding="utf-8"?>
@@ -152,8 +606,8 @@
         </p:nvSpPr>
         <p:spPr>
           <a:xfrm>
-            <a:off x="685800" y="2130425"/>
-            <a:ext cx="7772400" cy="1470025"/>
+            <a:off x="785694" y="2202920"/>
+            <a:ext cx="8904526" cy="1520047"/>
           </a:xfrm>
         </p:spPr>
         <p:txBody>
@@ -180,8 +634,8 @@
         </p:nvSpPr>
         <p:spPr>
           <a:xfrm>
-            <a:off x="1371600" y="3886200"/>
-            <a:ext cx="6400800" cy="1752600"/>
+            <a:off x="1571387" y="4018440"/>
+            <a:ext cx="7333139" cy="1812237"/>
           </a:xfrm>
         </p:spPr>
         <p:txBody>
@@ -304,7 +758,7 @@
           <a:p>
             <a:fld id="{09AC0643-DE81-41EA-8FE0-662F1E2075D0}" type="datetimeFigureOut">
               <a:rPr lang="en-US" smtClean="0"/>
-              <a:t>4/25/2018</a:t>
+              <a:t>8/14/2018</a:t>
             </a:fld>
             <a:endParaRPr lang="en-US"/>
           </a:p>
@@ -474,7 +928,7 @@
           <a:p>
             <a:fld id="{09AC0643-DE81-41EA-8FE0-662F1E2075D0}" type="datetimeFigureOut">
               <a:rPr lang="en-US" smtClean="0"/>
-              <a:t>4/25/2018</a:t>
+              <a:t>8/14/2018</a:t>
             </a:fld>
             <a:endParaRPr lang="en-US"/>
           </a:p>
@@ -564,8 +1018,8 @@
         </p:nvSpPr>
         <p:spPr>
           <a:xfrm>
-            <a:off x="6629400" y="274638"/>
-            <a:ext cx="2057400" cy="5851525"/>
+            <a:off x="7595037" y="283984"/>
+            <a:ext cx="2357080" cy="6050640"/>
           </a:xfrm>
         </p:spPr>
         <p:txBody>
@@ -592,8 +1046,8 @@
         </p:nvSpPr>
         <p:spPr>
           <a:xfrm>
-            <a:off x="457200" y="274638"/>
-            <a:ext cx="6019800" cy="5851525"/>
+            <a:off x="523796" y="283984"/>
+            <a:ext cx="6896643" cy="6050640"/>
           </a:xfrm>
         </p:spPr>
         <p:txBody>
@@ -654,7 +1108,7 @@
           <a:p>
             <a:fld id="{09AC0643-DE81-41EA-8FE0-662F1E2075D0}" type="datetimeFigureOut">
               <a:rPr lang="en-US" smtClean="0"/>
-              <a:t>4/25/2018</a:t>
+              <a:t>8/14/2018</a:t>
             </a:fld>
             <a:endParaRPr lang="en-US"/>
           </a:p>
@@ -824,7 +1278,7 @@
           <a:p>
             <a:fld id="{09AC0643-DE81-41EA-8FE0-662F1E2075D0}" type="datetimeFigureOut">
               <a:rPr lang="en-US" smtClean="0"/>
-              <a:t>4/25/2018</a:t>
+              <a:t>8/14/2018</a:t>
             </a:fld>
             <a:endParaRPr lang="en-US"/>
           </a:p>
@@ -914,8 +1368,8 @@
         </p:nvSpPr>
         <p:spPr>
           <a:xfrm>
-            <a:off x="722313" y="4406900"/>
-            <a:ext cx="7772400" cy="1362075"/>
+            <a:off x="827525" y="4556859"/>
+            <a:ext cx="8904526" cy="1408423"/>
           </a:xfrm>
         </p:spPr>
         <p:txBody>
@@ -946,8 +1400,8 @@
         </p:nvSpPr>
         <p:spPr>
           <a:xfrm>
-            <a:off x="722313" y="2906713"/>
-            <a:ext cx="7772400" cy="1500187"/>
+            <a:off x="827525" y="3005623"/>
+            <a:ext cx="8904526" cy="1551235"/>
           </a:xfrm>
         </p:spPr>
         <p:txBody>
@@ -1070,7 +1524,7 @@
           <a:p>
             <a:fld id="{09AC0643-DE81-41EA-8FE0-662F1E2075D0}" type="datetimeFigureOut">
               <a:rPr lang="en-US" smtClean="0"/>
-              <a:t>4/25/2018</a:t>
+              <a:t>8/14/2018</a:t>
             </a:fld>
             <a:endParaRPr lang="en-US"/>
           </a:p>
@@ -1183,8 +1637,8 @@
         </p:nvSpPr>
         <p:spPr>
           <a:xfrm>
-            <a:off x="457200" y="1600200"/>
-            <a:ext cx="4038600" cy="4525963"/>
+            <a:off x="523795" y="1654652"/>
+            <a:ext cx="4626862" cy="4679972"/>
           </a:xfrm>
         </p:spPr>
         <p:txBody>
@@ -1268,8 +1722,8 @@
         </p:nvSpPr>
         <p:spPr>
           <a:xfrm>
-            <a:off x="4648200" y="1600200"/>
-            <a:ext cx="4038600" cy="4525963"/>
+            <a:off x="5325256" y="1654652"/>
+            <a:ext cx="4626862" cy="4679972"/>
           </a:xfrm>
         </p:spPr>
         <p:txBody>
@@ -1358,7 +1812,7 @@
           <a:p>
             <a:fld id="{09AC0643-DE81-41EA-8FE0-662F1E2075D0}" type="datetimeFigureOut">
               <a:rPr lang="en-US" smtClean="0"/>
-              <a:t>4/25/2018</a:t>
+              <a:t>8/14/2018</a:t>
             </a:fld>
             <a:endParaRPr lang="en-US"/>
           </a:p>
@@ -1475,8 +1929,8 @@
         </p:nvSpPr>
         <p:spPr>
           <a:xfrm>
-            <a:off x="457200" y="1535113"/>
-            <a:ext cx="4040188" cy="639762"/>
+            <a:off x="523796" y="1587349"/>
+            <a:ext cx="4628681" cy="661532"/>
           </a:xfrm>
         </p:spPr>
         <p:txBody>
@@ -1540,8 +1994,8 @@
         </p:nvSpPr>
         <p:spPr>
           <a:xfrm>
-            <a:off x="457200" y="2174875"/>
-            <a:ext cx="4040188" cy="3951288"/>
+            <a:off x="523796" y="2248881"/>
+            <a:ext cx="4628681" cy="4085742"/>
           </a:xfrm>
         </p:spPr>
         <p:txBody>
@@ -1625,8 +2079,8 @@
         </p:nvSpPr>
         <p:spPr>
           <a:xfrm>
-            <a:off x="4645025" y="1535113"/>
-            <a:ext cx="4041775" cy="639762"/>
+            <a:off x="5321620" y="1587349"/>
+            <a:ext cx="4630499" cy="661532"/>
           </a:xfrm>
         </p:spPr>
         <p:txBody>
@@ -1690,8 +2144,8 @@
         </p:nvSpPr>
         <p:spPr>
           <a:xfrm>
-            <a:off x="4645025" y="2174875"/>
-            <a:ext cx="4041775" cy="3951288"/>
+            <a:off x="5321620" y="2248881"/>
+            <a:ext cx="4630499" cy="4085742"/>
           </a:xfrm>
         </p:spPr>
         <p:txBody>
@@ -1780,7 +2234,7 @@
           <a:p>
             <a:fld id="{09AC0643-DE81-41EA-8FE0-662F1E2075D0}" type="datetimeFigureOut">
               <a:rPr lang="en-US" smtClean="0"/>
-              <a:t>4/25/2018</a:t>
+              <a:t>8/14/2018</a:t>
             </a:fld>
             <a:endParaRPr lang="en-US"/>
           </a:p>
@@ -1898,7 +2352,7 @@
           <a:p>
             <a:fld id="{09AC0643-DE81-41EA-8FE0-662F1E2075D0}" type="datetimeFigureOut">
               <a:rPr lang="en-US" smtClean="0"/>
-              <a:t>4/25/2018</a:t>
+              <a:t>8/14/2018</a:t>
             </a:fld>
             <a:endParaRPr lang="en-US"/>
           </a:p>
@@ -1993,7 +2447,7 @@
           <a:p>
             <a:fld id="{09AC0643-DE81-41EA-8FE0-662F1E2075D0}" type="datetimeFigureOut">
               <a:rPr lang="en-US" smtClean="0"/>
-              <a:t>4/25/2018</a:t>
+              <a:t>8/14/2018</a:t>
             </a:fld>
             <a:endParaRPr lang="en-US"/>
           </a:p>
@@ -2083,8 +2537,8 @@
         </p:nvSpPr>
         <p:spPr>
           <a:xfrm>
-            <a:off x="457200" y="273050"/>
-            <a:ext cx="3008313" cy="1162050"/>
+            <a:off x="523797" y="282341"/>
+            <a:ext cx="3446503" cy="1201592"/>
           </a:xfrm>
         </p:spPr>
         <p:txBody>
@@ -2115,8 +2569,8 @@
         </p:nvSpPr>
         <p:spPr>
           <a:xfrm>
-            <a:off x="3575050" y="273050"/>
-            <a:ext cx="5111750" cy="5853113"/>
+            <a:off x="4095791" y="282342"/>
+            <a:ext cx="5856326" cy="6052282"/>
           </a:xfrm>
         </p:spPr>
         <p:txBody>
@@ -2200,8 +2654,8 @@
         </p:nvSpPr>
         <p:spPr>
           <a:xfrm>
-            <a:off x="457200" y="1435100"/>
-            <a:ext cx="3008313" cy="4691063"/>
+            <a:off x="523797" y="1483934"/>
+            <a:ext cx="3446503" cy="4850690"/>
           </a:xfrm>
         </p:spPr>
         <p:txBody>
@@ -2270,7 +2724,7 @@
           <a:p>
             <a:fld id="{09AC0643-DE81-41EA-8FE0-662F1E2075D0}" type="datetimeFigureOut">
               <a:rPr lang="en-US" smtClean="0"/>
-              <a:t>4/25/2018</a:t>
+              <a:t>8/14/2018</a:t>
             </a:fld>
             <a:endParaRPr lang="en-US"/>
           </a:p>
@@ -2360,8 +2814,8 @@
         </p:nvSpPr>
         <p:spPr>
           <a:xfrm>
-            <a:off x="1792288" y="4800600"/>
-            <a:ext cx="5486400" cy="566738"/>
+            <a:off x="2053352" y="4963955"/>
+            <a:ext cx="6285548" cy="586023"/>
           </a:xfrm>
         </p:spPr>
         <p:txBody>
@@ -2392,8 +2846,8 @@
         </p:nvSpPr>
         <p:spPr>
           <a:xfrm>
-            <a:off x="1792288" y="612775"/>
-            <a:ext cx="5486400" cy="4114800"/>
+            <a:off x="2053352" y="633626"/>
+            <a:ext cx="6285548" cy="4254818"/>
           </a:xfrm>
         </p:spPr>
         <p:txBody>
@@ -2453,8 +2907,8 @@
         </p:nvSpPr>
         <p:spPr>
           <a:xfrm>
-            <a:off x="1792288" y="5367338"/>
-            <a:ext cx="5486400" cy="804862"/>
+            <a:off x="2053352" y="5549977"/>
+            <a:ext cx="6285548" cy="832250"/>
           </a:xfrm>
         </p:spPr>
         <p:txBody>
@@ -2523,7 +2977,7 @@
           <a:p>
             <a:fld id="{09AC0643-DE81-41EA-8FE0-662F1E2075D0}" type="datetimeFigureOut">
               <a:rPr lang="en-US" smtClean="0"/>
-              <a:t>4/25/2018</a:t>
+              <a:t>8/14/2018</a:t>
             </a:fld>
             <a:endParaRPr lang="en-US"/>
           </a:p>
@@ -2618,8 +3072,8 @@
         </p:nvSpPr>
         <p:spPr>
           <a:xfrm>
-            <a:off x="457200" y="274638"/>
-            <a:ext cx="8229600" cy="1143000"/>
+            <a:off x="523796" y="283983"/>
+            <a:ext cx="9428322" cy="1181894"/>
           </a:xfrm>
           <a:prstGeom prst="rect">
             <a:avLst/>
@@ -2651,8 +3105,8 @@
         </p:nvSpPr>
         <p:spPr>
           <a:xfrm>
-            <a:off x="457200" y="1600200"/>
-            <a:ext cx="8229600" cy="4525963"/>
+            <a:off x="523796" y="1654652"/>
+            <a:ext cx="9428322" cy="4679972"/>
           </a:xfrm>
           <a:prstGeom prst="rect">
             <a:avLst/>
@@ -2713,8 +3167,8 @@
         </p:nvSpPr>
         <p:spPr>
           <a:xfrm>
-            <a:off x="457200" y="6356350"/>
-            <a:ext cx="2133600" cy="365125"/>
+            <a:off x="523796" y="6572645"/>
+            <a:ext cx="2444380" cy="377549"/>
           </a:xfrm>
           <a:prstGeom prst="rect">
             <a:avLst/>
@@ -2736,7 +3190,7 @@
           <a:p>
             <a:fld id="{09AC0643-DE81-41EA-8FE0-662F1E2075D0}" type="datetimeFigureOut">
               <a:rPr lang="en-US" smtClean="0"/>
-              <a:t>4/25/2018</a:t>
+              <a:t>8/14/2018</a:t>
             </a:fld>
             <a:endParaRPr lang="en-US"/>
           </a:p>
@@ -2754,8 +3208,8 @@
         </p:nvSpPr>
         <p:spPr>
           <a:xfrm>
-            <a:off x="3124200" y="6356350"/>
-            <a:ext cx="2895600" cy="365125"/>
+            <a:off x="3579271" y="6572645"/>
+            <a:ext cx="3317372" cy="377549"/>
           </a:xfrm>
           <a:prstGeom prst="rect">
             <a:avLst/>
@@ -2791,8 +3245,8 @@
         </p:nvSpPr>
         <p:spPr>
           <a:xfrm>
-            <a:off x="6553200" y="6356350"/>
-            <a:ext cx="2133600" cy="365125"/>
+            <a:off x="7507738" y="6572645"/>
+            <a:ext cx="2444380" cy="377549"/>
           </a:xfrm>
           <a:prstGeom prst="rect">
             <a:avLst/>
@@ -3113,14 +3567,14 @@
       </p:grpSpPr>
       <p:sp>
         <p:nvSpPr>
-          <p:cNvPr id="14" name="Abgerundetes Rechteck 13"/>
+          <p:cNvPr id="30" name="Abgerundetes Rechteck 29"/>
           <p:cNvSpPr/>
           <p:nvPr/>
         </p:nvSpPr>
         <p:spPr>
           <a:xfrm>
-            <a:off x="34356" y="1806724"/>
-            <a:ext cx="9064624" cy="574264"/>
+            <a:off x="18453" y="1502128"/>
+            <a:ext cx="10441557" cy="574264"/>
           </a:xfrm>
           <a:prstGeom prst="roundRect">
             <a:avLst/>
@@ -3167,14 +3621,14 @@
           <a:p>
             <a:pPr algn="ctr"/>
             <a:r>
-              <a:rPr lang="de-DE" sz="1400" b="1" smtClean="0">
+              <a:rPr lang="en-US" sz="1400" b="1" dirty="0" smtClean="0">
                 <a:solidFill>
                   <a:schemeClr val="bg1"/>
                 </a:solidFill>
               </a:rPr>
               <a:t>HTTP REST API</a:t>
             </a:r>
-            <a:endParaRPr lang="en-US" sz="1400" b="1">
+            <a:endParaRPr lang="en-US" sz="1400" b="1" dirty="0">
               <a:solidFill>
                 <a:schemeClr val="bg1"/>
               </a:solidFill>
@@ -3184,14 +3638,14 @@
       </p:sp>
       <p:sp>
         <p:nvSpPr>
-          <p:cNvPr id="13" name="Abgerundetes Rechteck 12"/>
+          <p:cNvPr id="31" name="Abgerundetes Rechteck 30"/>
           <p:cNvSpPr/>
           <p:nvPr/>
         </p:nvSpPr>
         <p:spPr>
           <a:xfrm>
-            <a:off x="34356" y="2176277"/>
-            <a:ext cx="9064624" cy="4421075"/>
+            <a:off x="18453" y="1871681"/>
+            <a:ext cx="10441557" cy="5187878"/>
           </a:xfrm>
           <a:prstGeom prst="roundRect">
             <a:avLst>
@@ -3235,7 +3689,7 @@
           <a:p>
             <a:pPr algn="ctr"/>
             <a:r>
-              <a:rPr lang="de-DE" sz="1400" b="1" smtClean="0">
+              <a:rPr lang="en-US" sz="1400" b="1" dirty="0" smtClean="0">
                 <a:solidFill>
                   <a:schemeClr val="tx1">
                     <a:lumMod val="75000"/>
@@ -3245,7 +3699,7 @@
               </a:rPr>
               <a:t>Winery Backend System Components</a:t>
             </a:r>
-            <a:endParaRPr lang="en-US" sz="1400" b="1">
+            <a:endParaRPr lang="en-US" sz="1400" b="1" dirty="0">
               <a:solidFill>
                 <a:schemeClr val="tx1">
                   <a:lumMod val="75000"/>
@@ -3258,14 +3712,14 @@
       </p:sp>
       <p:sp>
         <p:nvSpPr>
-          <p:cNvPr id="12" name="Abgerundetes Rechteck 11"/>
+          <p:cNvPr id="43" name="Abgerundetes Rechteck 42"/>
           <p:cNvSpPr/>
           <p:nvPr/>
         </p:nvSpPr>
         <p:spPr>
           <a:xfrm>
-            <a:off x="25971" y="44624"/>
-            <a:ext cx="9073008" cy="1512168"/>
+            <a:off x="10068" y="12820"/>
+            <a:ext cx="10451215" cy="1406492"/>
           </a:xfrm>
           <a:prstGeom prst="roundRect">
             <a:avLst>
@@ -3309,7 +3763,7 @@
           <a:p>
             <a:pPr algn="ctr"/>
             <a:r>
-              <a:rPr lang="de-DE" sz="1400" b="1" smtClean="0">
+              <a:rPr lang="en-US" sz="1400" b="1" dirty="0" smtClean="0">
                 <a:solidFill>
                   <a:schemeClr val="tx1">
                     <a:lumMod val="75000"/>
@@ -3319,7 +3773,7 @@
               </a:rPr>
               <a:t>Winery UI Components</a:t>
             </a:r>
-            <a:endParaRPr lang="en-US" sz="1400" b="1">
+            <a:endParaRPr lang="en-US" sz="1400" b="1" dirty="0">
               <a:solidFill>
                 <a:schemeClr val="tx1">
                   <a:lumMod val="75000"/>
@@ -3332,13 +3786,13 @@
       </p:sp>
       <p:sp>
         <p:nvSpPr>
-          <p:cNvPr id="21" name="Zylinder 20"/>
+          <p:cNvPr id="48" name="Zylinder 47"/>
           <p:cNvSpPr/>
           <p:nvPr/>
         </p:nvSpPr>
         <p:spPr>
           <a:xfrm>
-            <a:off x="197990" y="5157192"/>
+            <a:off x="117438" y="5712038"/>
             <a:ext cx="1641960" cy="864096"/>
           </a:xfrm>
           <a:prstGeom prst="can">
@@ -3372,22 +3826,22 @@
           <a:p>
             <a:pPr algn="ctr"/>
             <a:r>
-              <a:rPr lang="de-DE" sz="1400" smtClean="0"/>
-              <a:t>Templates, Types, Plans &amp; CSARs Database</a:t>
-            </a:r>
-            <a:endParaRPr lang="en-US" sz="1400"/>
-          </a:p>
-        </p:txBody>
-      </p:sp>
-      <p:sp>
-        <p:nvSpPr>
-          <p:cNvPr id="25" name="Abgerundetes Rechteck 24"/>
+              <a:rPr lang="en-US" sz="1400" dirty="0" smtClean="0"/>
+              <a:t>Templates, Types, Plans &amp; CSARs Repository</a:t>
+            </a:r>
+            <a:endParaRPr lang="en-US" sz="1400" dirty="0"/>
+          </a:p>
+        </p:txBody>
+      </p:sp>
+      <p:sp>
+        <p:nvSpPr>
+          <p:cNvPr id="51" name="Abgerundetes Rechteck 50"/>
           <p:cNvSpPr/>
           <p:nvPr/>
         </p:nvSpPr>
         <p:spPr>
           <a:xfrm>
-            <a:off x="1968225" y="2400937"/>
+            <a:off x="5258235" y="2017611"/>
             <a:ext cx="1641960" cy="805180"/>
           </a:xfrm>
           <a:prstGeom prst="roundRect">
@@ -3421,22 +3875,22 @@
           <a:p>
             <a:pPr algn="ctr"/>
             <a:r>
-              <a:rPr lang="de-DE" sz="1400" smtClean="0"/>
-              <a:t>TOSCA YAML Model Importer</a:t>
-            </a:r>
-            <a:endParaRPr lang="en-US" sz="1400"/>
-          </a:p>
-        </p:txBody>
-      </p:sp>
-      <p:sp>
-        <p:nvSpPr>
-          <p:cNvPr id="16" name="Abgerundetes Rechteck 15"/>
+              <a:rPr lang="en-US" sz="1400" dirty="0" smtClean="0"/>
+              <a:t>TOSCA YAML Model Importer &amp; Exporter</a:t>
+            </a:r>
+            <a:endParaRPr lang="en-US" sz="1400" dirty="0"/>
+          </a:p>
+        </p:txBody>
+      </p:sp>
+      <p:sp>
+        <p:nvSpPr>
+          <p:cNvPr id="52" name="Abgerundetes Rechteck 51"/>
           <p:cNvSpPr/>
           <p:nvPr/>
         </p:nvSpPr>
         <p:spPr>
           <a:xfrm>
-            <a:off x="197989" y="2400937"/>
+            <a:off x="117437" y="2017611"/>
             <a:ext cx="1641960" cy="805180"/>
           </a:xfrm>
           <a:prstGeom prst="roundRect">
@@ -3470,85 +3924,22 @@
           <a:p>
             <a:pPr algn="ctr"/>
             <a:r>
-              <a:rPr lang="de-DE" sz="1400" smtClean="0"/>
-              <a:t>TOSCA Topology Model Importer</a:t>
-            </a:r>
-            <a:endParaRPr lang="en-US" sz="1400"/>
-          </a:p>
-        </p:txBody>
-      </p:sp>
-      <p:sp>
-        <p:nvSpPr>
-          <p:cNvPr id="11" name="Abgerundetes Rechteck 10"/>
+              <a:rPr lang="en-US" sz="1400" dirty="0" smtClean="0"/>
+              <a:t>TOSCA XML Model Importer &amp; Exporter</a:t>
+            </a:r>
+            <a:endParaRPr lang="en-US" sz="1400" dirty="0"/>
+          </a:p>
+        </p:txBody>
+      </p:sp>
+      <p:sp>
+        <p:nvSpPr>
+          <p:cNvPr id="53" name="Abgerundetes Rechteck 52"/>
           <p:cNvSpPr/>
           <p:nvPr/>
         </p:nvSpPr>
         <p:spPr>
           <a:xfrm>
-            <a:off x="3743424" y="2400937"/>
-            <a:ext cx="1641961" cy="805180"/>
-          </a:xfrm>
-          <a:prstGeom prst="roundRect">
-            <a:avLst/>
-          </a:prstGeom>
-          <a:solidFill>
-            <a:schemeClr val="tx1">
-              <a:lumMod val="75000"/>
-              <a:lumOff val="25000"/>
-            </a:schemeClr>
-          </a:solidFill>
-          <a:ln w="19050"/>
-        </p:spPr>
-        <p:style>
-          <a:lnRef idx="3">
-            <a:schemeClr val="lt1"/>
-          </a:lnRef>
-          <a:fillRef idx="1">
-            <a:schemeClr val="accent4"/>
-          </a:fillRef>
-          <a:effectRef idx="1">
-            <a:schemeClr val="accent4"/>
-          </a:effectRef>
-          <a:fontRef idx="minor">
-            <a:schemeClr val="lt1"/>
-          </a:fontRef>
-        </p:style>
-        <p:txBody>
-          <a:bodyPr wrap="none" rtlCol="0" anchor="ctr"/>
-          <a:lstStyle/>
-          <a:p>
-            <a:pPr algn="ctr"/>
-            <a:r>
-              <a:rPr lang="de-DE" sz="1400" smtClean="0"/>
-              <a:t>Smart Service</a:t>
-            </a:r>
-          </a:p>
-          <a:p>
-            <a:pPr algn="ctr"/>
-            <a:r>
-              <a:rPr lang="de-DE" sz="1400" smtClean="0"/>
-              <a:t>Composition</a:t>
-            </a:r>
-          </a:p>
-          <a:p>
-            <a:pPr algn="ctr"/>
-            <a:r>
-              <a:rPr lang="de-DE" sz="1400" smtClean="0"/>
-              <a:t>Model Importer</a:t>
-            </a:r>
-            <a:endParaRPr lang="en-US" sz="1400"/>
-          </a:p>
-        </p:txBody>
-      </p:sp>
-      <p:sp>
-        <p:nvSpPr>
-          <p:cNvPr id="15" name="Abgerundetes Rechteck 14"/>
-          <p:cNvSpPr/>
-          <p:nvPr/>
-        </p:nvSpPr>
-        <p:spPr>
-          <a:xfrm>
-            <a:off x="5518620" y="2400937"/>
+            <a:off x="6971832" y="2017611"/>
             <a:ext cx="1641960" cy="805180"/>
           </a:xfrm>
           <a:prstGeom prst="roundRect">
@@ -3582,29 +3973,29 @@
           <a:p>
             <a:pPr algn="ctr"/>
             <a:r>
-              <a:rPr lang="de-DE" sz="1400" smtClean="0"/>
+              <a:rPr lang="en-US" sz="1400" dirty="0" smtClean="0"/>
               <a:t>BPMN4TOSCA</a:t>
             </a:r>
           </a:p>
           <a:p>
             <a:pPr algn="ctr"/>
             <a:r>
-              <a:rPr lang="de-DE" sz="1400" smtClean="0"/>
+              <a:rPr lang="en-US" sz="1400" dirty="0" smtClean="0"/>
               <a:t>Management Plan Importer</a:t>
             </a:r>
-            <a:endParaRPr lang="en-US" sz="1400"/>
-          </a:p>
-        </p:txBody>
-      </p:sp>
-      <p:sp>
-        <p:nvSpPr>
-          <p:cNvPr id="31" name="Abgerundetes Rechteck 30"/>
+            <a:endParaRPr lang="en-US" sz="1400" dirty="0"/>
+          </a:p>
+        </p:txBody>
+      </p:sp>
+      <p:sp>
+        <p:nvSpPr>
+          <p:cNvPr id="61" name="Abgerundetes Rechteck 60"/>
           <p:cNvSpPr/>
           <p:nvPr/>
         </p:nvSpPr>
         <p:spPr>
           <a:xfrm>
-            <a:off x="1968225" y="3402191"/>
+            <a:off x="5258234" y="2985519"/>
             <a:ext cx="1641960" cy="805180"/>
           </a:xfrm>
           <a:prstGeom prst="roundRect">
@@ -3638,99 +4029,36 @@
           <a:p>
             <a:pPr algn="ctr"/>
             <a:r>
-              <a:rPr lang="de-DE" sz="1400" smtClean="0"/>
+              <a:rPr lang="en-US" sz="1400" dirty="0" smtClean="0"/>
               <a:t>TOSCA YAML Model</a:t>
             </a:r>
           </a:p>
           <a:p>
             <a:pPr algn="ctr"/>
             <a:r>
-              <a:rPr lang="de-DE" sz="1400" smtClean="0"/>
-              <a:t>to TOSCA Topology</a:t>
+              <a:rPr lang="en-US" sz="1400" dirty="0" smtClean="0"/>
+              <a:t>to TOSCA XML</a:t>
             </a:r>
           </a:p>
           <a:p>
             <a:pPr algn="ctr"/>
             <a:r>
-              <a:rPr lang="de-DE" sz="1400" smtClean="0"/>
+              <a:rPr lang="en-US" sz="1400" dirty="0" smtClean="0"/>
               <a:t>Model Transformer</a:t>
             </a:r>
-            <a:endParaRPr lang="en-US" sz="1400"/>
-          </a:p>
-        </p:txBody>
-      </p:sp>
-      <p:sp>
-        <p:nvSpPr>
-          <p:cNvPr id="29" name="Abgerundetes Rechteck 28"/>
+            <a:endParaRPr lang="en-US" sz="1400" dirty="0"/>
+          </a:p>
+        </p:txBody>
+      </p:sp>
+      <p:sp>
+        <p:nvSpPr>
+          <p:cNvPr id="62" name="Abgerundetes Rechteck 61"/>
           <p:cNvSpPr/>
           <p:nvPr/>
         </p:nvSpPr>
         <p:spPr>
           <a:xfrm>
-            <a:off x="3743424" y="3402191"/>
-            <a:ext cx="1641961" cy="805180"/>
-          </a:xfrm>
-          <a:prstGeom prst="roundRect">
-            <a:avLst/>
-          </a:prstGeom>
-          <a:solidFill>
-            <a:schemeClr val="tx1">
-              <a:lumMod val="75000"/>
-              <a:lumOff val="25000"/>
-            </a:schemeClr>
-          </a:solidFill>
-          <a:ln w="19050"/>
-        </p:spPr>
-        <p:style>
-          <a:lnRef idx="3">
-            <a:schemeClr val="lt1"/>
-          </a:lnRef>
-          <a:fillRef idx="1">
-            <a:schemeClr val="accent4"/>
-          </a:fillRef>
-          <a:effectRef idx="1">
-            <a:schemeClr val="accent4"/>
-          </a:effectRef>
-          <a:fontRef idx="minor">
-            <a:schemeClr val="lt1"/>
-          </a:fontRef>
-        </p:style>
-        <p:txBody>
-          <a:bodyPr wrap="none" rtlCol="0" anchor="ctr"/>
-          <a:lstStyle/>
-          <a:p>
-            <a:pPr algn="ctr"/>
-            <a:r>
-              <a:rPr lang="de-DE" sz="1400" smtClean="0"/>
-              <a:t>Service Composition</a:t>
-            </a:r>
-          </a:p>
-          <a:p>
-            <a:pPr algn="ctr"/>
-            <a:r>
-              <a:rPr lang="de-DE" sz="1400" smtClean="0"/>
-              <a:t>to TOSCA Topology</a:t>
-            </a:r>
-          </a:p>
-          <a:p>
-            <a:pPr algn="ctr"/>
-            <a:r>
-              <a:rPr lang="de-DE" sz="1400" smtClean="0"/>
-              <a:t>Model Transformer</a:t>
-            </a:r>
-            <a:endParaRPr lang="en-US" sz="1400"/>
-          </a:p>
-        </p:txBody>
-      </p:sp>
-      <p:sp>
-        <p:nvSpPr>
-          <p:cNvPr id="30" name="Abgerundetes Rechteck 29"/>
-          <p:cNvSpPr/>
-          <p:nvPr/>
-        </p:nvSpPr>
-        <p:spPr>
-          <a:xfrm>
-            <a:off x="5518620" y="3402191"/>
+            <a:off x="6971832" y="2985519"/>
             <a:ext cx="1641960" cy="805180"/>
           </a:xfrm>
           <a:prstGeom prst="roundRect">
@@ -3764,29 +4092,238 @@
           <a:p>
             <a:pPr algn="ctr"/>
             <a:r>
-              <a:rPr lang="de-DE" sz="1400" smtClean="0"/>
+              <a:rPr lang="en-US" sz="1400" dirty="0" smtClean="0"/>
               <a:t>BPMN4TOSCA</a:t>
             </a:r>
           </a:p>
           <a:p>
             <a:pPr algn="ctr"/>
             <a:r>
-              <a:rPr lang="de-DE" sz="1400" smtClean="0"/>
+              <a:rPr lang="en-US" sz="1400" dirty="0" smtClean="0"/>
               <a:t>to BPEL Transformer</a:t>
             </a:r>
-            <a:endParaRPr lang="en-US" sz="1400"/>
-          </a:p>
-        </p:txBody>
-      </p:sp>
-      <p:sp>
-        <p:nvSpPr>
-          <p:cNvPr id="4" name="Abgerundetes Rechteck 3"/>
+            <a:endParaRPr lang="en-US" sz="1400" dirty="0"/>
+          </a:p>
+        </p:txBody>
+      </p:sp>
+      <p:sp>
+        <p:nvSpPr>
+          <p:cNvPr id="65" name="Abgerundetes Rechteck 64"/>
           <p:cNvSpPr/>
           <p:nvPr/>
         </p:nvSpPr>
         <p:spPr>
           <a:xfrm>
-            <a:off x="3748384" y="554638"/>
+            <a:off x="117437" y="438427"/>
+            <a:ext cx="2201659" cy="805180"/>
+          </a:xfrm>
+          <a:prstGeom prst="roundRect">
+            <a:avLst/>
+          </a:prstGeom>
+          <a:solidFill>
+            <a:schemeClr val="tx1">
+              <a:lumMod val="75000"/>
+              <a:lumOff val="25000"/>
+            </a:schemeClr>
+          </a:solidFill>
+          <a:ln w="19050"/>
+        </p:spPr>
+        <p:style>
+          <a:lnRef idx="3">
+            <a:schemeClr val="lt1"/>
+          </a:lnRef>
+          <a:fillRef idx="1">
+            <a:schemeClr val="accent4"/>
+          </a:fillRef>
+          <a:effectRef idx="1">
+            <a:schemeClr val="accent4"/>
+          </a:effectRef>
+          <a:fontRef idx="minor">
+            <a:schemeClr val="lt1"/>
+          </a:fontRef>
+        </p:style>
+        <p:txBody>
+          <a:bodyPr rtlCol="0" anchor="ctr"/>
+          <a:lstStyle/>
+          <a:p>
+            <a:pPr algn="ctr"/>
+            <a:r>
+              <a:rPr lang="en-US" sz="1400" dirty="0" smtClean="0"/>
+              <a:t>TOSCA</a:t>
+            </a:r>
+          </a:p>
+          <a:p>
+            <a:pPr algn="ctr"/>
+            <a:r>
+              <a:rPr lang="en-US" sz="1400" dirty="0" smtClean="0"/>
+              <a:t>Topology Model Editor</a:t>
+            </a:r>
+            <a:endParaRPr lang="en-US" sz="1400" dirty="0"/>
+          </a:p>
+        </p:txBody>
+      </p:sp>
+      <p:sp>
+        <p:nvSpPr>
+          <p:cNvPr id="66" name="Abgerundetes Rechteck 65"/>
+          <p:cNvSpPr/>
+          <p:nvPr/>
+        </p:nvSpPr>
+        <p:spPr>
+          <a:xfrm>
+            <a:off x="5466029" y="438427"/>
+            <a:ext cx="2201659" cy="805180"/>
+          </a:xfrm>
+          <a:prstGeom prst="roundRect">
+            <a:avLst/>
+          </a:prstGeom>
+          <a:solidFill>
+            <a:schemeClr val="tx1">
+              <a:lumMod val="75000"/>
+              <a:lumOff val="25000"/>
+            </a:schemeClr>
+          </a:solidFill>
+          <a:ln w="19050"/>
+        </p:spPr>
+        <p:style>
+          <a:lnRef idx="3">
+            <a:schemeClr val="lt1"/>
+          </a:lnRef>
+          <a:fillRef idx="1">
+            <a:schemeClr val="accent4"/>
+          </a:fillRef>
+          <a:effectRef idx="1">
+            <a:schemeClr val="accent4"/>
+          </a:effectRef>
+          <a:fontRef idx="minor">
+            <a:schemeClr val="lt1"/>
+          </a:fontRef>
+        </p:style>
+        <p:txBody>
+          <a:bodyPr rtlCol="0" anchor="ctr"/>
+          <a:lstStyle/>
+          <a:p>
+            <a:pPr algn="ctr"/>
+            <a:r>
+              <a:rPr lang="en-US" sz="1400" dirty="0" smtClean="0"/>
+              <a:t>BPMN4TOSCA Management Plan Editor</a:t>
+            </a:r>
+            <a:endParaRPr lang="en-US" sz="1400" dirty="0"/>
+          </a:p>
+        </p:txBody>
+      </p:sp>
+      <p:sp>
+        <p:nvSpPr>
+          <p:cNvPr id="67" name="Abgerundetes Rechteck 66"/>
+          <p:cNvSpPr/>
+          <p:nvPr/>
+        </p:nvSpPr>
+        <p:spPr>
+          <a:xfrm>
+            <a:off x="8140325" y="438427"/>
+            <a:ext cx="2201659" cy="805180"/>
+          </a:xfrm>
+          <a:prstGeom prst="roundRect">
+            <a:avLst/>
+          </a:prstGeom>
+          <a:solidFill>
+            <a:schemeClr val="tx1">
+              <a:lumMod val="75000"/>
+              <a:lumOff val="25000"/>
+            </a:schemeClr>
+          </a:solidFill>
+          <a:ln w="19050"/>
+        </p:spPr>
+        <p:style>
+          <a:lnRef idx="3">
+            <a:schemeClr val="lt1"/>
+          </a:lnRef>
+          <a:fillRef idx="1">
+            <a:schemeClr val="accent4"/>
+          </a:fillRef>
+          <a:effectRef idx="1">
+            <a:schemeClr val="accent4"/>
+          </a:effectRef>
+          <a:fontRef idx="minor">
+            <a:schemeClr val="lt1"/>
+          </a:fontRef>
+        </p:style>
+        <p:txBody>
+          <a:bodyPr rtlCol="0" anchor="ctr"/>
+          <a:lstStyle/>
+          <a:p>
+            <a:pPr algn="ctr"/>
+            <a:r>
+              <a:rPr lang="en-US" sz="1400" dirty="0" smtClean="0"/>
+              <a:t>Templates, Types, Plans &amp; CSARs Management UI</a:t>
+            </a:r>
+            <a:endParaRPr lang="en-US" sz="1400" dirty="0"/>
+          </a:p>
+        </p:txBody>
+      </p:sp>
+      <p:sp>
+        <p:nvSpPr>
+          <p:cNvPr id="68" name="Abgerundetes Rechteck 67"/>
+          <p:cNvSpPr/>
+          <p:nvPr/>
+        </p:nvSpPr>
+        <p:spPr>
+          <a:xfrm>
+            <a:off x="8604752" y="5774616"/>
+            <a:ext cx="1641960" cy="805180"/>
+          </a:xfrm>
+          <a:prstGeom prst="roundRect">
+            <a:avLst/>
+          </a:prstGeom>
+          <a:solidFill>
+            <a:schemeClr val="bg1">
+              <a:lumMod val="50000"/>
+            </a:schemeClr>
+          </a:solidFill>
+          <a:ln w="19050"/>
+        </p:spPr>
+        <p:style>
+          <a:lnRef idx="3">
+            <a:schemeClr val="lt1"/>
+          </a:lnRef>
+          <a:fillRef idx="1">
+            <a:schemeClr val="accent4"/>
+          </a:fillRef>
+          <a:effectRef idx="1">
+            <a:schemeClr val="accent4"/>
+          </a:effectRef>
+          <a:fontRef idx="minor">
+            <a:schemeClr val="lt1"/>
+          </a:fontRef>
+        </p:style>
+        <p:txBody>
+          <a:bodyPr wrap="none" rtlCol="0" anchor="ctr"/>
+          <a:lstStyle/>
+          <a:p>
+            <a:pPr algn="ctr"/>
+            <a:r>
+              <a:rPr lang="en-US" sz="1400" dirty="0" smtClean="0"/>
+              <a:t>BPEL Provisioning</a:t>
+            </a:r>
+          </a:p>
+          <a:p>
+            <a:pPr algn="ctr"/>
+            <a:r>
+              <a:rPr lang="en-US" sz="1400" dirty="0" smtClean="0"/>
+              <a:t>Plan Generator</a:t>
+            </a:r>
+            <a:endParaRPr lang="en-US" sz="1400" dirty="0"/>
+          </a:p>
+        </p:txBody>
+      </p:sp>
+      <p:sp>
+        <p:nvSpPr>
+          <p:cNvPr id="69" name="Abgerundetes Rechteck 68"/>
+          <p:cNvSpPr/>
+          <p:nvPr/>
+        </p:nvSpPr>
+        <p:spPr>
+          <a:xfrm>
+            <a:off x="8700024" y="4755144"/>
             <a:ext cx="1641960" cy="805180"/>
           </a:xfrm>
           <a:prstGeom prst="roundRect">
@@ -3815,27 +4352,34 @@
           </a:fontRef>
         </p:style>
         <p:txBody>
-          <a:bodyPr rtlCol="0" anchor="ctr"/>
+          <a:bodyPr wrap="none" rtlCol="0" anchor="ctr"/>
           <a:lstStyle/>
           <a:p>
             <a:pPr algn="ctr"/>
             <a:r>
-              <a:rPr lang="de-DE" sz="1400" smtClean="0"/>
-              <a:t>Smart Service Composition Model Editor</a:t>
-            </a:r>
-            <a:endParaRPr lang="en-US" sz="1400"/>
-          </a:p>
-        </p:txBody>
-      </p:sp>
-      <p:sp>
-        <p:nvSpPr>
-          <p:cNvPr id="5" name="Abgerundetes Rechteck 4"/>
+              <a:rPr lang="en-US" sz="1400" dirty="0" smtClean="0"/>
+              <a:t>Implementation</a:t>
+            </a:r>
+          </a:p>
+          <a:p>
+            <a:pPr algn="ctr"/>
+            <a:r>
+              <a:rPr lang="en-US" sz="1400" dirty="0" smtClean="0"/>
+              <a:t>Artifact Generator</a:t>
+            </a:r>
+            <a:endParaRPr lang="en-US" sz="1400" dirty="0"/>
+          </a:p>
+        </p:txBody>
+      </p:sp>
+      <p:sp>
+        <p:nvSpPr>
+          <p:cNvPr id="70" name="Abgerundetes Rechteck 69"/>
           <p:cNvSpPr/>
           <p:nvPr/>
         </p:nvSpPr>
         <p:spPr>
           <a:xfrm>
-            <a:off x="197989" y="554638"/>
+            <a:off x="117438" y="2985519"/>
             <a:ext cx="1641960" cy="805180"/>
           </a:xfrm>
           <a:prstGeom prst="roundRect">
@@ -3864,34 +4408,27 @@
           </a:fontRef>
         </p:style>
         <p:txBody>
-          <a:bodyPr rtlCol="0" anchor="ctr"/>
+          <a:bodyPr wrap="none" rtlCol="0" anchor="ctr"/>
           <a:lstStyle/>
           <a:p>
             <a:pPr algn="ctr"/>
             <a:r>
-              <a:rPr lang="de-DE" sz="1400" smtClean="0"/>
-              <a:t>TOSCA</a:t>
-            </a:r>
-          </a:p>
-          <a:p>
-            <a:pPr algn="ctr"/>
-            <a:r>
-              <a:rPr lang="de-DE" sz="1400" smtClean="0"/>
-              <a:t>Topology Model Editor</a:t>
-            </a:r>
-            <a:endParaRPr lang="en-US" sz="1400"/>
-          </a:p>
-        </p:txBody>
-      </p:sp>
-      <p:sp>
-        <p:nvSpPr>
-          <p:cNvPr id="6" name="Abgerundetes Rechteck 5"/>
+              <a:rPr lang="en-US" sz="1400" dirty="0" smtClean="0"/>
+              <a:t>CSAR Packager</a:t>
+            </a:r>
+            <a:endParaRPr lang="en-US" sz="1400" dirty="0"/>
+          </a:p>
+        </p:txBody>
+      </p:sp>
+      <p:sp>
+        <p:nvSpPr>
+          <p:cNvPr id="71" name="Abgerundetes Rechteck 70"/>
           <p:cNvSpPr/>
           <p:nvPr/>
         </p:nvSpPr>
         <p:spPr>
           <a:xfrm>
-            <a:off x="5523581" y="554638"/>
+            <a:off x="1831037" y="2985519"/>
             <a:ext cx="1641960" cy="805180"/>
           </a:xfrm>
           <a:prstGeom prst="roundRect">
@@ -3925,22 +4462,22 @@
           <a:p>
             <a:pPr algn="ctr"/>
             <a:r>
-              <a:rPr lang="de-DE" sz="1400" smtClean="0"/>
-              <a:t>BPMN4TOSCA Management Plan Editor</a:t>
-            </a:r>
-            <a:endParaRPr lang="en-US" sz="1400"/>
-          </a:p>
-        </p:txBody>
-      </p:sp>
-      <p:sp>
-        <p:nvSpPr>
-          <p:cNvPr id="8" name="Abgerundetes Rechteck 7"/>
+              <a:rPr lang="en-US" sz="1400" dirty="0" smtClean="0"/>
+              <a:t>Topology Completion</a:t>
+            </a:r>
+            <a:endParaRPr lang="en-US" sz="1400" dirty="0"/>
+          </a:p>
+        </p:txBody>
+      </p:sp>
+      <p:sp>
+        <p:nvSpPr>
+          <p:cNvPr id="72" name="Abgerundetes Rechteck 71"/>
           <p:cNvSpPr/>
           <p:nvPr/>
         </p:nvSpPr>
         <p:spPr>
           <a:xfrm>
-            <a:off x="7298779" y="554638"/>
+            <a:off x="1831037" y="4755144"/>
             <a:ext cx="1641960" cy="805180"/>
           </a:xfrm>
           <a:prstGeom prst="roundRect">
@@ -3969,27 +4506,27 @@
           </a:fontRef>
         </p:style>
         <p:txBody>
-          <a:bodyPr rtlCol="0" anchor="ctr"/>
+          <a:bodyPr wrap="none" rtlCol="0" anchor="ctr"/>
           <a:lstStyle/>
           <a:p>
             <a:pPr algn="ctr"/>
             <a:r>
-              <a:rPr lang="de-DE" sz="1400" smtClean="0"/>
-              <a:t>Templates, Types, Plans &amp; CSARs Management UI</a:t>
-            </a:r>
-            <a:endParaRPr lang="en-US" sz="1400"/>
-          </a:p>
-        </p:txBody>
-      </p:sp>
-      <p:sp>
-        <p:nvSpPr>
-          <p:cNvPr id="26" name="Abgerundetes Rechteck 25"/>
+              <a:rPr lang="en-US" sz="1400" dirty="0" smtClean="0"/>
+              <a:t>Splitting &amp; Matching</a:t>
+            </a:r>
+            <a:endParaRPr lang="en-US" sz="1400" dirty="0"/>
+          </a:p>
+        </p:txBody>
+      </p:sp>
+      <p:sp>
+        <p:nvSpPr>
+          <p:cNvPr id="73" name="Abgerundetes Rechteck 72"/>
           <p:cNvSpPr/>
           <p:nvPr/>
         </p:nvSpPr>
         <p:spPr>
           <a:xfrm>
-            <a:off x="1973186" y="554638"/>
+            <a:off x="3548267" y="2017611"/>
             <a:ext cx="1641960" cy="805180"/>
           </a:xfrm>
           <a:prstGeom prst="roundRect">
@@ -4023,102 +4560,615 @@
           <a:p>
             <a:pPr algn="ctr"/>
             <a:r>
-              <a:rPr lang="de-DE" sz="1400" smtClean="0"/>
-              <a:t>TOSCA</a:t>
-            </a:r>
-          </a:p>
-          <a:p>
-            <a:pPr algn="ctr"/>
-            <a:r>
-              <a:rPr lang="de-DE" sz="1400" smtClean="0"/>
-              <a:t>YAML Model Editor</a:t>
-            </a:r>
-            <a:endParaRPr lang="en-US" sz="1400"/>
-          </a:p>
-        </p:txBody>
-      </p:sp>
-      <p:sp>
-        <p:nvSpPr>
-          <p:cNvPr id="48" name="Abgerundetes Rechteck 47"/>
+              <a:rPr lang="en-US" sz="1400" dirty="0" smtClean="0"/>
+              <a:t>Versioning &amp;</a:t>
+            </a:r>
+            <a:br>
+              <a:rPr lang="en-US" sz="1400" dirty="0" smtClean="0"/>
+            </a:br>
+            <a:r>
+              <a:rPr lang="en-US" sz="1400" dirty="0" smtClean="0"/>
+              <a:t>Difference</a:t>
+            </a:r>
+            <a:br>
+              <a:rPr lang="en-US" sz="1400" dirty="0" smtClean="0"/>
+            </a:br>
+            <a:r>
+              <a:rPr lang="en-US" sz="1400" dirty="0" smtClean="0"/>
+              <a:t>Calculation</a:t>
+            </a:r>
+            <a:endParaRPr lang="en-US" sz="1400" dirty="0"/>
+          </a:p>
+        </p:txBody>
+      </p:sp>
+      <p:sp>
+        <p:nvSpPr>
+          <p:cNvPr id="74" name="Abgerundetes Rechteck 73"/>
           <p:cNvSpPr/>
           <p:nvPr/>
         </p:nvSpPr>
         <p:spPr>
           <a:xfrm>
-            <a:off x="197990" y="2348880"/>
-            <a:ext cx="8742748" cy="2638180"/>
+            <a:off x="117438" y="4755144"/>
+            <a:ext cx="1641960" cy="805180"/>
+          </a:xfrm>
+          <a:prstGeom prst="roundRect">
+            <a:avLst/>
+          </a:prstGeom>
+          <a:solidFill>
+            <a:schemeClr val="tx1">
+              <a:lumMod val="75000"/>
+              <a:lumOff val="25000"/>
+            </a:schemeClr>
+          </a:solidFill>
+          <a:ln w="19050"/>
+        </p:spPr>
+        <p:style>
+          <a:lnRef idx="3">
+            <a:schemeClr val="lt1"/>
+          </a:lnRef>
+          <a:fillRef idx="1">
+            <a:schemeClr val="accent4"/>
+          </a:fillRef>
+          <a:effectRef idx="1">
+            <a:schemeClr val="accent4"/>
+          </a:effectRef>
+          <a:fontRef idx="minor">
+            <a:schemeClr val="lt1"/>
+          </a:fontRef>
+        </p:style>
+        <p:txBody>
+          <a:bodyPr wrap="none" rtlCol="0" anchor="ctr"/>
+          <a:lstStyle/>
+          <a:p>
+            <a:pPr algn="ctr"/>
+            <a:r>
+              <a:rPr lang="en-US" sz="1400" dirty="0" smtClean="0"/>
+              <a:t>Consistency Check</a:t>
+            </a:r>
+          </a:p>
+        </p:txBody>
+      </p:sp>
+      <p:sp>
+        <p:nvSpPr>
+          <p:cNvPr id="75" name="Zylinder 74"/>
+          <p:cNvSpPr/>
+          <p:nvPr/>
+        </p:nvSpPr>
+        <p:spPr>
+          <a:xfrm>
+            <a:off x="1831037" y="5712038"/>
+            <a:ext cx="1641960" cy="864096"/>
+          </a:xfrm>
+          <a:prstGeom prst="can">
+            <a:avLst/>
+          </a:prstGeom>
+          <a:solidFill>
+            <a:schemeClr val="tx1">
+              <a:lumMod val="75000"/>
+              <a:lumOff val="25000"/>
+            </a:schemeClr>
+          </a:solidFill>
+          <a:ln w="19050"/>
+        </p:spPr>
+        <p:style>
+          <a:lnRef idx="3">
+            <a:schemeClr val="lt1"/>
+          </a:lnRef>
+          <a:fillRef idx="1">
+            <a:schemeClr val="accent4"/>
+          </a:fillRef>
+          <a:effectRef idx="1">
+            <a:schemeClr val="accent4"/>
+          </a:effectRef>
+          <a:fontRef idx="minor">
+            <a:schemeClr val="lt1"/>
+          </a:fontRef>
+        </p:style>
+        <p:txBody>
+          <a:bodyPr tIns="144000" rtlCol="0" anchor="ctr"/>
+          <a:lstStyle/>
+          <a:p>
+            <a:pPr algn="ctr"/>
+            <a:r>
+              <a:rPr lang="en-US" sz="1400" dirty="0" smtClean="0"/>
+              <a:t>Matching Templates Repository</a:t>
+            </a:r>
+            <a:endParaRPr lang="en-US" sz="1400" dirty="0"/>
+          </a:p>
+        </p:txBody>
+      </p:sp>
+      <p:sp>
+        <p:nvSpPr>
+          <p:cNvPr id="76" name="Abgerundetes Rechteck 75"/>
+          <p:cNvSpPr/>
+          <p:nvPr/>
+        </p:nvSpPr>
+        <p:spPr>
+          <a:xfrm>
+            <a:off x="3544636" y="4755144"/>
+            <a:ext cx="1641960" cy="805180"/>
+          </a:xfrm>
+          <a:prstGeom prst="roundRect">
+            <a:avLst/>
+          </a:prstGeom>
+          <a:solidFill>
+            <a:schemeClr val="tx1">
+              <a:lumMod val="75000"/>
+              <a:lumOff val="25000"/>
+            </a:schemeClr>
+          </a:solidFill>
+          <a:ln w="19050"/>
+        </p:spPr>
+        <p:style>
+          <a:lnRef idx="3">
+            <a:schemeClr val="lt1"/>
+          </a:lnRef>
+          <a:fillRef idx="1">
+            <a:schemeClr val="accent4"/>
+          </a:fillRef>
+          <a:effectRef idx="1">
+            <a:schemeClr val="accent4"/>
+          </a:effectRef>
+          <a:fontRef idx="minor">
+            <a:schemeClr val="lt1"/>
+          </a:fontRef>
+        </p:style>
+        <p:txBody>
+          <a:bodyPr wrap="none" rtlCol="0" anchor="ctr"/>
+          <a:lstStyle/>
+          <a:p>
+            <a:pPr algn="ctr"/>
+            <a:r>
+              <a:rPr lang="en-US" sz="1400" dirty="0" smtClean="0"/>
+              <a:t>Compliance </a:t>
+            </a:r>
+          </a:p>
+          <a:p>
+            <a:pPr algn="ctr"/>
+            <a:r>
+              <a:rPr lang="en-US" sz="1400" dirty="0" smtClean="0"/>
+              <a:t>Checker</a:t>
+            </a:r>
+            <a:endParaRPr lang="en-US" sz="1400" dirty="0"/>
+          </a:p>
+        </p:txBody>
+      </p:sp>
+      <p:sp>
+        <p:nvSpPr>
+          <p:cNvPr id="77" name="Zylinder 76"/>
+          <p:cNvSpPr/>
+          <p:nvPr/>
+        </p:nvSpPr>
+        <p:spPr>
+          <a:xfrm>
+            <a:off x="3544636" y="5712038"/>
+            <a:ext cx="1641960" cy="864096"/>
+          </a:xfrm>
+          <a:prstGeom prst="can">
+            <a:avLst/>
+          </a:prstGeom>
+          <a:solidFill>
+            <a:schemeClr val="tx1">
+              <a:lumMod val="75000"/>
+              <a:lumOff val="25000"/>
+            </a:schemeClr>
+          </a:solidFill>
+          <a:ln w="19050"/>
+        </p:spPr>
+        <p:style>
+          <a:lnRef idx="3">
+            <a:schemeClr val="lt1"/>
+          </a:lnRef>
+          <a:fillRef idx="1">
+            <a:schemeClr val="accent4"/>
+          </a:fillRef>
+          <a:effectRef idx="1">
+            <a:schemeClr val="accent4"/>
+          </a:effectRef>
+          <a:fontRef idx="minor">
+            <a:schemeClr val="lt1"/>
+          </a:fontRef>
+        </p:style>
+        <p:txBody>
+          <a:bodyPr tIns="144000" rtlCol="0" anchor="ctr"/>
+          <a:lstStyle/>
+          <a:p>
+            <a:pPr algn="ctr"/>
+            <a:r>
+              <a:rPr lang="en-US" sz="1400" dirty="0" smtClean="0"/>
+              <a:t>Compliance Rules</a:t>
+            </a:r>
+          </a:p>
+          <a:p>
+            <a:pPr algn="ctr"/>
+            <a:r>
+              <a:rPr lang="en-US" sz="1400" dirty="0" smtClean="0"/>
+              <a:t>Repository</a:t>
+            </a:r>
+            <a:endParaRPr lang="en-US" sz="1400" dirty="0"/>
+          </a:p>
+        </p:txBody>
+      </p:sp>
+      <p:sp>
+        <p:nvSpPr>
+          <p:cNvPr id="78" name="Abgerundetes Rechteck 77"/>
+          <p:cNvSpPr/>
+          <p:nvPr/>
+        </p:nvSpPr>
+        <p:spPr>
+          <a:xfrm>
+            <a:off x="5258234" y="4755144"/>
+            <a:ext cx="1641960" cy="805180"/>
+          </a:xfrm>
+          <a:prstGeom prst="roundRect">
+            <a:avLst/>
+          </a:prstGeom>
+          <a:solidFill>
+            <a:schemeClr val="tx1">
+              <a:lumMod val="75000"/>
+              <a:lumOff val="25000"/>
+            </a:schemeClr>
+          </a:solidFill>
+          <a:ln w="19050"/>
+        </p:spPr>
+        <p:style>
+          <a:lnRef idx="3">
+            <a:schemeClr val="lt1"/>
+          </a:lnRef>
+          <a:fillRef idx="1">
+            <a:schemeClr val="accent4"/>
+          </a:fillRef>
+          <a:effectRef idx="1">
+            <a:schemeClr val="accent4"/>
+          </a:effectRef>
+          <a:fontRef idx="minor">
+            <a:schemeClr val="lt1"/>
+          </a:fontRef>
+        </p:style>
+        <p:txBody>
+          <a:bodyPr wrap="none" rtlCol="0" anchor="ctr"/>
+          <a:lstStyle/>
+          <a:p>
+            <a:pPr algn="ctr"/>
+            <a:r>
+              <a:rPr lang="en-US" sz="1400" dirty="0" smtClean="0"/>
+              <a:t>Key-based Policy</a:t>
+            </a:r>
+          </a:p>
+          <a:p>
+            <a:pPr algn="ctr"/>
+            <a:r>
+              <a:rPr lang="en-US" sz="1400" dirty="0" smtClean="0"/>
+              <a:t>Template Generator</a:t>
+            </a:r>
+            <a:endParaRPr lang="en-US" sz="1400" dirty="0"/>
+          </a:p>
+        </p:txBody>
+      </p:sp>
+      <p:sp>
+        <p:nvSpPr>
+          <p:cNvPr id="79" name="Abgerundetes Rechteck 78"/>
+          <p:cNvSpPr/>
+          <p:nvPr/>
+        </p:nvSpPr>
+        <p:spPr>
+          <a:xfrm>
+            <a:off x="6971832" y="4755144"/>
+            <a:ext cx="1641960" cy="805180"/>
+          </a:xfrm>
+          <a:prstGeom prst="roundRect">
+            <a:avLst/>
+          </a:prstGeom>
+          <a:solidFill>
+            <a:schemeClr val="tx1">
+              <a:lumMod val="75000"/>
+              <a:lumOff val="25000"/>
+            </a:schemeClr>
+          </a:solidFill>
+          <a:ln w="19050"/>
+        </p:spPr>
+        <p:style>
+          <a:lnRef idx="3">
+            <a:schemeClr val="lt1"/>
+          </a:lnRef>
+          <a:fillRef idx="1">
+            <a:schemeClr val="accent4"/>
+          </a:fillRef>
+          <a:effectRef idx="1">
+            <a:schemeClr val="accent4"/>
+          </a:effectRef>
+          <a:fontRef idx="minor">
+            <a:schemeClr val="lt1"/>
+          </a:fontRef>
+        </p:style>
+        <p:txBody>
+          <a:bodyPr wrap="none" rtlCol="0" anchor="ctr"/>
+          <a:lstStyle/>
+          <a:p>
+            <a:pPr algn="ctr"/>
+            <a:r>
+              <a:rPr lang="en-US" sz="1400" dirty="0" smtClean="0"/>
+              <a:t>Key &amp; Access Control </a:t>
+            </a:r>
+          </a:p>
+          <a:p>
+            <a:pPr algn="ctr"/>
+            <a:r>
+              <a:rPr lang="en-US" sz="1400" dirty="0" smtClean="0"/>
+              <a:t>List (ACL)</a:t>
+            </a:r>
+          </a:p>
+          <a:p>
+            <a:pPr algn="ctr"/>
+            <a:r>
+              <a:rPr lang="en-US" sz="1400" dirty="0" smtClean="0"/>
+              <a:t>Management</a:t>
+            </a:r>
+          </a:p>
+        </p:txBody>
+      </p:sp>
+      <p:sp>
+        <p:nvSpPr>
+          <p:cNvPr id="80" name="Abgerundetes Rechteck 79"/>
+          <p:cNvSpPr/>
+          <p:nvPr/>
+        </p:nvSpPr>
+        <p:spPr>
+          <a:xfrm>
+            <a:off x="2791733" y="438427"/>
+            <a:ext cx="2201659" cy="805180"/>
+          </a:xfrm>
+          <a:prstGeom prst="roundRect">
+            <a:avLst>
+              <a:gd name="adj" fmla="val 11729"/>
+            </a:avLst>
+          </a:prstGeom>
+          <a:solidFill>
+            <a:schemeClr val="tx1">
+              <a:lumMod val="75000"/>
+              <a:lumOff val="25000"/>
+            </a:schemeClr>
+          </a:solidFill>
+          <a:ln w="19050"/>
+        </p:spPr>
+        <p:style>
+          <a:lnRef idx="3">
+            <a:schemeClr val="lt1"/>
+          </a:lnRef>
+          <a:fillRef idx="1">
+            <a:schemeClr val="accent4"/>
+          </a:fillRef>
+          <a:effectRef idx="1">
+            <a:schemeClr val="accent4"/>
+          </a:effectRef>
+          <a:fontRef idx="minor">
+            <a:schemeClr val="lt1"/>
+          </a:fontRef>
+        </p:style>
+        <p:txBody>
+          <a:bodyPr rtlCol="0" anchor="ctr"/>
+          <a:lstStyle/>
+          <a:p>
+            <a:pPr algn="ctr"/>
+            <a:r>
+              <a:rPr lang="en-US" sz="1400" dirty="0" smtClean="0"/>
+              <a:t>Compliance Rule Editor</a:t>
+            </a:r>
+            <a:endParaRPr lang="en-US" sz="1400" dirty="0"/>
+          </a:p>
+        </p:txBody>
+      </p:sp>
+      <p:sp>
+        <p:nvSpPr>
+          <p:cNvPr id="81" name="Abgerundetes Rechteck 80"/>
+          <p:cNvSpPr/>
+          <p:nvPr/>
+        </p:nvSpPr>
+        <p:spPr>
+          <a:xfrm>
+            <a:off x="1831037" y="2017611"/>
+            <a:ext cx="1641960" cy="805180"/>
+          </a:xfrm>
+          <a:prstGeom prst="roundRect">
+            <a:avLst/>
+          </a:prstGeom>
+          <a:solidFill>
+            <a:schemeClr val="tx1">
+              <a:lumMod val="75000"/>
+              <a:lumOff val="25000"/>
+            </a:schemeClr>
+          </a:solidFill>
+          <a:ln w="19050"/>
+        </p:spPr>
+        <p:style>
+          <a:lnRef idx="3">
+            <a:schemeClr val="lt1"/>
+          </a:lnRef>
+          <a:fillRef idx="1">
+            <a:schemeClr val="accent4"/>
+          </a:fillRef>
+          <a:effectRef idx="1">
+            <a:schemeClr val="accent4"/>
+          </a:effectRef>
+          <a:fontRef idx="minor">
+            <a:schemeClr val="lt1"/>
+          </a:fontRef>
+        </p:style>
+        <p:txBody>
+          <a:bodyPr wrap="none" rtlCol="0" anchor="ctr"/>
+          <a:lstStyle/>
+          <a:p>
+            <a:pPr algn="ctr"/>
+            <a:r>
+              <a:rPr lang="en-US" sz="1400" dirty="0" err="1" smtClean="0"/>
+              <a:t>XaaS</a:t>
+            </a:r>
+            <a:r>
+              <a:rPr lang="en-US" sz="1400" dirty="0" smtClean="0"/>
+              <a:t> Packager</a:t>
+            </a:r>
+          </a:p>
+        </p:txBody>
+      </p:sp>
+      <p:sp>
+        <p:nvSpPr>
+          <p:cNvPr id="114" name="Freihandform 113"/>
+          <p:cNvSpPr/>
+          <p:nvPr/>
+        </p:nvSpPr>
+        <p:spPr>
+          <a:xfrm>
+            <a:off x="117438" y="2017611"/>
+            <a:ext cx="10224546" cy="2606967"/>
           </a:xfrm>
           <a:custGeom>
             <a:avLst/>
-            <a:gdLst/>
+            <a:gdLst>
+              <a:gd name="connsiteX0" fmla="*/ 8721069 w 10224546"/>
+              <a:gd name="connsiteY0" fmla="*/ 0 h 2606967"/>
+              <a:gd name="connsiteX1" fmla="*/ 10086063 w 10224546"/>
+              <a:gd name="connsiteY1" fmla="*/ 0 h 2606967"/>
+              <a:gd name="connsiteX2" fmla="*/ 10224546 w 10224546"/>
+              <a:gd name="connsiteY2" fmla="*/ 138483 h 2606967"/>
+              <a:gd name="connsiteX3" fmla="*/ 10224546 w 10224546"/>
+              <a:gd name="connsiteY3" fmla="*/ 2036523 h 2606967"/>
+              <a:gd name="connsiteX4" fmla="*/ 10224546 w 10224546"/>
+              <a:gd name="connsiteY4" fmla="*/ 2468484 h 2606967"/>
+              <a:gd name="connsiteX5" fmla="*/ 10224546 w 10224546"/>
+              <a:gd name="connsiteY5" fmla="*/ 2492875 h 2606967"/>
+              <a:gd name="connsiteX6" fmla="*/ 10110454 w 10224546"/>
+              <a:gd name="connsiteY6" fmla="*/ 2606967 h 2606967"/>
+              <a:gd name="connsiteX7" fmla="*/ 10086063 w 10224546"/>
+              <a:gd name="connsiteY7" fmla="*/ 2606967 h 2606967"/>
+              <a:gd name="connsiteX8" fmla="*/ 8721069 w 10224546"/>
+              <a:gd name="connsiteY8" fmla="*/ 2606967 h 2606967"/>
+              <a:gd name="connsiteX9" fmla="*/ 114092 w 10224546"/>
+              <a:gd name="connsiteY9" fmla="*/ 2606967 h 2606967"/>
+              <a:gd name="connsiteX10" fmla="*/ 0 w 10224546"/>
+              <a:gd name="connsiteY10" fmla="*/ 2492875 h 2606967"/>
+              <a:gd name="connsiteX11" fmla="*/ 0 w 10224546"/>
+              <a:gd name="connsiteY11" fmla="*/ 2036523 h 2606967"/>
+              <a:gd name="connsiteX12" fmla="*/ 114092 w 10224546"/>
+              <a:gd name="connsiteY12" fmla="*/ 1922431 h 2606967"/>
+              <a:gd name="connsiteX13" fmla="*/ 8582586 w 10224546"/>
+              <a:gd name="connsiteY13" fmla="*/ 1922431 h 2606967"/>
+              <a:gd name="connsiteX14" fmla="*/ 8582586 w 10224546"/>
+              <a:gd name="connsiteY14" fmla="*/ 138483 h 2606967"/>
+              <a:gd name="connsiteX15" fmla="*/ 8721069 w 10224546"/>
+              <a:gd name="connsiteY15" fmla="*/ 0 h 2606967"/>
+            </a:gdLst>
             <a:ahLst/>
-            <a:cxnLst/>
+            <a:cxnLst>
+              <a:cxn ang="0">
+                <a:pos x="connsiteX0" y="connsiteY0"/>
+              </a:cxn>
+              <a:cxn ang="0">
+                <a:pos x="connsiteX1" y="connsiteY1"/>
+              </a:cxn>
+              <a:cxn ang="0">
+                <a:pos x="connsiteX2" y="connsiteY2"/>
+              </a:cxn>
+              <a:cxn ang="0">
+                <a:pos x="connsiteX3" y="connsiteY3"/>
+              </a:cxn>
+              <a:cxn ang="0">
+                <a:pos x="connsiteX4" y="connsiteY4"/>
+              </a:cxn>
+              <a:cxn ang="0">
+                <a:pos x="connsiteX5" y="connsiteY5"/>
+              </a:cxn>
+              <a:cxn ang="0">
+                <a:pos x="connsiteX6" y="connsiteY6"/>
+              </a:cxn>
+              <a:cxn ang="0">
+                <a:pos x="connsiteX7" y="connsiteY7"/>
+              </a:cxn>
+              <a:cxn ang="0">
+                <a:pos x="connsiteX8" y="connsiteY8"/>
+              </a:cxn>
+              <a:cxn ang="0">
+                <a:pos x="connsiteX9" y="connsiteY9"/>
+              </a:cxn>
+              <a:cxn ang="0">
+                <a:pos x="connsiteX10" y="connsiteY10"/>
+              </a:cxn>
+              <a:cxn ang="0">
+                <a:pos x="connsiteX11" y="connsiteY11"/>
+              </a:cxn>
+              <a:cxn ang="0">
+                <a:pos x="connsiteX12" y="connsiteY12"/>
+              </a:cxn>
+              <a:cxn ang="0">
+                <a:pos x="connsiteX13" y="connsiteY13"/>
+              </a:cxn>
+              <a:cxn ang="0">
+                <a:pos x="connsiteX14" y="connsiteY14"/>
+              </a:cxn>
+              <a:cxn ang="0">
+                <a:pos x="connsiteX15" y="connsiteY15"/>
+              </a:cxn>
+            </a:cxnLst>
             <a:rect l="l" t="t" r="r" b="b"/>
             <a:pathLst>
-              <a:path w="8742748" h="2638180">
+              <a:path w="10224546" h="2606967">
                 <a:moveTo>
-                  <a:pt x="7269680" y="0"/>
+                  <a:pt x="8721069" y="0"/>
                 </a:moveTo>
                 <a:lnTo>
-                  <a:pt x="8162474" y="0"/>
+                  <a:pt x="10086063" y="0"/>
+                </a:lnTo>
+                <a:cubicBezTo>
+                  <a:pt x="10162545" y="0"/>
+                  <a:pt x="10224546" y="62001"/>
+                  <a:pt x="10224546" y="138483"/>
+                </a:cubicBezTo>
+                <a:lnTo>
+                  <a:pt x="10224546" y="2036523"/>
                 </a:lnTo>
                 <a:lnTo>
-                  <a:pt x="8573856" y="0"/>
+                  <a:pt x="10224546" y="2468484"/>
                 </a:lnTo>
                 <a:lnTo>
-                  <a:pt x="8626691" y="0"/>
+                  <a:pt x="10224546" y="2492875"/>
                 </a:lnTo>
                 <a:cubicBezTo>
-                  <a:pt x="8690788" y="0"/>
-                  <a:pt x="8742748" y="51960"/>
-                  <a:pt x="8742748" y="116057"/>
+                  <a:pt x="10224546" y="2555886"/>
+                  <a:pt x="10173465" y="2606967"/>
+                  <a:pt x="10110454" y="2606967"/>
                 </a:cubicBezTo>
                 <a:lnTo>
-                  <a:pt x="8742748" y="168892"/>
+                  <a:pt x="10086063" y="2606967"/>
                 </a:lnTo>
                 <a:lnTo>
-                  <a:pt x="8742748" y="2135364"/>
+                  <a:pt x="8721069" y="2606967"/>
                 </a:lnTo>
                 <a:lnTo>
-                  <a:pt x="8742748" y="2137977"/>
+                  <a:pt x="114092" y="2606967"/>
+                </a:lnTo>
+                <a:cubicBezTo>
+                  <a:pt x="51081" y="2606967"/>
+                  <a:pt x="0" y="2555886"/>
+                  <a:pt x="0" y="2492875"/>
+                </a:cubicBezTo>
+                <a:lnTo>
+                  <a:pt x="0" y="2036523"/>
+                </a:lnTo>
+                <a:cubicBezTo>
+                  <a:pt x="0" y="1973512"/>
+                  <a:pt x="51081" y="1922431"/>
+                  <a:pt x="114092" y="1922431"/>
+                </a:cubicBezTo>
+                <a:lnTo>
+                  <a:pt x="8582586" y="1922431"/>
                 </a:lnTo>
                 <a:lnTo>
-                  <a:pt x="8742748" y="2213112"/>
-                </a:lnTo>
-                <a:lnTo>
-                  <a:pt x="8742748" y="2538137"/>
+                  <a:pt x="8582586" y="138483"/>
                 </a:lnTo>
                 <a:cubicBezTo>
-                  <a:pt x="8742748" y="2593389"/>
-                  <a:pt x="8697957" y="2638180"/>
-                  <a:pt x="8642705" y="2638180"/>
-                </a:cubicBezTo>
-                <a:lnTo>
-                  <a:pt x="100043" y="2638180"/>
-                </a:lnTo>
-                <a:cubicBezTo>
-                  <a:pt x="44791" y="2638180"/>
-                  <a:pt x="0" y="2593389"/>
-                  <a:pt x="0" y="2538137"/>
-                </a:cubicBezTo>
-                <a:lnTo>
-                  <a:pt x="0" y="2137977"/>
-                </a:lnTo>
-                <a:cubicBezTo>
-                  <a:pt x="0" y="2082725"/>
-                  <a:pt x="44791" y="2037934"/>
-                  <a:pt x="100043" y="2037934"/>
-                </a:cubicBezTo>
-                <a:lnTo>
-                  <a:pt x="7100788" y="2037934"/>
-                </a:lnTo>
-                <a:lnTo>
-                  <a:pt x="7100788" y="168892"/>
-                </a:lnTo>
-                <a:cubicBezTo>
-                  <a:pt x="7100788" y="75616"/>
-                  <a:pt x="7176404" y="0"/>
-                  <a:pt x="7269680" y="0"/>
+                  <a:pt x="8582586" y="62001"/>
+                  <a:pt x="8644587" y="0"/>
+                  <a:pt x="8721069" y="0"/>
                 </a:cubicBezTo>
                 <a:close/>
               </a:path>
@@ -4147,32 +5197,44 @@
           </a:fontRef>
         </p:style>
         <p:txBody>
-          <a:bodyPr rot="0" spcFirstLastPara="0" vertOverflow="overflow" horzOverflow="overflow" vert="horz" wrap="square" lIns="91440" tIns="45720" rIns="91440" bIns="180000" numCol="1" spcCol="0" rtlCol="0" fromWordArt="0" anchor="b" anchorCtr="0" forceAA="0" compatLnSpc="1">
-            <a:prstTxWarp prst="textNoShape">
-              <a:avLst/>
-            </a:prstTxWarp>
+          <a:bodyPr wrap="square" rtlCol="0" anchor="b">
             <a:noAutofit/>
           </a:bodyPr>
           <a:lstStyle/>
           <a:p>
             <a:pPr algn="ctr"/>
             <a:r>
-              <a:rPr lang="de-DE" sz="1400" smtClean="0"/>
-              <a:t>Templates, Types, Plans &amp; CSARs Management</a:t>
-            </a:r>
-            <a:endParaRPr lang="en-US" sz="1400"/>
-          </a:p>
-        </p:txBody>
-      </p:sp>
-      <p:sp>
-        <p:nvSpPr>
-          <p:cNvPr id="51" name="Abgerundetes Rechteck 50"/>
+              <a:rPr lang="de-DE" sz="1400" dirty="0"/>
+              <a:t>Templates, </a:t>
+            </a:r>
+            <a:r>
+              <a:rPr lang="de-DE" sz="1400" dirty="0" err="1"/>
+              <a:t>Types</a:t>
+            </a:r>
+            <a:r>
+              <a:rPr lang="de-DE" sz="1400" dirty="0"/>
+              <a:t>, Plans &amp; CSARs </a:t>
+            </a:r>
+            <a:r>
+              <a:rPr lang="de-DE" sz="1400" dirty="0" smtClean="0"/>
+              <a:t>Management</a:t>
+            </a:r>
+          </a:p>
+          <a:p>
+            <a:pPr algn="ctr"/>
+            <a:endParaRPr lang="en-US" sz="1400" dirty="0"/>
+          </a:p>
+        </p:txBody>
+      </p:sp>
+      <p:sp>
+        <p:nvSpPr>
+          <p:cNvPr id="115" name="Abgerundetes Rechteck 114"/>
           <p:cNvSpPr/>
           <p:nvPr/>
         </p:nvSpPr>
         <p:spPr>
           <a:xfrm>
-            <a:off x="3748384" y="5157192"/>
+            <a:off x="3544636" y="2985519"/>
             <a:ext cx="1641960" cy="805180"/>
           </a:xfrm>
           <a:prstGeom prst="roundRect">
@@ -4201,253 +5263,102 @@
           </a:fontRef>
         </p:style>
         <p:txBody>
-          <a:bodyPr wrap="none" rtlCol="0" anchor="ctr"/>
+          <a:bodyPr rtlCol="0" anchor="ctr"/>
           <a:lstStyle/>
           <a:p>
             <a:pPr algn="ctr"/>
             <a:r>
-              <a:rPr lang="de-DE" sz="1400" smtClean="0"/>
-              <a:t>BPEL Provisioning</a:t>
-            </a:r>
-          </a:p>
-          <a:p>
-            <a:pPr algn="ctr"/>
-            <a:r>
-              <a:rPr lang="de-DE" sz="1400" smtClean="0"/>
-              <a:t>Plan Generator</a:t>
-            </a:r>
-            <a:endParaRPr lang="en-US" sz="1400"/>
-          </a:p>
-        </p:txBody>
-      </p:sp>
-      <p:sp>
-        <p:nvSpPr>
-          <p:cNvPr id="52" name="Abgerundetes Rechteck 51"/>
+              <a:rPr lang="en-US" sz="1400" dirty="0"/>
+              <a:t>Accountability</a:t>
+            </a:r>
+          </a:p>
+        </p:txBody>
+      </p:sp>
+      <p:sp>
+        <p:nvSpPr>
+          <p:cNvPr id="2" name="Abgerundetes Rechteck 1"/>
           <p:cNvSpPr/>
           <p:nvPr/>
         </p:nvSpPr>
         <p:spPr>
           <a:xfrm>
-            <a:off x="5518620" y="5157192"/>
-            <a:ext cx="1641960" cy="805180"/>
+            <a:off x="5258234" y="5696485"/>
+            <a:ext cx="5083750" cy="961442"/>
           </a:xfrm>
           <a:prstGeom prst="roundRect">
-            <a:avLst/>
+            <a:avLst>
+              <a:gd name="adj" fmla="val 10051"/>
+            </a:avLst>
           </a:prstGeom>
-          <a:solidFill>
-            <a:schemeClr val="tx1">
-              <a:lumMod val="75000"/>
-              <a:lumOff val="25000"/>
-            </a:schemeClr>
-          </a:solidFill>
-          <a:ln w="19050"/>
+          <a:noFill/>
+          <a:ln>
+            <a:solidFill>
+              <a:schemeClr val="tx1">
+                <a:lumMod val="75000"/>
+                <a:lumOff val="25000"/>
+              </a:schemeClr>
+            </a:solidFill>
+            <a:prstDash val="sysDot"/>
+          </a:ln>
         </p:spPr>
         <p:style>
-          <a:lnRef idx="3">
-            <a:schemeClr val="lt1"/>
+          <a:lnRef idx="2">
+            <a:schemeClr val="accent1">
+              <a:shade val="50000"/>
+            </a:schemeClr>
           </a:lnRef>
           <a:fillRef idx="1">
-            <a:schemeClr val="accent4"/>
+            <a:schemeClr val="accent1"/>
           </a:fillRef>
-          <a:effectRef idx="1">
-            <a:schemeClr val="accent4"/>
+          <a:effectRef idx="0">
+            <a:schemeClr val="accent1"/>
           </a:effectRef>
           <a:fontRef idx="minor">
             <a:schemeClr val="lt1"/>
           </a:fontRef>
         </p:style>
         <p:txBody>
-          <a:bodyPr wrap="none" rtlCol="0" anchor="ctr"/>
+          <a:bodyPr rtlCol="0" anchor="ctr"/>
           <a:lstStyle/>
           <a:p>
             <a:pPr algn="ctr"/>
-            <a:r>
-              <a:rPr lang="de-DE" sz="1400" smtClean="0"/>
-              <a:t>Implementation</a:t>
-            </a:r>
-          </a:p>
-          <a:p>
-            <a:pPr algn="ctr"/>
-            <a:r>
-              <a:rPr lang="de-DE" sz="1400" smtClean="0"/>
-              <a:t>Artifact Generator</a:t>
-            </a:r>
-            <a:endParaRPr lang="en-US" sz="1400"/>
-          </a:p>
-        </p:txBody>
-      </p:sp>
-      <p:sp>
-        <p:nvSpPr>
-          <p:cNvPr id="53" name="Abgerundetes Rechteck 52"/>
-          <p:cNvSpPr/>
+            <a:endParaRPr lang="de-DE"/>
+          </a:p>
+        </p:txBody>
+      </p:sp>
+      <p:sp>
+        <p:nvSpPr>
+          <p:cNvPr id="3" name="Textfeld 2"/>
+          <p:cNvSpPr txBox="1"/>
           <p:nvPr/>
         </p:nvSpPr>
         <p:spPr>
           <a:xfrm>
-            <a:off x="7298778" y="5157192"/>
-            <a:ext cx="1641960" cy="805180"/>
+            <a:off x="5348363" y="5807874"/>
+            <a:ext cx="3184751" cy="738664"/>
           </a:xfrm>
-          <a:prstGeom prst="roundRect">
+          <a:prstGeom prst="rect">
             <a:avLst/>
           </a:prstGeom>
-          <a:solidFill>
-            <a:schemeClr val="tx1">
-              <a:lumMod val="75000"/>
-              <a:lumOff val="25000"/>
-            </a:schemeClr>
-          </a:solidFill>
-          <a:ln w="19050"/>
+          <a:noFill/>
         </p:spPr>
-        <p:style>
-          <a:lnRef idx="3">
-            <a:schemeClr val="lt1"/>
-          </a:lnRef>
-          <a:fillRef idx="1">
-            <a:schemeClr val="accent4"/>
-          </a:fillRef>
-          <a:effectRef idx="1">
-            <a:schemeClr val="accent4"/>
-          </a:effectRef>
-          <a:fontRef idx="minor">
-            <a:schemeClr val="lt1"/>
-          </a:fontRef>
-        </p:style>
-        <p:txBody>
-          <a:bodyPr wrap="none" rtlCol="0" anchor="ctr"/>
-          <a:lstStyle/>
-          <a:p>
-            <a:pPr algn="ctr"/>
-            <a:r>
-              <a:rPr lang="de-DE" sz="1400" smtClean="0"/>
-              <a:t>CSAR Packager</a:t>
-            </a:r>
-            <a:endParaRPr lang="en-US" sz="1400"/>
-          </a:p>
-        </p:txBody>
-      </p:sp>
-      <p:sp>
-        <p:nvSpPr>
-          <p:cNvPr id="22" name="Abgerundetes Rechteck 21"/>
-          <p:cNvSpPr/>
-          <p:nvPr/>
-        </p:nvSpPr>
-        <p:spPr>
-          <a:xfrm>
-            <a:off x="197989" y="3402191"/>
-            <a:ext cx="1641960" cy="805180"/>
-          </a:xfrm>
-          <a:prstGeom prst="roundRect">
-            <a:avLst/>
-          </a:prstGeom>
-          <a:solidFill>
-            <a:schemeClr val="tx1">
-              <a:lumMod val="75000"/>
-              <a:lumOff val="25000"/>
-            </a:schemeClr>
-          </a:solidFill>
-          <a:ln w="19050"/>
-        </p:spPr>
-        <p:style>
-          <a:lnRef idx="3">
-            <a:schemeClr val="lt1"/>
-          </a:lnRef>
-          <a:fillRef idx="1">
-            <a:schemeClr val="accent4"/>
-          </a:fillRef>
-          <a:effectRef idx="1">
-            <a:schemeClr val="accent4"/>
-          </a:effectRef>
-          <a:fontRef idx="minor">
-            <a:schemeClr val="lt1"/>
-          </a:fontRef>
-        </p:style>
-        <p:txBody>
-          <a:bodyPr rtlCol="0" anchor="ctr"/>
-          <a:lstStyle/>
-          <a:p>
-            <a:pPr algn="ctr"/>
-            <a:r>
-              <a:rPr lang="de-DE" sz="1400" dirty="0" err="1" smtClean="0"/>
-              <a:t>Node</a:t>
-            </a:r>
-            <a:r>
-              <a:rPr lang="de-DE" sz="1400" dirty="0" smtClean="0"/>
-              <a:t> </a:t>
-            </a:r>
-            <a:r>
-              <a:rPr lang="de-DE" sz="1400" dirty="0" err="1" smtClean="0"/>
-              <a:t>Injection</a:t>
-            </a:r>
-            <a:endParaRPr lang="en-US" sz="1400" dirty="0"/>
-          </a:p>
-        </p:txBody>
-      </p:sp>
-      <p:sp>
-        <p:nvSpPr>
-          <p:cNvPr id="23" name="Abgerundetes Rechteck 22"/>
-          <p:cNvSpPr/>
-          <p:nvPr/>
-        </p:nvSpPr>
-        <p:spPr>
-          <a:xfrm>
-            <a:off x="1968225" y="5157192"/>
-            <a:ext cx="1641960" cy="805180"/>
-          </a:xfrm>
-          <a:prstGeom prst="roundRect">
-            <a:avLst/>
-          </a:prstGeom>
-          <a:solidFill>
-            <a:schemeClr val="tx1">
-              <a:lumMod val="75000"/>
-              <a:lumOff val="25000"/>
-            </a:schemeClr>
-          </a:solidFill>
-          <a:ln w="19050"/>
-        </p:spPr>
-        <p:style>
-          <a:lnRef idx="3">
-            <a:schemeClr val="lt1"/>
-          </a:lnRef>
-          <a:fillRef idx="1">
-            <a:schemeClr val="accent4"/>
-          </a:fillRef>
-          <a:effectRef idx="1">
-            <a:schemeClr val="accent4"/>
-          </a:effectRef>
-          <a:fontRef idx="minor">
-            <a:schemeClr val="lt1"/>
-          </a:fontRef>
-        </p:style>
-        <p:txBody>
-          <a:bodyPr wrap="none" rtlCol="0" anchor="ctr"/>
-          <a:lstStyle/>
-          <a:p>
-            <a:pPr algn="ctr"/>
-            <a:r>
-              <a:rPr lang="de-DE" sz="1400" dirty="0" err="1" smtClean="0"/>
-              <a:t>Versioning</a:t>
-            </a:r>
-            <a:r>
-              <a:rPr lang="de-DE" sz="1400" dirty="0" smtClean="0"/>
-              <a:t> &amp;</a:t>
-            </a:r>
-            <a:br>
-              <a:rPr lang="de-DE" sz="1400" dirty="0" smtClean="0"/>
-            </a:br>
-            <a:r>
-              <a:rPr lang="de-DE" sz="1400" dirty="0" err="1" smtClean="0"/>
-              <a:t>Difference</a:t>
-            </a:r>
-            <a:r>
-              <a:rPr lang="de-DE" sz="1400" dirty="0"/>
-              <a:t/>
-            </a:r>
-            <a:br>
-              <a:rPr lang="de-DE" sz="1400" dirty="0"/>
-            </a:br>
-            <a:r>
-              <a:rPr lang="de-DE" sz="1400" dirty="0" err="1" smtClean="0"/>
-              <a:t>Calculation</a:t>
+        <p:txBody>
+          <a:bodyPr wrap="square" rtlCol="0">
+            <a:spAutoFit/>
+          </a:bodyPr>
+          <a:lstStyle/>
+          <a:p>
+            <a:r>
+              <a:rPr lang="en-US" sz="1400" dirty="0" smtClean="0"/>
+              <a:t>Functionality provided by the </a:t>
+            </a:r>
+            <a:r>
+              <a:rPr lang="en-US" sz="1400" dirty="0" err="1" smtClean="0"/>
+              <a:t>OpenTOSCA</a:t>
+            </a:r>
+            <a:r>
+              <a:rPr lang="en-US" sz="1400" dirty="0" smtClean="0"/>
+              <a:t> Container and usable in the Winery if a Container instance is running</a:t>
             </a:r>
             <a:endParaRPr lang="en-US" sz="1400" dirty="0"/>
           </a:p>
@@ -4463,6 +5374,13 @@
   <p:clrMapOvr>
     <a:masterClrMapping/>
   </p:clrMapOvr>
+  <p:timing>
+    <p:tnLst>
+      <p:par>
+        <p:cTn id="1" dur="indefinite" restart="never" nodeType="tmRoot"/>
+      </p:par>
+    </p:tnLst>
+  </p:timing>
 </p:sld>
 </file>
 
@@ -4749,4 +5667,265 @@
   <a:objectDefaults/>
   <a:extraClrSchemeLst/>
 </a:theme>
+</file>
+
+<file path=ppt/theme/theme2.xml><?xml version="1.0" encoding="utf-8"?>
+<a:theme xmlns:a="http://schemas.openxmlformats.org/drawingml/2006/main" name="Office">
+  <a:themeElements>
+    <a:clrScheme name="Office">
+      <a:dk1>
+        <a:sysClr val="windowText" lastClr="000000"/>
+      </a:dk1>
+      <a:lt1>
+        <a:sysClr val="window" lastClr="FFFFFF"/>
+      </a:lt1>
+      <a:dk2>
+        <a:srgbClr val="44546A"/>
+      </a:dk2>
+      <a:lt2>
+        <a:srgbClr val="E7E6E6"/>
+      </a:lt2>
+      <a:accent1>
+        <a:srgbClr val="5B9BD5"/>
+      </a:accent1>
+      <a:accent2>
+        <a:srgbClr val="ED7D31"/>
+      </a:accent2>
+      <a:accent3>
+        <a:srgbClr val="A5A5A5"/>
+      </a:accent3>
+      <a:accent4>
+        <a:srgbClr val="FFC000"/>
+      </a:accent4>
+      <a:accent5>
+        <a:srgbClr val="4472C4"/>
+      </a:accent5>
+      <a:accent6>
+        <a:srgbClr val="70AD47"/>
+      </a:accent6>
+      <a:hlink>
+        <a:srgbClr val="0563C1"/>
+      </a:hlink>
+      <a:folHlink>
+        <a:srgbClr val="954F72"/>
+      </a:folHlink>
+    </a:clrScheme>
+    <a:fontScheme name="Office">
+      <a:majorFont>
+        <a:latin typeface="Calibri Light" panose="020F0302020204030204"/>
+        <a:ea typeface=""/>
+        <a:cs typeface=""/>
+        <a:font script="Jpan" typeface="游ゴシック Light"/>
+        <a:font script="Hang" typeface="맑은 고딕"/>
+        <a:font script="Hans" typeface="等线 Light"/>
+        <a:font script="Hant" typeface="新細明體"/>
+        <a:font script="Arab" typeface="Times New Roman"/>
+        <a:font script="Hebr" typeface="Times New Roman"/>
+        <a:font script="Thai" typeface="Angsana New"/>
+        <a:font script="Ethi" typeface="Nyala"/>
+        <a:font script="Beng" typeface="Vrinda"/>
+        <a:font script="Gujr" typeface="Shruti"/>
+        <a:font script="Khmr" typeface="MoolBoran"/>
+        <a:font script="Knda" typeface="Tunga"/>
+        <a:font script="Guru" typeface="Raavi"/>
+        <a:font script="Cans" typeface="Euphemia"/>
+        <a:font script="Cher" typeface="Plantagenet Cherokee"/>
+        <a:font script="Yiii" typeface="Microsoft Yi Baiti"/>
+        <a:font script="Tibt" typeface="Microsoft Himalaya"/>
+        <a:font script="Thaa" typeface="MV Boli"/>
+        <a:font script="Deva" typeface="Mangal"/>
+        <a:font script="Telu" typeface="Gautami"/>
+        <a:font script="Taml" typeface="Latha"/>
+        <a:font script="Syrc" typeface="Estrangelo Edessa"/>
+        <a:font script="Orya" typeface="Kalinga"/>
+        <a:font script="Mlym" typeface="Kartika"/>
+        <a:font script="Laoo" typeface="DokChampa"/>
+        <a:font script="Sinh" typeface="Iskoola Pota"/>
+        <a:font script="Mong" typeface="Mongolian Baiti"/>
+        <a:font script="Viet" typeface="Times New Roman"/>
+        <a:font script="Uigh" typeface="Microsoft Uighur"/>
+        <a:font script="Geor" typeface="Sylfaen"/>
+      </a:majorFont>
+      <a:minorFont>
+        <a:latin typeface="Calibri" panose="020F0502020204030204"/>
+        <a:ea typeface=""/>
+        <a:cs typeface=""/>
+        <a:font script="Jpan" typeface="游ゴシック"/>
+        <a:font script="Hang" typeface="맑은 고딕"/>
+        <a:font script="Hans" typeface="等线"/>
+        <a:font script="Hant" typeface="新細明體"/>
+        <a:font script="Arab" typeface="Arial"/>
+        <a:font script="Hebr" typeface="Arial"/>
+        <a:font script="Thai" typeface="Cordia New"/>
+        <a:font script="Ethi" typeface="Nyala"/>
+        <a:font script="Beng" typeface="Vrinda"/>
+        <a:font script="Gujr" typeface="Shruti"/>
+        <a:font script="Khmr" typeface="DaunPenh"/>
+        <a:font script="Knda" typeface="Tunga"/>
+        <a:font script="Guru" typeface="Raavi"/>
+        <a:font script="Cans" typeface="Euphemia"/>
+        <a:font script="Cher" typeface="Plantagenet Cherokee"/>
+        <a:font script="Yiii" typeface="Microsoft Yi Baiti"/>
+        <a:font script="Tibt" typeface="Microsoft Himalaya"/>
+        <a:font script="Thaa" typeface="MV Boli"/>
+        <a:font script="Deva" typeface="Mangal"/>
+        <a:font script="Telu" typeface="Gautami"/>
+        <a:font script="Taml" typeface="Latha"/>
+        <a:font script="Syrc" typeface="Estrangelo Edessa"/>
+        <a:font script="Orya" typeface="Kalinga"/>
+        <a:font script="Mlym" typeface="Kartika"/>
+        <a:font script="Laoo" typeface="DokChampa"/>
+        <a:font script="Sinh" typeface="Iskoola Pota"/>
+        <a:font script="Mong" typeface="Mongolian Baiti"/>
+        <a:font script="Viet" typeface="Arial"/>
+        <a:font script="Uigh" typeface="Microsoft Uighur"/>
+        <a:font script="Geor" typeface="Sylfaen"/>
+      </a:minorFont>
+    </a:fontScheme>
+    <a:fmtScheme name="Office">
+      <a:fillStyleLst>
+        <a:solidFill>
+          <a:schemeClr val="phClr"/>
+        </a:solidFill>
+        <a:gradFill rotWithShape="1">
+          <a:gsLst>
+            <a:gs pos="0">
+              <a:schemeClr val="phClr">
+                <a:lumMod val="110000"/>
+                <a:satMod val="105000"/>
+                <a:tint val="67000"/>
+              </a:schemeClr>
+            </a:gs>
+            <a:gs pos="50000">
+              <a:schemeClr val="phClr">
+                <a:lumMod val="105000"/>
+                <a:satMod val="103000"/>
+                <a:tint val="73000"/>
+              </a:schemeClr>
+            </a:gs>
+            <a:gs pos="100000">
+              <a:schemeClr val="phClr">
+                <a:lumMod val="105000"/>
+                <a:satMod val="109000"/>
+                <a:tint val="81000"/>
+              </a:schemeClr>
+            </a:gs>
+          </a:gsLst>
+          <a:lin ang="5400000" scaled="0"/>
+        </a:gradFill>
+        <a:gradFill rotWithShape="1">
+          <a:gsLst>
+            <a:gs pos="0">
+              <a:schemeClr val="phClr">
+                <a:satMod val="103000"/>
+                <a:lumMod val="102000"/>
+                <a:tint val="94000"/>
+              </a:schemeClr>
+            </a:gs>
+            <a:gs pos="50000">
+              <a:schemeClr val="phClr">
+                <a:satMod val="110000"/>
+                <a:lumMod val="100000"/>
+                <a:shade val="100000"/>
+              </a:schemeClr>
+            </a:gs>
+            <a:gs pos="100000">
+              <a:schemeClr val="phClr">
+                <a:lumMod val="99000"/>
+                <a:satMod val="120000"/>
+                <a:shade val="78000"/>
+              </a:schemeClr>
+            </a:gs>
+          </a:gsLst>
+          <a:lin ang="5400000" scaled="0"/>
+        </a:gradFill>
+      </a:fillStyleLst>
+      <a:lnStyleLst>
+        <a:ln w="6350" cap="flat" cmpd="sng" algn="ctr">
+          <a:solidFill>
+            <a:schemeClr val="phClr"/>
+          </a:solidFill>
+          <a:prstDash val="solid"/>
+          <a:miter lim="800000"/>
+        </a:ln>
+        <a:ln w="12700" cap="flat" cmpd="sng" algn="ctr">
+          <a:solidFill>
+            <a:schemeClr val="phClr"/>
+          </a:solidFill>
+          <a:prstDash val="solid"/>
+          <a:miter lim="800000"/>
+        </a:ln>
+        <a:ln w="19050" cap="flat" cmpd="sng" algn="ctr">
+          <a:solidFill>
+            <a:schemeClr val="phClr"/>
+          </a:solidFill>
+          <a:prstDash val="solid"/>
+          <a:miter lim="800000"/>
+        </a:ln>
+      </a:lnStyleLst>
+      <a:effectStyleLst>
+        <a:effectStyle>
+          <a:effectLst/>
+        </a:effectStyle>
+        <a:effectStyle>
+          <a:effectLst/>
+        </a:effectStyle>
+        <a:effectStyle>
+          <a:effectLst>
+            <a:outerShdw blurRad="57150" dist="19050" dir="5400000" algn="ctr" rotWithShape="0">
+              <a:srgbClr val="000000">
+                <a:alpha val="63000"/>
+              </a:srgbClr>
+            </a:outerShdw>
+          </a:effectLst>
+        </a:effectStyle>
+      </a:effectStyleLst>
+      <a:bgFillStyleLst>
+        <a:solidFill>
+          <a:schemeClr val="phClr"/>
+        </a:solidFill>
+        <a:solidFill>
+          <a:schemeClr val="phClr">
+            <a:tint val="95000"/>
+            <a:satMod val="170000"/>
+          </a:schemeClr>
+        </a:solidFill>
+        <a:gradFill rotWithShape="1">
+          <a:gsLst>
+            <a:gs pos="0">
+              <a:schemeClr val="phClr">
+                <a:tint val="93000"/>
+                <a:satMod val="150000"/>
+                <a:shade val="98000"/>
+                <a:lumMod val="102000"/>
+              </a:schemeClr>
+            </a:gs>
+            <a:gs pos="50000">
+              <a:schemeClr val="phClr">
+                <a:tint val="98000"/>
+                <a:satMod val="130000"/>
+                <a:shade val="90000"/>
+                <a:lumMod val="103000"/>
+              </a:schemeClr>
+            </a:gs>
+            <a:gs pos="100000">
+              <a:schemeClr val="phClr">
+                <a:shade val="63000"/>
+                <a:satMod val="120000"/>
+              </a:schemeClr>
+            </a:gs>
+          </a:gsLst>
+          <a:lin ang="5400000" scaled="0"/>
+        </a:gradFill>
+      </a:bgFillStyleLst>
+    </a:fmtScheme>
+  </a:themeElements>
+  <a:objectDefaults/>
+  <a:extraClrSchemeLst/>
+  <a:extLst>
+    <a:ext uri="{05A4C25C-085E-4340-85A3-A5531E510DB2}">
+      <thm15:themeFamily xmlns:thm15="http://schemas.microsoft.com/office/thememl/2012/main" name="Office Theme" id="{62F939B6-93AF-4DB8-9C6B-D6C7DFDC589F}" vid="{4A3C46E8-61CC-4603-A589-7422A47A8E4A}"/>
+    </a:ext>
+  </a:extLst>
+</a:theme>
 </file>
</xml_diff>

<commit_message>
Update Overview Winery Architecture documentation (#357)
* update Winery component overview and their descriptions in the documentation


Signed-off-by: Karoline Saatkamp <karoline.saatkamp@iaas.uni-stuttgart.de>

* update description of accountability

Signed-off-by: Karoline Saatkamp <karoline.saatkamp@iaas.uni-stuttgart.de>
</commit_message>
<xml_diff>
--- a/docs/user/graphics/pptx/components.pptx
+++ b/docs/user/graphics/pptx/components.pptx
@@ -4,10 +4,13 @@
   <p:sldMasterIdLst>
     <p:sldMasterId id="2147483648" r:id="rId1"/>
   </p:sldMasterIdLst>
+  <p:notesMasterIdLst>
+    <p:notesMasterId r:id="rId3"/>
+  </p:notesMasterIdLst>
   <p:sldIdLst>
     <p:sldId id="256" r:id="rId2"/>
   </p:sldIdLst>
-  <p:sldSz cx="9144000" cy="6858000" type="screen4x3"/>
+  <p:sldSz cx="10475913" cy="7091363"/>
   <p:notesSz cx="6858000" cy="9144000"/>
   <p:defaultTextStyle>
     <a:defPPr>
@@ -107,12 +110,12 @@
   <p:extLst>
     <p:ext uri="{EFAFB233-063F-42B5-8137-9DF3F51BA10A}">
       <p15:sldGuideLst xmlns:p15="http://schemas.microsoft.com/office/powerpoint/2012/main">
-        <p15:guide id="1" orient="horz" pos="2160">
+        <p15:guide id="1" orient="horz" pos="2234" userDrawn="1">
           <p15:clr>
             <a:srgbClr val="A4A3A4"/>
           </p15:clr>
         </p15:guide>
-        <p15:guide id="2" pos="2880">
+        <p15:guide id="2" pos="3300" userDrawn="1">
           <p15:clr>
             <a:srgbClr val="A4A3A4"/>
           </p15:clr>
@@ -121,6 +124,457 @@
     </p:ext>
   </p:extLst>
 </p:presentation>
+</file>
+
+<file path=ppt/commentAuthors.xml><?xml version="1.0" encoding="utf-8"?>
+<p:cmAuthorLst xmlns:a="http://schemas.openxmlformats.org/drawingml/2006/main" xmlns:r="http://schemas.openxmlformats.org/officeDocument/2006/relationships" xmlns:p="http://schemas.openxmlformats.org/presentationml/2006/main">
+  <p:cmAuthor id="1" name="Karoline Saatkamp" initials="KS" lastIdx="1" clrIdx="0">
+    <p:extLst>
+      <p:ext uri="{19B8F6BF-5375-455C-9EA6-DF929625EA0E}">
+        <p15:presenceInfo xmlns:p15="http://schemas.microsoft.com/office/powerpoint/2012/main" userId="Karoline Saatkamp" providerId="None"/>
+      </p:ext>
+    </p:extLst>
+  </p:cmAuthor>
+</p:cmAuthorLst>
+</file>
+
+<file path=ppt/notesMasters/notesMaster1.xml><?xml version="1.0" encoding="utf-8"?>
+<p:notesMaster xmlns:a="http://schemas.openxmlformats.org/drawingml/2006/main" xmlns:r="http://schemas.openxmlformats.org/officeDocument/2006/relationships" xmlns:p="http://schemas.openxmlformats.org/presentationml/2006/main">
+  <p:cSld>
+    <p:bg>
+      <p:bgRef idx="1001">
+        <a:schemeClr val="bg1"/>
+      </p:bgRef>
+    </p:bg>
+    <p:spTree>
+      <p:nvGrpSpPr>
+        <p:cNvPr id="1" name=""/>
+        <p:cNvGrpSpPr/>
+        <p:nvPr/>
+      </p:nvGrpSpPr>
+      <p:grpSpPr>
+        <a:xfrm>
+          <a:off x="0" y="0"/>
+          <a:ext cx="0" cy="0"/>
+          <a:chOff x="0" y="0"/>
+          <a:chExt cx="0" cy="0"/>
+        </a:xfrm>
+      </p:grpSpPr>
+      <p:sp>
+        <p:nvSpPr>
+          <p:cNvPr id="2" name="Kopfzeilenplatzhalter 1"/>
+          <p:cNvSpPr>
+            <a:spLocks noGrp="1"/>
+          </p:cNvSpPr>
+          <p:nvPr>
+            <p:ph type="hdr" sz="quarter"/>
+          </p:nvPr>
+        </p:nvSpPr>
+        <p:spPr>
+          <a:xfrm>
+            <a:off x="0" y="0"/>
+            <a:ext cx="2971800" cy="458788"/>
+          </a:xfrm>
+          <a:prstGeom prst="rect">
+            <a:avLst/>
+          </a:prstGeom>
+        </p:spPr>
+        <p:txBody>
+          <a:bodyPr vert="horz" lIns="91440" tIns="45720" rIns="91440" bIns="45720" rtlCol="0"/>
+          <a:lstStyle>
+            <a:lvl1pPr algn="l">
+              <a:defRPr sz="1200"/>
+            </a:lvl1pPr>
+          </a:lstStyle>
+          <a:p>
+            <a:endParaRPr lang="de-DE"/>
+          </a:p>
+        </p:txBody>
+      </p:sp>
+      <p:sp>
+        <p:nvSpPr>
+          <p:cNvPr id="3" name="Datumsplatzhalter 2"/>
+          <p:cNvSpPr>
+            <a:spLocks noGrp="1"/>
+          </p:cNvSpPr>
+          <p:nvPr>
+            <p:ph type="dt" idx="1"/>
+          </p:nvPr>
+        </p:nvSpPr>
+        <p:spPr>
+          <a:xfrm>
+            <a:off x="3884613" y="0"/>
+            <a:ext cx="2971800" cy="458788"/>
+          </a:xfrm>
+          <a:prstGeom prst="rect">
+            <a:avLst/>
+          </a:prstGeom>
+        </p:spPr>
+        <p:txBody>
+          <a:bodyPr vert="horz" lIns="91440" tIns="45720" rIns="91440" bIns="45720" rtlCol="0"/>
+          <a:lstStyle>
+            <a:lvl1pPr algn="r">
+              <a:defRPr sz="1200"/>
+            </a:lvl1pPr>
+          </a:lstStyle>
+          <a:p>
+            <a:fld id="{4E77D8E0-C0BC-4A6F-93CA-871FC98A9542}" type="datetimeFigureOut">
+              <a:rPr lang="de-DE" smtClean="0"/>
+              <a:t>14.08.2018</a:t>
+            </a:fld>
+            <a:endParaRPr lang="de-DE"/>
+          </a:p>
+        </p:txBody>
+      </p:sp>
+      <p:sp>
+        <p:nvSpPr>
+          <p:cNvPr id="4" name="Folienbildplatzhalter 3"/>
+          <p:cNvSpPr>
+            <a:spLocks noGrp="1" noRot="1" noChangeAspect="1"/>
+          </p:cNvSpPr>
+          <p:nvPr>
+            <p:ph type="sldImg" idx="2"/>
+          </p:nvPr>
+        </p:nvSpPr>
+        <p:spPr>
+          <a:xfrm>
+            <a:off x="1150938" y="1143000"/>
+            <a:ext cx="4556125" cy="3086100"/>
+          </a:xfrm>
+          <a:prstGeom prst="rect">
+            <a:avLst/>
+          </a:prstGeom>
+          <a:noFill/>
+          <a:ln w="12700">
+            <a:solidFill>
+              <a:prstClr val="black"/>
+            </a:solidFill>
+          </a:ln>
+        </p:spPr>
+        <p:txBody>
+          <a:bodyPr vert="horz" lIns="91440" tIns="45720" rIns="91440" bIns="45720" rtlCol="0" anchor="ctr"/>
+          <a:lstStyle/>
+          <a:p>
+            <a:endParaRPr lang="de-DE"/>
+          </a:p>
+        </p:txBody>
+      </p:sp>
+      <p:sp>
+        <p:nvSpPr>
+          <p:cNvPr id="5" name="Notizenplatzhalter 4"/>
+          <p:cNvSpPr>
+            <a:spLocks noGrp="1"/>
+          </p:cNvSpPr>
+          <p:nvPr>
+            <p:ph type="body" sz="quarter" idx="3"/>
+          </p:nvPr>
+        </p:nvSpPr>
+        <p:spPr>
+          <a:xfrm>
+            <a:off x="685800" y="4400550"/>
+            <a:ext cx="5486400" cy="3600450"/>
+          </a:xfrm>
+          <a:prstGeom prst="rect">
+            <a:avLst/>
+          </a:prstGeom>
+        </p:spPr>
+        <p:txBody>
+          <a:bodyPr vert="horz" lIns="91440" tIns="45720" rIns="91440" bIns="45720" rtlCol="0"/>
+          <a:lstStyle/>
+          <a:p>
+            <a:pPr lvl="0"/>
+            <a:r>
+              <a:rPr lang="de-DE" smtClean="0"/>
+              <a:t>Formatvorlagen des Textmasters bearbeiten</a:t>
+            </a:r>
+          </a:p>
+          <a:p>
+            <a:pPr lvl="1"/>
+            <a:r>
+              <a:rPr lang="de-DE" smtClean="0"/>
+              <a:t>Zweite Ebene</a:t>
+            </a:r>
+          </a:p>
+          <a:p>
+            <a:pPr lvl="2"/>
+            <a:r>
+              <a:rPr lang="de-DE" smtClean="0"/>
+              <a:t>Dritte Ebene</a:t>
+            </a:r>
+          </a:p>
+          <a:p>
+            <a:pPr lvl="3"/>
+            <a:r>
+              <a:rPr lang="de-DE" smtClean="0"/>
+              <a:t>Vierte Ebene</a:t>
+            </a:r>
+          </a:p>
+          <a:p>
+            <a:pPr lvl="4"/>
+            <a:r>
+              <a:rPr lang="de-DE" smtClean="0"/>
+              <a:t>Fünfte Ebene</a:t>
+            </a:r>
+            <a:endParaRPr lang="de-DE"/>
+          </a:p>
+        </p:txBody>
+      </p:sp>
+      <p:sp>
+        <p:nvSpPr>
+          <p:cNvPr id="6" name="Fußzeilenplatzhalter 5"/>
+          <p:cNvSpPr>
+            <a:spLocks noGrp="1"/>
+          </p:cNvSpPr>
+          <p:nvPr>
+            <p:ph type="ftr" sz="quarter" idx="4"/>
+          </p:nvPr>
+        </p:nvSpPr>
+        <p:spPr>
+          <a:xfrm>
+            <a:off x="0" y="8685213"/>
+            <a:ext cx="2971800" cy="458787"/>
+          </a:xfrm>
+          <a:prstGeom prst="rect">
+            <a:avLst/>
+          </a:prstGeom>
+        </p:spPr>
+        <p:txBody>
+          <a:bodyPr vert="horz" lIns="91440" tIns="45720" rIns="91440" bIns="45720" rtlCol="0" anchor="b"/>
+          <a:lstStyle>
+            <a:lvl1pPr algn="l">
+              <a:defRPr sz="1200"/>
+            </a:lvl1pPr>
+          </a:lstStyle>
+          <a:p>
+            <a:endParaRPr lang="de-DE"/>
+          </a:p>
+        </p:txBody>
+      </p:sp>
+      <p:sp>
+        <p:nvSpPr>
+          <p:cNvPr id="7" name="Foliennummernplatzhalter 6"/>
+          <p:cNvSpPr>
+            <a:spLocks noGrp="1"/>
+          </p:cNvSpPr>
+          <p:nvPr>
+            <p:ph type="sldNum" sz="quarter" idx="5"/>
+          </p:nvPr>
+        </p:nvSpPr>
+        <p:spPr>
+          <a:xfrm>
+            <a:off x="3884613" y="8685213"/>
+            <a:ext cx="2971800" cy="458787"/>
+          </a:xfrm>
+          <a:prstGeom prst="rect">
+            <a:avLst/>
+          </a:prstGeom>
+        </p:spPr>
+        <p:txBody>
+          <a:bodyPr vert="horz" lIns="91440" tIns="45720" rIns="91440" bIns="45720" rtlCol="0" anchor="b"/>
+          <a:lstStyle>
+            <a:lvl1pPr algn="r">
+              <a:defRPr sz="1200"/>
+            </a:lvl1pPr>
+          </a:lstStyle>
+          <a:p>
+            <a:fld id="{CEC5B71D-80D6-4051-B7D2-850AE3DB8F5C}" type="slidenum">
+              <a:rPr lang="de-DE" smtClean="0"/>
+              <a:t>‹Nr.›</a:t>
+            </a:fld>
+            <a:endParaRPr lang="de-DE"/>
+          </a:p>
+        </p:txBody>
+      </p:sp>
+    </p:spTree>
+    <p:extLst>
+      <p:ext uri="{BB962C8B-B14F-4D97-AF65-F5344CB8AC3E}">
+        <p14:creationId xmlns:p14="http://schemas.microsoft.com/office/powerpoint/2010/main" val="1543317004"/>
+      </p:ext>
+    </p:extLst>
+  </p:cSld>
+  <p:clrMap bg1="lt1" tx1="dk1" bg2="lt2" tx2="dk2" accent1="accent1" accent2="accent2" accent3="accent3" accent4="accent4" accent5="accent5" accent6="accent6" hlink="hlink" folHlink="folHlink"/>
+  <p:notesStyle>
+    <a:lvl1pPr marL="0" algn="l" defTabSz="914400" rtl="0" eaLnBrk="1" latinLnBrk="0" hangingPunct="1">
+      <a:defRPr sz="1200" kern="1200">
+        <a:solidFill>
+          <a:schemeClr val="tx1"/>
+        </a:solidFill>
+        <a:latin typeface="+mn-lt"/>
+        <a:ea typeface="+mn-ea"/>
+        <a:cs typeface="+mn-cs"/>
+      </a:defRPr>
+    </a:lvl1pPr>
+    <a:lvl2pPr marL="457200" algn="l" defTabSz="914400" rtl="0" eaLnBrk="1" latinLnBrk="0" hangingPunct="1">
+      <a:defRPr sz="1200" kern="1200">
+        <a:solidFill>
+          <a:schemeClr val="tx1"/>
+        </a:solidFill>
+        <a:latin typeface="+mn-lt"/>
+        <a:ea typeface="+mn-ea"/>
+        <a:cs typeface="+mn-cs"/>
+      </a:defRPr>
+    </a:lvl2pPr>
+    <a:lvl3pPr marL="914400" algn="l" defTabSz="914400" rtl="0" eaLnBrk="1" latinLnBrk="0" hangingPunct="1">
+      <a:defRPr sz="1200" kern="1200">
+        <a:solidFill>
+          <a:schemeClr val="tx1"/>
+        </a:solidFill>
+        <a:latin typeface="+mn-lt"/>
+        <a:ea typeface="+mn-ea"/>
+        <a:cs typeface="+mn-cs"/>
+      </a:defRPr>
+    </a:lvl3pPr>
+    <a:lvl4pPr marL="1371600" algn="l" defTabSz="914400" rtl="0" eaLnBrk="1" latinLnBrk="0" hangingPunct="1">
+      <a:defRPr sz="1200" kern="1200">
+        <a:solidFill>
+          <a:schemeClr val="tx1"/>
+        </a:solidFill>
+        <a:latin typeface="+mn-lt"/>
+        <a:ea typeface="+mn-ea"/>
+        <a:cs typeface="+mn-cs"/>
+      </a:defRPr>
+    </a:lvl4pPr>
+    <a:lvl5pPr marL="1828800" algn="l" defTabSz="914400" rtl="0" eaLnBrk="1" latinLnBrk="0" hangingPunct="1">
+      <a:defRPr sz="1200" kern="1200">
+        <a:solidFill>
+          <a:schemeClr val="tx1"/>
+        </a:solidFill>
+        <a:latin typeface="+mn-lt"/>
+        <a:ea typeface="+mn-ea"/>
+        <a:cs typeface="+mn-cs"/>
+      </a:defRPr>
+    </a:lvl5pPr>
+    <a:lvl6pPr marL="2286000" algn="l" defTabSz="914400" rtl="0" eaLnBrk="1" latinLnBrk="0" hangingPunct="1">
+      <a:defRPr sz="1200" kern="1200">
+        <a:solidFill>
+          <a:schemeClr val="tx1"/>
+        </a:solidFill>
+        <a:latin typeface="+mn-lt"/>
+        <a:ea typeface="+mn-ea"/>
+        <a:cs typeface="+mn-cs"/>
+      </a:defRPr>
+    </a:lvl6pPr>
+    <a:lvl7pPr marL="2743200" algn="l" defTabSz="914400" rtl="0" eaLnBrk="1" latinLnBrk="0" hangingPunct="1">
+      <a:defRPr sz="1200" kern="1200">
+        <a:solidFill>
+          <a:schemeClr val="tx1"/>
+        </a:solidFill>
+        <a:latin typeface="+mn-lt"/>
+        <a:ea typeface="+mn-ea"/>
+        <a:cs typeface="+mn-cs"/>
+      </a:defRPr>
+    </a:lvl7pPr>
+    <a:lvl8pPr marL="3200400" algn="l" defTabSz="914400" rtl="0" eaLnBrk="1" latinLnBrk="0" hangingPunct="1">
+      <a:defRPr sz="1200" kern="1200">
+        <a:solidFill>
+          <a:schemeClr val="tx1"/>
+        </a:solidFill>
+        <a:latin typeface="+mn-lt"/>
+        <a:ea typeface="+mn-ea"/>
+        <a:cs typeface="+mn-cs"/>
+      </a:defRPr>
+    </a:lvl8pPr>
+    <a:lvl9pPr marL="3657600" algn="l" defTabSz="914400" rtl="0" eaLnBrk="1" latinLnBrk="0" hangingPunct="1">
+      <a:defRPr sz="1200" kern="1200">
+        <a:solidFill>
+          <a:schemeClr val="tx1"/>
+        </a:solidFill>
+        <a:latin typeface="+mn-lt"/>
+        <a:ea typeface="+mn-ea"/>
+        <a:cs typeface="+mn-cs"/>
+      </a:defRPr>
+    </a:lvl9pPr>
+  </p:notesStyle>
+</p:notesMaster>
+</file>
+
+<file path=ppt/notesSlides/notesSlide1.xml><?xml version="1.0" encoding="utf-8"?>
+<p:notes xmlns:a="http://schemas.openxmlformats.org/drawingml/2006/main" xmlns:r="http://schemas.openxmlformats.org/officeDocument/2006/relationships" xmlns:p="http://schemas.openxmlformats.org/presentationml/2006/main">
+  <p:cSld>
+    <p:spTree>
+      <p:nvGrpSpPr>
+        <p:cNvPr id="1" name=""/>
+        <p:cNvGrpSpPr/>
+        <p:nvPr/>
+      </p:nvGrpSpPr>
+      <p:grpSpPr>
+        <a:xfrm>
+          <a:off x="0" y="0"/>
+          <a:ext cx="0" cy="0"/>
+          <a:chOff x="0" y="0"/>
+          <a:chExt cx="0" cy="0"/>
+        </a:xfrm>
+      </p:grpSpPr>
+      <p:sp>
+        <p:nvSpPr>
+          <p:cNvPr id="2" name="Folienbildplatzhalter 1"/>
+          <p:cNvSpPr>
+            <a:spLocks noGrp="1" noRot="1" noChangeAspect="1"/>
+          </p:cNvSpPr>
+          <p:nvPr>
+            <p:ph type="sldImg"/>
+          </p:nvPr>
+        </p:nvSpPr>
+        <p:spPr>
+          <a:xfrm>
+            <a:off x="1150938" y="1143000"/>
+            <a:ext cx="4556125" cy="3086100"/>
+          </a:xfrm>
+        </p:spPr>
+      </p:sp>
+      <p:sp>
+        <p:nvSpPr>
+          <p:cNvPr id="3" name="Notizenplatzhalter 2"/>
+          <p:cNvSpPr>
+            <a:spLocks noGrp="1"/>
+          </p:cNvSpPr>
+          <p:nvPr>
+            <p:ph type="body" idx="1"/>
+          </p:nvPr>
+        </p:nvSpPr>
+        <p:spPr/>
+        <p:txBody>
+          <a:bodyPr/>
+          <a:lstStyle/>
+          <a:p>
+            <a:endParaRPr lang="de-DE" dirty="0"/>
+          </a:p>
+        </p:txBody>
+      </p:sp>
+      <p:sp>
+        <p:nvSpPr>
+          <p:cNvPr id="4" name="Foliennummernplatzhalter 3"/>
+          <p:cNvSpPr>
+            <a:spLocks noGrp="1"/>
+          </p:cNvSpPr>
+          <p:nvPr>
+            <p:ph type="sldNum" sz="quarter" idx="10"/>
+          </p:nvPr>
+        </p:nvSpPr>
+        <p:spPr/>
+        <p:txBody>
+          <a:bodyPr/>
+          <a:lstStyle/>
+          <a:p>
+            <a:fld id="{CEC5B71D-80D6-4051-B7D2-850AE3DB8F5C}" type="slidenum">
+              <a:rPr lang="de-DE" smtClean="0"/>
+              <a:t>1</a:t>
+            </a:fld>
+            <a:endParaRPr lang="de-DE"/>
+          </a:p>
+        </p:txBody>
+      </p:sp>
+    </p:spTree>
+    <p:extLst>
+      <p:ext uri="{BB962C8B-B14F-4D97-AF65-F5344CB8AC3E}">
+        <p14:creationId xmlns:p14="http://schemas.microsoft.com/office/powerpoint/2010/main" val="531137550"/>
+      </p:ext>
+    </p:extLst>
+  </p:cSld>
+  <p:clrMapOvr>
+    <a:masterClrMapping/>
+  </p:clrMapOvr>
+</p:notes>
 </file>
 
 <file path=ppt/slideLayouts/slideLayout1.xml><?xml version="1.0" encoding="utf-8"?>
@@ -152,8 +606,8 @@
         </p:nvSpPr>
         <p:spPr>
           <a:xfrm>
-            <a:off x="685800" y="2130425"/>
-            <a:ext cx="7772400" cy="1470025"/>
+            <a:off x="785694" y="2202920"/>
+            <a:ext cx="8904526" cy="1520047"/>
           </a:xfrm>
         </p:spPr>
         <p:txBody>
@@ -180,8 +634,8 @@
         </p:nvSpPr>
         <p:spPr>
           <a:xfrm>
-            <a:off x="1371600" y="3886200"/>
-            <a:ext cx="6400800" cy="1752600"/>
+            <a:off x="1571387" y="4018440"/>
+            <a:ext cx="7333139" cy="1812237"/>
           </a:xfrm>
         </p:spPr>
         <p:txBody>
@@ -304,7 +758,7 @@
           <a:p>
             <a:fld id="{09AC0643-DE81-41EA-8FE0-662F1E2075D0}" type="datetimeFigureOut">
               <a:rPr lang="en-US" smtClean="0"/>
-              <a:t>4/25/2018</a:t>
+              <a:t>8/14/2018</a:t>
             </a:fld>
             <a:endParaRPr lang="en-US"/>
           </a:p>
@@ -474,7 +928,7 @@
           <a:p>
             <a:fld id="{09AC0643-DE81-41EA-8FE0-662F1E2075D0}" type="datetimeFigureOut">
               <a:rPr lang="en-US" smtClean="0"/>
-              <a:t>4/25/2018</a:t>
+              <a:t>8/14/2018</a:t>
             </a:fld>
             <a:endParaRPr lang="en-US"/>
           </a:p>
@@ -564,8 +1018,8 @@
         </p:nvSpPr>
         <p:spPr>
           <a:xfrm>
-            <a:off x="6629400" y="274638"/>
-            <a:ext cx="2057400" cy="5851525"/>
+            <a:off x="7595037" y="283984"/>
+            <a:ext cx="2357080" cy="6050640"/>
           </a:xfrm>
         </p:spPr>
         <p:txBody>
@@ -592,8 +1046,8 @@
         </p:nvSpPr>
         <p:spPr>
           <a:xfrm>
-            <a:off x="457200" y="274638"/>
-            <a:ext cx="6019800" cy="5851525"/>
+            <a:off x="523796" y="283984"/>
+            <a:ext cx="6896643" cy="6050640"/>
           </a:xfrm>
         </p:spPr>
         <p:txBody>
@@ -654,7 +1108,7 @@
           <a:p>
             <a:fld id="{09AC0643-DE81-41EA-8FE0-662F1E2075D0}" type="datetimeFigureOut">
               <a:rPr lang="en-US" smtClean="0"/>
-              <a:t>4/25/2018</a:t>
+              <a:t>8/14/2018</a:t>
             </a:fld>
             <a:endParaRPr lang="en-US"/>
           </a:p>
@@ -824,7 +1278,7 @@
           <a:p>
             <a:fld id="{09AC0643-DE81-41EA-8FE0-662F1E2075D0}" type="datetimeFigureOut">
               <a:rPr lang="en-US" smtClean="0"/>
-              <a:t>4/25/2018</a:t>
+              <a:t>8/14/2018</a:t>
             </a:fld>
             <a:endParaRPr lang="en-US"/>
           </a:p>
@@ -914,8 +1368,8 @@
         </p:nvSpPr>
         <p:spPr>
           <a:xfrm>
-            <a:off x="722313" y="4406900"/>
-            <a:ext cx="7772400" cy="1362075"/>
+            <a:off x="827525" y="4556859"/>
+            <a:ext cx="8904526" cy="1408423"/>
           </a:xfrm>
         </p:spPr>
         <p:txBody>
@@ -946,8 +1400,8 @@
         </p:nvSpPr>
         <p:spPr>
           <a:xfrm>
-            <a:off x="722313" y="2906713"/>
-            <a:ext cx="7772400" cy="1500187"/>
+            <a:off x="827525" y="3005623"/>
+            <a:ext cx="8904526" cy="1551235"/>
           </a:xfrm>
         </p:spPr>
         <p:txBody>
@@ -1070,7 +1524,7 @@
           <a:p>
             <a:fld id="{09AC0643-DE81-41EA-8FE0-662F1E2075D0}" type="datetimeFigureOut">
               <a:rPr lang="en-US" smtClean="0"/>
-              <a:t>4/25/2018</a:t>
+              <a:t>8/14/2018</a:t>
             </a:fld>
             <a:endParaRPr lang="en-US"/>
           </a:p>
@@ -1183,8 +1637,8 @@
         </p:nvSpPr>
         <p:spPr>
           <a:xfrm>
-            <a:off x="457200" y="1600200"/>
-            <a:ext cx="4038600" cy="4525963"/>
+            <a:off x="523795" y="1654652"/>
+            <a:ext cx="4626862" cy="4679972"/>
           </a:xfrm>
         </p:spPr>
         <p:txBody>
@@ -1268,8 +1722,8 @@
         </p:nvSpPr>
         <p:spPr>
           <a:xfrm>
-            <a:off x="4648200" y="1600200"/>
-            <a:ext cx="4038600" cy="4525963"/>
+            <a:off x="5325256" y="1654652"/>
+            <a:ext cx="4626862" cy="4679972"/>
           </a:xfrm>
         </p:spPr>
         <p:txBody>
@@ -1358,7 +1812,7 @@
           <a:p>
             <a:fld id="{09AC0643-DE81-41EA-8FE0-662F1E2075D0}" type="datetimeFigureOut">
               <a:rPr lang="en-US" smtClean="0"/>
-              <a:t>4/25/2018</a:t>
+              <a:t>8/14/2018</a:t>
             </a:fld>
             <a:endParaRPr lang="en-US"/>
           </a:p>
@@ -1475,8 +1929,8 @@
         </p:nvSpPr>
         <p:spPr>
           <a:xfrm>
-            <a:off x="457200" y="1535113"/>
-            <a:ext cx="4040188" cy="639762"/>
+            <a:off x="523796" y="1587349"/>
+            <a:ext cx="4628681" cy="661532"/>
           </a:xfrm>
         </p:spPr>
         <p:txBody>
@@ -1540,8 +1994,8 @@
         </p:nvSpPr>
         <p:spPr>
           <a:xfrm>
-            <a:off x="457200" y="2174875"/>
-            <a:ext cx="4040188" cy="3951288"/>
+            <a:off x="523796" y="2248881"/>
+            <a:ext cx="4628681" cy="4085742"/>
           </a:xfrm>
         </p:spPr>
         <p:txBody>
@@ -1625,8 +2079,8 @@
         </p:nvSpPr>
         <p:spPr>
           <a:xfrm>
-            <a:off x="4645025" y="1535113"/>
-            <a:ext cx="4041775" cy="639762"/>
+            <a:off x="5321620" y="1587349"/>
+            <a:ext cx="4630499" cy="661532"/>
           </a:xfrm>
         </p:spPr>
         <p:txBody>
@@ -1690,8 +2144,8 @@
         </p:nvSpPr>
         <p:spPr>
           <a:xfrm>
-            <a:off x="4645025" y="2174875"/>
-            <a:ext cx="4041775" cy="3951288"/>
+            <a:off x="5321620" y="2248881"/>
+            <a:ext cx="4630499" cy="4085742"/>
           </a:xfrm>
         </p:spPr>
         <p:txBody>
@@ -1780,7 +2234,7 @@
           <a:p>
             <a:fld id="{09AC0643-DE81-41EA-8FE0-662F1E2075D0}" type="datetimeFigureOut">
               <a:rPr lang="en-US" smtClean="0"/>
-              <a:t>4/25/2018</a:t>
+              <a:t>8/14/2018</a:t>
             </a:fld>
             <a:endParaRPr lang="en-US"/>
           </a:p>
@@ -1898,7 +2352,7 @@
           <a:p>
             <a:fld id="{09AC0643-DE81-41EA-8FE0-662F1E2075D0}" type="datetimeFigureOut">
               <a:rPr lang="en-US" smtClean="0"/>
-              <a:t>4/25/2018</a:t>
+              <a:t>8/14/2018</a:t>
             </a:fld>
             <a:endParaRPr lang="en-US"/>
           </a:p>
@@ -1993,7 +2447,7 @@
           <a:p>
             <a:fld id="{09AC0643-DE81-41EA-8FE0-662F1E2075D0}" type="datetimeFigureOut">
               <a:rPr lang="en-US" smtClean="0"/>
-              <a:t>4/25/2018</a:t>
+              <a:t>8/14/2018</a:t>
             </a:fld>
             <a:endParaRPr lang="en-US"/>
           </a:p>
@@ -2083,8 +2537,8 @@
         </p:nvSpPr>
         <p:spPr>
           <a:xfrm>
-            <a:off x="457200" y="273050"/>
-            <a:ext cx="3008313" cy="1162050"/>
+            <a:off x="523797" y="282341"/>
+            <a:ext cx="3446503" cy="1201592"/>
           </a:xfrm>
         </p:spPr>
         <p:txBody>
@@ -2115,8 +2569,8 @@
         </p:nvSpPr>
         <p:spPr>
           <a:xfrm>
-            <a:off x="3575050" y="273050"/>
-            <a:ext cx="5111750" cy="5853113"/>
+            <a:off x="4095791" y="282342"/>
+            <a:ext cx="5856326" cy="6052282"/>
           </a:xfrm>
         </p:spPr>
         <p:txBody>
@@ -2200,8 +2654,8 @@
         </p:nvSpPr>
         <p:spPr>
           <a:xfrm>
-            <a:off x="457200" y="1435100"/>
-            <a:ext cx="3008313" cy="4691063"/>
+            <a:off x="523797" y="1483934"/>
+            <a:ext cx="3446503" cy="4850690"/>
           </a:xfrm>
         </p:spPr>
         <p:txBody>
@@ -2270,7 +2724,7 @@
           <a:p>
             <a:fld id="{09AC0643-DE81-41EA-8FE0-662F1E2075D0}" type="datetimeFigureOut">
               <a:rPr lang="en-US" smtClean="0"/>
-              <a:t>4/25/2018</a:t>
+              <a:t>8/14/2018</a:t>
             </a:fld>
             <a:endParaRPr lang="en-US"/>
           </a:p>
@@ -2360,8 +2814,8 @@
         </p:nvSpPr>
         <p:spPr>
           <a:xfrm>
-            <a:off x="1792288" y="4800600"/>
-            <a:ext cx="5486400" cy="566738"/>
+            <a:off x="2053352" y="4963955"/>
+            <a:ext cx="6285548" cy="586023"/>
           </a:xfrm>
         </p:spPr>
         <p:txBody>
@@ -2392,8 +2846,8 @@
         </p:nvSpPr>
         <p:spPr>
           <a:xfrm>
-            <a:off x="1792288" y="612775"/>
-            <a:ext cx="5486400" cy="4114800"/>
+            <a:off x="2053352" y="633626"/>
+            <a:ext cx="6285548" cy="4254818"/>
           </a:xfrm>
         </p:spPr>
         <p:txBody>
@@ -2453,8 +2907,8 @@
         </p:nvSpPr>
         <p:spPr>
           <a:xfrm>
-            <a:off x="1792288" y="5367338"/>
-            <a:ext cx="5486400" cy="804862"/>
+            <a:off x="2053352" y="5549977"/>
+            <a:ext cx="6285548" cy="832250"/>
           </a:xfrm>
         </p:spPr>
         <p:txBody>
@@ -2523,7 +2977,7 @@
           <a:p>
             <a:fld id="{09AC0643-DE81-41EA-8FE0-662F1E2075D0}" type="datetimeFigureOut">
               <a:rPr lang="en-US" smtClean="0"/>
-              <a:t>4/25/2018</a:t>
+              <a:t>8/14/2018</a:t>
             </a:fld>
             <a:endParaRPr lang="en-US"/>
           </a:p>
@@ -2618,8 +3072,8 @@
         </p:nvSpPr>
         <p:spPr>
           <a:xfrm>
-            <a:off x="457200" y="274638"/>
-            <a:ext cx="8229600" cy="1143000"/>
+            <a:off x="523796" y="283983"/>
+            <a:ext cx="9428322" cy="1181894"/>
           </a:xfrm>
           <a:prstGeom prst="rect">
             <a:avLst/>
@@ -2651,8 +3105,8 @@
         </p:nvSpPr>
         <p:spPr>
           <a:xfrm>
-            <a:off x="457200" y="1600200"/>
-            <a:ext cx="8229600" cy="4525963"/>
+            <a:off x="523796" y="1654652"/>
+            <a:ext cx="9428322" cy="4679972"/>
           </a:xfrm>
           <a:prstGeom prst="rect">
             <a:avLst/>
@@ -2713,8 +3167,8 @@
         </p:nvSpPr>
         <p:spPr>
           <a:xfrm>
-            <a:off x="457200" y="6356350"/>
-            <a:ext cx="2133600" cy="365125"/>
+            <a:off x="523796" y="6572645"/>
+            <a:ext cx="2444380" cy="377549"/>
           </a:xfrm>
           <a:prstGeom prst="rect">
             <a:avLst/>
@@ -2736,7 +3190,7 @@
           <a:p>
             <a:fld id="{09AC0643-DE81-41EA-8FE0-662F1E2075D0}" type="datetimeFigureOut">
               <a:rPr lang="en-US" smtClean="0"/>
-              <a:t>4/25/2018</a:t>
+              <a:t>8/14/2018</a:t>
             </a:fld>
             <a:endParaRPr lang="en-US"/>
           </a:p>
@@ -2754,8 +3208,8 @@
         </p:nvSpPr>
         <p:spPr>
           <a:xfrm>
-            <a:off x="3124200" y="6356350"/>
-            <a:ext cx="2895600" cy="365125"/>
+            <a:off x="3579271" y="6572645"/>
+            <a:ext cx="3317372" cy="377549"/>
           </a:xfrm>
           <a:prstGeom prst="rect">
             <a:avLst/>
@@ -2791,8 +3245,8 @@
         </p:nvSpPr>
         <p:spPr>
           <a:xfrm>
-            <a:off x="6553200" y="6356350"/>
-            <a:ext cx="2133600" cy="365125"/>
+            <a:off x="7507738" y="6572645"/>
+            <a:ext cx="2444380" cy="377549"/>
           </a:xfrm>
           <a:prstGeom prst="rect">
             <a:avLst/>
@@ -3113,14 +3567,14 @@
       </p:grpSpPr>
       <p:sp>
         <p:nvSpPr>
-          <p:cNvPr id="14" name="Abgerundetes Rechteck 13"/>
+          <p:cNvPr id="30" name="Abgerundetes Rechteck 29"/>
           <p:cNvSpPr/>
           <p:nvPr/>
         </p:nvSpPr>
         <p:spPr>
           <a:xfrm>
-            <a:off x="34356" y="1806724"/>
-            <a:ext cx="9064624" cy="574264"/>
+            <a:off x="18453" y="1502128"/>
+            <a:ext cx="10441557" cy="574264"/>
           </a:xfrm>
           <a:prstGeom prst="roundRect">
             <a:avLst/>
@@ -3167,14 +3621,14 @@
           <a:p>
             <a:pPr algn="ctr"/>
             <a:r>
-              <a:rPr lang="de-DE" sz="1400" b="1" smtClean="0">
+              <a:rPr lang="en-US" sz="1400" b="1" dirty="0" smtClean="0">
                 <a:solidFill>
                   <a:schemeClr val="bg1"/>
                 </a:solidFill>
               </a:rPr>
               <a:t>HTTP REST API</a:t>
             </a:r>
-            <a:endParaRPr lang="en-US" sz="1400" b="1">
+            <a:endParaRPr lang="en-US" sz="1400" b="1" dirty="0">
               <a:solidFill>
                 <a:schemeClr val="bg1"/>
               </a:solidFill>
@@ -3184,14 +3638,14 @@
       </p:sp>
       <p:sp>
         <p:nvSpPr>
-          <p:cNvPr id="13" name="Abgerundetes Rechteck 12"/>
+          <p:cNvPr id="31" name="Abgerundetes Rechteck 30"/>
           <p:cNvSpPr/>
           <p:nvPr/>
         </p:nvSpPr>
         <p:spPr>
           <a:xfrm>
-            <a:off x="34356" y="2176277"/>
-            <a:ext cx="9064624" cy="4421075"/>
+            <a:off x="18453" y="1871681"/>
+            <a:ext cx="10441557" cy="5187878"/>
           </a:xfrm>
           <a:prstGeom prst="roundRect">
             <a:avLst>
@@ -3235,7 +3689,7 @@
           <a:p>
             <a:pPr algn="ctr"/>
             <a:r>
-              <a:rPr lang="de-DE" sz="1400" b="1" smtClean="0">
+              <a:rPr lang="en-US" sz="1400" b="1" dirty="0" smtClean="0">
                 <a:solidFill>
                   <a:schemeClr val="tx1">
                     <a:lumMod val="75000"/>
@@ -3245,7 +3699,7 @@
               </a:rPr>
               <a:t>Winery Backend System Components</a:t>
             </a:r>
-            <a:endParaRPr lang="en-US" sz="1400" b="1">
+            <a:endParaRPr lang="en-US" sz="1400" b="1" dirty="0">
               <a:solidFill>
                 <a:schemeClr val="tx1">
                   <a:lumMod val="75000"/>
@@ -3258,14 +3712,14 @@
       </p:sp>
       <p:sp>
         <p:nvSpPr>
-          <p:cNvPr id="12" name="Abgerundetes Rechteck 11"/>
+          <p:cNvPr id="43" name="Abgerundetes Rechteck 42"/>
           <p:cNvSpPr/>
           <p:nvPr/>
         </p:nvSpPr>
         <p:spPr>
           <a:xfrm>
-            <a:off x="25971" y="44624"/>
-            <a:ext cx="9073008" cy="1512168"/>
+            <a:off x="10068" y="12820"/>
+            <a:ext cx="10451215" cy="1406492"/>
           </a:xfrm>
           <a:prstGeom prst="roundRect">
             <a:avLst>
@@ -3309,7 +3763,7 @@
           <a:p>
             <a:pPr algn="ctr"/>
             <a:r>
-              <a:rPr lang="de-DE" sz="1400" b="1" smtClean="0">
+              <a:rPr lang="en-US" sz="1400" b="1" dirty="0" smtClean="0">
                 <a:solidFill>
                   <a:schemeClr val="tx1">
                     <a:lumMod val="75000"/>
@@ -3319,7 +3773,7 @@
               </a:rPr>
               <a:t>Winery UI Components</a:t>
             </a:r>
-            <a:endParaRPr lang="en-US" sz="1400" b="1">
+            <a:endParaRPr lang="en-US" sz="1400" b="1" dirty="0">
               <a:solidFill>
                 <a:schemeClr val="tx1">
                   <a:lumMod val="75000"/>
@@ -3332,13 +3786,13 @@
       </p:sp>
       <p:sp>
         <p:nvSpPr>
-          <p:cNvPr id="21" name="Zylinder 20"/>
+          <p:cNvPr id="48" name="Zylinder 47"/>
           <p:cNvSpPr/>
           <p:nvPr/>
         </p:nvSpPr>
         <p:spPr>
           <a:xfrm>
-            <a:off x="197990" y="5157192"/>
+            <a:off x="117438" y="5712038"/>
             <a:ext cx="1641960" cy="864096"/>
           </a:xfrm>
           <a:prstGeom prst="can">
@@ -3372,22 +3826,22 @@
           <a:p>
             <a:pPr algn="ctr"/>
             <a:r>
-              <a:rPr lang="de-DE" sz="1400" smtClean="0"/>
-              <a:t>Templates, Types, Plans &amp; CSARs Database</a:t>
-            </a:r>
-            <a:endParaRPr lang="en-US" sz="1400"/>
-          </a:p>
-        </p:txBody>
-      </p:sp>
-      <p:sp>
-        <p:nvSpPr>
-          <p:cNvPr id="25" name="Abgerundetes Rechteck 24"/>
+              <a:rPr lang="en-US" sz="1400" dirty="0" smtClean="0"/>
+              <a:t>Templates, Types, Plans &amp; CSARs Repository</a:t>
+            </a:r>
+            <a:endParaRPr lang="en-US" sz="1400" dirty="0"/>
+          </a:p>
+        </p:txBody>
+      </p:sp>
+      <p:sp>
+        <p:nvSpPr>
+          <p:cNvPr id="51" name="Abgerundetes Rechteck 50"/>
           <p:cNvSpPr/>
           <p:nvPr/>
         </p:nvSpPr>
         <p:spPr>
           <a:xfrm>
-            <a:off x="1968225" y="2400937"/>
+            <a:off x="5258235" y="2017611"/>
             <a:ext cx="1641960" cy="805180"/>
           </a:xfrm>
           <a:prstGeom prst="roundRect">
@@ -3421,22 +3875,22 @@
           <a:p>
             <a:pPr algn="ctr"/>
             <a:r>
-              <a:rPr lang="de-DE" sz="1400" smtClean="0"/>
-              <a:t>TOSCA YAML Model Importer</a:t>
-            </a:r>
-            <a:endParaRPr lang="en-US" sz="1400"/>
-          </a:p>
-        </p:txBody>
-      </p:sp>
-      <p:sp>
-        <p:nvSpPr>
-          <p:cNvPr id="16" name="Abgerundetes Rechteck 15"/>
+              <a:rPr lang="en-US" sz="1400" dirty="0" smtClean="0"/>
+              <a:t>TOSCA YAML Model Importer &amp; Exporter</a:t>
+            </a:r>
+            <a:endParaRPr lang="en-US" sz="1400" dirty="0"/>
+          </a:p>
+        </p:txBody>
+      </p:sp>
+      <p:sp>
+        <p:nvSpPr>
+          <p:cNvPr id="52" name="Abgerundetes Rechteck 51"/>
           <p:cNvSpPr/>
           <p:nvPr/>
         </p:nvSpPr>
         <p:spPr>
           <a:xfrm>
-            <a:off x="197989" y="2400937"/>
+            <a:off x="117437" y="2017611"/>
             <a:ext cx="1641960" cy="805180"/>
           </a:xfrm>
           <a:prstGeom prst="roundRect">
@@ -3470,85 +3924,22 @@
           <a:p>
             <a:pPr algn="ctr"/>
             <a:r>
-              <a:rPr lang="de-DE" sz="1400" smtClean="0"/>
-              <a:t>TOSCA Topology Model Importer</a:t>
-            </a:r>
-            <a:endParaRPr lang="en-US" sz="1400"/>
-          </a:p>
-        </p:txBody>
-      </p:sp>
-      <p:sp>
-        <p:nvSpPr>
-          <p:cNvPr id="11" name="Abgerundetes Rechteck 10"/>
+              <a:rPr lang="en-US" sz="1400" dirty="0" smtClean="0"/>
+              <a:t>TOSCA XML Model Importer &amp; Exporter</a:t>
+            </a:r>
+            <a:endParaRPr lang="en-US" sz="1400" dirty="0"/>
+          </a:p>
+        </p:txBody>
+      </p:sp>
+      <p:sp>
+        <p:nvSpPr>
+          <p:cNvPr id="53" name="Abgerundetes Rechteck 52"/>
           <p:cNvSpPr/>
           <p:nvPr/>
         </p:nvSpPr>
         <p:spPr>
           <a:xfrm>
-            <a:off x="3743424" y="2400937"/>
-            <a:ext cx="1641961" cy="805180"/>
-          </a:xfrm>
-          <a:prstGeom prst="roundRect">
-            <a:avLst/>
-          </a:prstGeom>
-          <a:solidFill>
-            <a:schemeClr val="tx1">
-              <a:lumMod val="75000"/>
-              <a:lumOff val="25000"/>
-            </a:schemeClr>
-          </a:solidFill>
-          <a:ln w="19050"/>
-        </p:spPr>
-        <p:style>
-          <a:lnRef idx="3">
-            <a:schemeClr val="lt1"/>
-          </a:lnRef>
-          <a:fillRef idx="1">
-            <a:schemeClr val="accent4"/>
-          </a:fillRef>
-          <a:effectRef idx="1">
-            <a:schemeClr val="accent4"/>
-          </a:effectRef>
-          <a:fontRef idx="minor">
-            <a:schemeClr val="lt1"/>
-          </a:fontRef>
-        </p:style>
-        <p:txBody>
-          <a:bodyPr wrap="none" rtlCol="0" anchor="ctr"/>
-          <a:lstStyle/>
-          <a:p>
-            <a:pPr algn="ctr"/>
-            <a:r>
-              <a:rPr lang="de-DE" sz="1400" smtClean="0"/>
-              <a:t>Smart Service</a:t>
-            </a:r>
-          </a:p>
-          <a:p>
-            <a:pPr algn="ctr"/>
-            <a:r>
-              <a:rPr lang="de-DE" sz="1400" smtClean="0"/>
-              <a:t>Composition</a:t>
-            </a:r>
-          </a:p>
-          <a:p>
-            <a:pPr algn="ctr"/>
-            <a:r>
-              <a:rPr lang="de-DE" sz="1400" smtClean="0"/>
-              <a:t>Model Importer</a:t>
-            </a:r>
-            <a:endParaRPr lang="en-US" sz="1400"/>
-          </a:p>
-        </p:txBody>
-      </p:sp>
-      <p:sp>
-        <p:nvSpPr>
-          <p:cNvPr id="15" name="Abgerundetes Rechteck 14"/>
-          <p:cNvSpPr/>
-          <p:nvPr/>
-        </p:nvSpPr>
-        <p:spPr>
-          <a:xfrm>
-            <a:off x="5518620" y="2400937"/>
+            <a:off x="6971832" y="2017611"/>
             <a:ext cx="1641960" cy="805180"/>
           </a:xfrm>
           <a:prstGeom prst="roundRect">
@@ -3582,29 +3973,29 @@
           <a:p>
             <a:pPr algn="ctr"/>
             <a:r>
-              <a:rPr lang="de-DE" sz="1400" smtClean="0"/>
+              <a:rPr lang="en-US" sz="1400" dirty="0" smtClean="0"/>
               <a:t>BPMN4TOSCA</a:t>
             </a:r>
           </a:p>
           <a:p>
             <a:pPr algn="ctr"/>
             <a:r>
-              <a:rPr lang="de-DE" sz="1400" smtClean="0"/>
+              <a:rPr lang="en-US" sz="1400" dirty="0" smtClean="0"/>
               <a:t>Management Plan Importer</a:t>
             </a:r>
-            <a:endParaRPr lang="en-US" sz="1400"/>
-          </a:p>
-        </p:txBody>
-      </p:sp>
-      <p:sp>
-        <p:nvSpPr>
-          <p:cNvPr id="31" name="Abgerundetes Rechteck 30"/>
+            <a:endParaRPr lang="en-US" sz="1400" dirty="0"/>
+          </a:p>
+        </p:txBody>
+      </p:sp>
+      <p:sp>
+        <p:nvSpPr>
+          <p:cNvPr id="61" name="Abgerundetes Rechteck 60"/>
           <p:cNvSpPr/>
           <p:nvPr/>
         </p:nvSpPr>
         <p:spPr>
           <a:xfrm>
-            <a:off x="1968225" y="3402191"/>
+            <a:off x="5258234" y="2985519"/>
             <a:ext cx="1641960" cy="805180"/>
           </a:xfrm>
           <a:prstGeom prst="roundRect">
@@ -3638,99 +4029,36 @@
           <a:p>
             <a:pPr algn="ctr"/>
             <a:r>
-              <a:rPr lang="de-DE" sz="1400" smtClean="0"/>
+              <a:rPr lang="en-US" sz="1400" dirty="0" smtClean="0"/>
               <a:t>TOSCA YAML Model</a:t>
             </a:r>
           </a:p>
           <a:p>
             <a:pPr algn="ctr"/>
             <a:r>
-              <a:rPr lang="de-DE" sz="1400" smtClean="0"/>
-              <a:t>to TOSCA Topology</a:t>
+              <a:rPr lang="en-US" sz="1400" dirty="0" smtClean="0"/>
+              <a:t>to TOSCA XML</a:t>
             </a:r>
           </a:p>
           <a:p>
             <a:pPr algn="ctr"/>
             <a:r>
-              <a:rPr lang="de-DE" sz="1400" smtClean="0"/>
+              <a:rPr lang="en-US" sz="1400" dirty="0" smtClean="0"/>
               <a:t>Model Transformer</a:t>
             </a:r>
-            <a:endParaRPr lang="en-US" sz="1400"/>
-          </a:p>
-        </p:txBody>
-      </p:sp>
-      <p:sp>
-        <p:nvSpPr>
-          <p:cNvPr id="29" name="Abgerundetes Rechteck 28"/>
+            <a:endParaRPr lang="en-US" sz="1400" dirty="0"/>
+          </a:p>
+        </p:txBody>
+      </p:sp>
+      <p:sp>
+        <p:nvSpPr>
+          <p:cNvPr id="62" name="Abgerundetes Rechteck 61"/>
           <p:cNvSpPr/>
           <p:nvPr/>
         </p:nvSpPr>
         <p:spPr>
           <a:xfrm>
-            <a:off x="3743424" y="3402191"/>
-            <a:ext cx="1641961" cy="805180"/>
-          </a:xfrm>
-          <a:prstGeom prst="roundRect">
-            <a:avLst/>
-          </a:prstGeom>
-          <a:solidFill>
-            <a:schemeClr val="tx1">
-              <a:lumMod val="75000"/>
-              <a:lumOff val="25000"/>
-            </a:schemeClr>
-          </a:solidFill>
-          <a:ln w="19050"/>
-        </p:spPr>
-        <p:style>
-          <a:lnRef idx="3">
-            <a:schemeClr val="lt1"/>
-          </a:lnRef>
-          <a:fillRef idx="1">
-            <a:schemeClr val="accent4"/>
-          </a:fillRef>
-          <a:effectRef idx="1">
-            <a:schemeClr val="accent4"/>
-          </a:effectRef>
-          <a:fontRef idx="minor">
-            <a:schemeClr val="lt1"/>
-          </a:fontRef>
-        </p:style>
-        <p:txBody>
-          <a:bodyPr wrap="none" rtlCol="0" anchor="ctr"/>
-          <a:lstStyle/>
-          <a:p>
-            <a:pPr algn="ctr"/>
-            <a:r>
-              <a:rPr lang="de-DE" sz="1400" smtClean="0"/>
-              <a:t>Service Composition</a:t>
-            </a:r>
-          </a:p>
-          <a:p>
-            <a:pPr algn="ctr"/>
-            <a:r>
-              <a:rPr lang="de-DE" sz="1400" smtClean="0"/>
-              <a:t>to TOSCA Topology</a:t>
-            </a:r>
-          </a:p>
-          <a:p>
-            <a:pPr algn="ctr"/>
-            <a:r>
-              <a:rPr lang="de-DE" sz="1400" smtClean="0"/>
-              <a:t>Model Transformer</a:t>
-            </a:r>
-            <a:endParaRPr lang="en-US" sz="1400"/>
-          </a:p>
-        </p:txBody>
-      </p:sp>
-      <p:sp>
-        <p:nvSpPr>
-          <p:cNvPr id="30" name="Abgerundetes Rechteck 29"/>
-          <p:cNvSpPr/>
-          <p:nvPr/>
-        </p:nvSpPr>
-        <p:spPr>
-          <a:xfrm>
-            <a:off x="5518620" y="3402191"/>
+            <a:off x="6971832" y="2985519"/>
             <a:ext cx="1641960" cy="805180"/>
           </a:xfrm>
           <a:prstGeom prst="roundRect">
@@ -3764,29 +4092,238 @@
           <a:p>
             <a:pPr algn="ctr"/>
             <a:r>
-              <a:rPr lang="de-DE" sz="1400" smtClean="0"/>
+              <a:rPr lang="en-US" sz="1400" dirty="0" smtClean="0"/>
               <a:t>BPMN4TOSCA</a:t>
             </a:r>
           </a:p>
           <a:p>
             <a:pPr algn="ctr"/>
             <a:r>
-              <a:rPr lang="de-DE" sz="1400" smtClean="0"/>
+              <a:rPr lang="en-US" sz="1400" dirty="0" smtClean="0"/>
               <a:t>to BPEL Transformer</a:t>
             </a:r>
-            <a:endParaRPr lang="en-US" sz="1400"/>
-          </a:p>
-        </p:txBody>
-      </p:sp>
-      <p:sp>
-        <p:nvSpPr>
-          <p:cNvPr id="4" name="Abgerundetes Rechteck 3"/>
+            <a:endParaRPr lang="en-US" sz="1400" dirty="0"/>
+          </a:p>
+        </p:txBody>
+      </p:sp>
+      <p:sp>
+        <p:nvSpPr>
+          <p:cNvPr id="65" name="Abgerundetes Rechteck 64"/>
           <p:cNvSpPr/>
           <p:nvPr/>
         </p:nvSpPr>
         <p:spPr>
           <a:xfrm>
-            <a:off x="3748384" y="554638"/>
+            <a:off x="117437" y="438427"/>
+            <a:ext cx="2201659" cy="805180"/>
+          </a:xfrm>
+          <a:prstGeom prst="roundRect">
+            <a:avLst/>
+          </a:prstGeom>
+          <a:solidFill>
+            <a:schemeClr val="tx1">
+              <a:lumMod val="75000"/>
+              <a:lumOff val="25000"/>
+            </a:schemeClr>
+          </a:solidFill>
+          <a:ln w="19050"/>
+        </p:spPr>
+        <p:style>
+          <a:lnRef idx="3">
+            <a:schemeClr val="lt1"/>
+          </a:lnRef>
+          <a:fillRef idx="1">
+            <a:schemeClr val="accent4"/>
+          </a:fillRef>
+          <a:effectRef idx="1">
+            <a:schemeClr val="accent4"/>
+          </a:effectRef>
+          <a:fontRef idx="minor">
+            <a:schemeClr val="lt1"/>
+          </a:fontRef>
+        </p:style>
+        <p:txBody>
+          <a:bodyPr rtlCol="0" anchor="ctr"/>
+          <a:lstStyle/>
+          <a:p>
+            <a:pPr algn="ctr"/>
+            <a:r>
+              <a:rPr lang="en-US" sz="1400" dirty="0" smtClean="0"/>
+              <a:t>TOSCA</a:t>
+            </a:r>
+          </a:p>
+          <a:p>
+            <a:pPr algn="ctr"/>
+            <a:r>
+              <a:rPr lang="en-US" sz="1400" dirty="0" smtClean="0"/>
+              <a:t>Topology Model Editor</a:t>
+            </a:r>
+            <a:endParaRPr lang="en-US" sz="1400" dirty="0"/>
+          </a:p>
+        </p:txBody>
+      </p:sp>
+      <p:sp>
+        <p:nvSpPr>
+          <p:cNvPr id="66" name="Abgerundetes Rechteck 65"/>
+          <p:cNvSpPr/>
+          <p:nvPr/>
+        </p:nvSpPr>
+        <p:spPr>
+          <a:xfrm>
+            <a:off x="5466029" y="438427"/>
+            <a:ext cx="2201659" cy="805180"/>
+          </a:xfrm>
+          <a:prstGeom prst="roundRect">
+            <a:avLst/>
+          </a:prstGeom>
+          <a:solidFill>
+            <a:schemeClr val="tx1">
+              <a:lumMod val="75000"/>
+              <a:lumOff val="25000"/>
+            </a:schemeClr>
+          </a:solidFill>
+          <a:ln w="19050"/>
+        </p:spPr>
+        <p:style>
+          <a:lnRef idx="3">
+            <a:schemeClr val="lt1"/>
+          </a:lnRef>
+          <a:fillRef idx="1">
+            <a:schemeClr val="accent4"/>
+          </a:fillRef>
+          <a:effectRef idx="1">
+            <a:schemeClr val="accent4"/>
+          </a:effectRef>
+          <a:fontRef idx="minor">
+            <a:schemeClr val="lt1"/>
+          </a:fontRef>
+        </p:style>
+        <p:txBody>
+          <a:bodyPr rtlCol="0" anchor="ctr"/>
+          <a:lstStyle/>
+          <a:p>
+            <a:pPr algn="ctr"/>
+            <a:r>
+              <a:rPr lang="en-US" sz="1400" dirty="0" smtClean="0"/>
+              <a:t>BPMN4TOSCA Management Plan Editor</a:t>
+            </a:r>
+            <a:endParaRPr lang="en-US" sz="1400" dirty="0"/>
+          </a:p>
+        </p:txBody>
+      </p:sp>
+      <p:sp>
+        <p:nvSpPr>
+          <p:cNvPr id="67" name="Abgerundetes Rechteck 66"/>
+          <p:cNvSpPr/>
+          <p:nvPr/>
+        </p:nvSpPr>
+        <p:spPr>
+          <a:xfrm>
+            <a:off x="8140325" y="438427"/>
+            <a:ext cx="2201659" cy="805180"/>
+          </a:xfrm>
+          <a:prstGeom prst="roundRect">
+            <a:avLst/>
+          </a:prstGeom>
+          <a:solidFill>
+            <a:schemeClr val="tx1">
+              <a:lumMod val="75000"/>
+              <a:lumOff val="25000"/>
+            </a:schemeClr>
+          </a:solidFill>
+          <a:ln w="19050"/>
+        </p:spPr>
+        <p:style>
+          <a:lnRef idx="3">
+            <a:schemeClr val="lt1"/>
+          </a:lnRef>
+          <a:fillRef idx="1">
+            <a:schemeClr val="accent4"/>
+          </a:fillRef>
+          <a:effectRef idx="1">
+            <a:schemeClr val="accent4"/>
+          </a:effectRef>
+          <a:fontRef idx="minor">
+            <a:schemeClr val="lt1"/>
+          </a:fontRef>
+        </p:style>
+        <p:txBody>
+          <a:bodyPr rtlCol="0" anchor="ctr"/>
+          <a:lstStyle/>
+          <a:p>
+            <a:pPr algn="ctr"/>
+            <a:r>
+              <a:rPr lang="en-US" sz="1400" dirty="0" smtClean="0"/>
+              <a:t>Templates, Types, Plans &amp; CSARs Management UI</a:t>
+            </a:r>
+            <a:endParaRPr lang="en-US" sz="1400" dirty="0"/>
+          </a:p>
+        </p:txBody>
+      </p:sp>
+      <p:sp>
+        <p:nvSpPr>
+          <p:cNvPr id="68" name="Abgerundetes Rechteck 67"/>
+          <p:cNvSpPr/>
+          <p:nvPr/>
+        </p:nvSpPr>
+        <p:spPr>
+          <a:xfrm>
+            <a:off x="8604752" y="5774616"/>
+            <a:ext cx="1641960" cy="805180"/>
+          </a:xfrm>
+          <a:prstGeom prst="roundRect">
+            <a:avLst/>
+          </a:prstGeom>
+          <a:solidFill>
+            <a:schemeClr val="bg1">
+              <a:lumMod val="50000"/>
+            </a:schemeClr>
+          </a:solidFill>
+          <a:ln w="19050"/>
+        </p:spPr>
+        <p:style>
+          <a:lnRef idx="3">
+            <a:schemeClr val="lt1"/>
+          </a:lnRef>
+          <a:fillRef idx="1">
+            <a:schemeClr val="accent4"/>
+          </a:fillRef>
+          <a:effectRef idx="1">
+            <a:schemeClr val="accent4"/>
+          </a:effectRef>
+          <a:fontRef idx="minor">
+            <a:schemeClr val="lt1"/>
+          </a:fontRef>
+        </p:style>
+        <p:txBody>
+          <a:bodyPr wrap="none" rtlCol="0" anchor="ctr"/>
+          <a:lstStyle/>
+          <a:p>
+            <a:pPr algn="ctr"/>
+            <a:r>
+              <a:rPr lang="en-US" sz="1400" dirty="0" smtClean="0"/>
+              <a:t>BPEL Provisioning</a:t>
+            </a:r>
+          </a:p>
+          <a:p>
+            <a:pPr algn="ctr"/>
+            <a:r>
+              <a:rPr lang="en-US" sz="1400" dirty="0" smtClean="0"/>
+              <a:t>Plan Generator</a:t>
+            </a:r>
+            <a:endParaRPr lang="en-US" sz="1400" dirty="0"/>
+          </a:p>
+        </p:txBody>
+      </p:sp>
+      <p:sp>
+        <p:nvSpPr>
+          <p:cNvPr id="69" name="Abgerundetes Rechteck 68"/>
+          <p:cNvSpPr/>
+          <p:nvPr/>
+        </p:nvSpPr>
+        <p:spPr>
+          <a:xfrm>
+            <a:off x="8700024" y="4755144"/>
             <a:ext cx="1641960" cy="805180"/>
           </a:xfrm>
           <a:prstGeom prst="roundRect">
@@ -3815,27 +4352,34 @@
           </a:fontRef>
         </p:style>
         <p:txBody>
-          <a:bodyPr rtlCol="0" anchor="ctr"/>
+          <a:bodyPr wrap="none" rtlCol="0" anchor="ctr"/>
           <a:lstStyle/>
           <a:p>
             <a:pPr algn="ctr"/>
             <a:r>
-              <a:rPr lang="de-DE" sz="1400" smtClean="0"/>
-              <a:t>Smart Service Composition Model Editor</a:t>
-            </a:r>
-            <a:endParaRPr lang="en-US" sz="1400"/>
-          </a:p>
-        </p:txBody>
-      </p:sp>
-      <p:sp>
-        <p:nvSpPr>
-          <p:cNvPr id="5" name="Abgerundetes Rechteck 4"/>
+              <a:rPr lang="en-US" sz="1400" dirty="0" smtClean="0"/>
+              <a:t>Implementation</a:t>
+            </a:r>
+          </a:p>
+          <a:p>
+            <a:pPr algn="ctr"/>
+            <a:r>
+              <a:rPr lang="en-US" sz="1400" dirty="0" smtClean="0"/>
+              <a:t>Artifact Generator</a:t>
+            </a:r>
+            <a:endParaRPr lang="en-US" sz="1400" dirty="0"/>
+          </a:p>
+        </p:txBody>
+      </p:sp>
+      <p:sp>
+        <p:nvSpPr>
+          <p:cNvPr id="70" name="Abgerundetes Rechteck 69"/>
           <p:cNvSpPr/>
           <p:nvPr/>
         </p:nvSpPr>
         <p:spPr>
           <a:xfrm>
-            <a:off x="197989" y="554638"/>
+            <a:off x="117438" y="2985519"/>
             <a:ext cx="1641960" cy="805180"/>
           </a:xfrm>
           <a:prstGeom prst="roundRect">
@@ -3864,34 +4408,27 @@
           </a:fontRef>
         </p:style>
         <p:txBody>
-          <a:bodyPr rtlCol="0" anchor="ctr"/>
+          <a:bodyPr wrap="none" rtlCol="0" anchor="ctr"/>
           <a:lstStyle/>
           <a:p>
             <a:pPr algn="ctr"/>
             <a:r>
-              <a:rPr lang="de-DE" sz="1400" smtClean="0"/>
-              <a:t>TOSCA</a:t>
-            </a:r>
-          </a:p>
-          <a:p>
-            <a:pPr algn="ctr"/>
-            <a:r>
-              <a:rPr lang="de-DE" sz="1400" smtClean="0"/>
-              <a:t>Topology Model Editor</a:t>
-            </a:r>
-            <a:endParaRPr lang="en-US" sz="1400"/>
-          </a:p>
-        </p:txBody>
-      </p:sp>
-      <p:sp>
-        <p:nvSpPr>
-          <p:cNvPr id="6" name="Abgerundetes Rechteck 5"/>
+              <a:rPr lang="en-US" sz="1400" dirty="0" smtClean="0"/>
+              <a:t>CSAR Packager</a:t>
+            </a:r>
+            <a:endParaRPr lang="en-US" sz="1400" dirty="0"/>
+          </a:p>
+        </p:txBody>
+      </p:sp>
+      <p:sp>
+        <p:nvSpPr>
+          <p:cNvPr id="71" name="Abgerundetes Rechteck 70"/>
           <p:cNvSpPr/>
           <p:nvPr/>
         </p:nvSpPr>
         <p:spPr>
           <a:xfrm>
-            <a:off x="5523581" y="554638"/>
+            <a:off x="1831037" y="2985519"/>
             <a:ext cx="1641960" cy="805180"/>
           </a:xfrm>
           <a:prstGeom prst="roundRect">
@@ -3925,22 +4462,22 @@
           <a:p>
             <a:pPr algn="ctr"/>
             <a:r>
-              <a:rPr lang="de-DE" sz="1400" smtClean="0"/>
-              <a:t>BPMN4TOSCA Management Plan Editor</a:t>
-            </a:r>
-            <a:endParaRPr lang="en-US" sz="1400"/>
-          </a:p>
-        </p:txBody>
-      </p:sp>
-      <p:sp>
-        <p:nvSpPr>
-          <p:cNvPr id="8" name="Abgerundetes Rechteck 7"/>
+              <a:rPr lang="en-US" sz="1400" dirty="0" smtClean="0"/>
+              <a:t>Topology Completion</a:t>
+            </a:r>
+            <a:endParaRPr lang="en-US" sz="1400" dirty="0"/>
+          </a:p>
+        </p:txBody>
+      </p:sp>
+      <p:sp>
+        <p:nvSpPr>
+          <p:cNvPr id="72" name="Abgerundetes Rechteck 71"/>
           <p:cNvSpPr/>
           <p:nvPr/>
         </p:nvSpPr>
         <p:spPr>
           <a:xfrm>
-            <a:off x="7298779" y="554638"/>
+            <a:off x="1831037" y="4755144"/>
             <a:ext cx="1641960" cy="805180"/>
           </a:xfrm>
           <a:prstGeom prst="roundRect">
@@ -3969,27 +4506,27 @@
           </a:fontRef>
         </p:style>
         <p:txBody>
-          <a:bodyPr rtlCol="0" anchor="ctr"/>
+          <a:bodyPr wrap="none" rtlCol="0" anchor="ctr"/>
           <a:lstStyle/>
           <a:p>
             <a:pPr algn="ctr"/>
             <a:r>
-              <a:rPr lang="de-DE" sz="1400" smtClean="0"/>
-              <a:t>Templates, Types, Plans &amp; CSARs Management UI</a:t>
-            </a:r>
-            <a:endParaRPr lang="en-US" sz="1400"/>
-          </a:p>
-        </p:txBody>
-      </p:sp>
-      <p:sp>
-        <p:nvSpPr>
-          <p:cNvPr id="26" name="Abgerundetes Rechteck 25"/>
+              <a:rPr lang="en-US" sz="1400" dirty="0" smtClean="0"/>
+              <a:t>Splitting &amp; Matching</a:t>
+            </a:r>
+            <a:endParaRPr lang="en-US" sz="1400" dirty="0"/>
+          </a:p>
+        </p:txBody>
+      </p:sp>
+      <p:sp>
+        <p:nvSpPr>
+          <p:cNvPr id="73" name="Abgerundetes Rechteck 72"/>
           <p:cNvSpPr/>
           <p:nvPr/>
         </p:nvSpPr>
         <p:spPr>
           <a:xfrm>
-            <a:off x="1973186" y="554638"/>
+            <a:off x="3548267" y="2017611"/>
             <a:ext cx="1641960" cy="805180"/>
           </a:xfrm>
           <a:prstGeom prst="roundRect">
@@ -4023,102 +4560,615 @@
           <a:p>
             <a:pPr algn="ctr"/>
             <a:r>
-              <a:rPr lang="de-DE" sz="1400" smtClean="0"/>
-              <a:t>TOSCA</a:t>
-            </a:r>
-          </a:p>
-          <a:p>
-            <a:pPr algn="ctr"/>
-            <a:r>
-              <a:rPr lang="de-DE" sz="1400" smtClean="0"/>
-              <a:t>YAML Model Editor</a:t>
-            </a:r>
-            <a:endParaRPr lang="en-US" sz="1400"/>
-          </a:p>
-        </p:txBody>
-      </p:sp>
-      <p:sp>
-        <p:nvSpPr>
-          <p:cNvPr id="48" name="Abgerundetes Rechteck 47"/>
+              <a:rPr lang="en-US" sz="1400" dirty="0" smtClean="0"/>
+              <a:t>Versioning &amp;</a:t>
+            </a:r>
+            <a:br>
+              <a:rPr lang="en-US" sz="1400" dirty="0" smtClean="0"/>
+            </a:br>
+            <a:r>
+              <a:rPr lang="en-US" sz="1400" dirty="0" smtClean="0"/>
+              <a:t>Difference</a:t>
+            </a:r>
+            <a:br>
+              <a:rPr lang="en-US" sz="1400" dirty="0" smtClean="0"/>
+            </a:br>
+            <a:r>
+              <a:rPr lang="en-US" sz="1400" dirty="0" smtClean="0"/>
+              <a:t>Calculation</a:t>
+            </a:r>
+            <a:endParaRPr lang="en-US" sz="1400" dirty="0"/>
+          </a:p>
+        </p:txBody>
+      </p:sp>
+      <p:sp>
+        <p:nvSpPr>
+          <p:cNvPr id="74" name="Abgerundetes Rechteck 73"/>
           <p:cNvSpPr/>
           <p:nvPr/>
         </p:nvSpPr>
         <p:spPr>
           <a:xfrm>
-            <a:off x="197990" y="2348880"/>
-            <a:ext cx="8742748" cy="2638180"/>
+            <a:off x="117438" y="4755144"/>
+            <a:ext cx="1641960" cy="805180"/>
+          </a:xfrm>
+          <a:prstGeom prst="roundRect">
+            <a:avLst/>
+          </a:prstGeom>
+          <a:solidFill>
+            <a:schemeClr val="tx1">
+              <a:lumMod val="75000"/>
+              <a:lumOff val="25000"/>
+            </a:schemeClr>
+          </a:solidFill>
+          <a:ln w="19050"/>
+        </p:spPr>
+        <p:style>
+          <a:lnRef idx="3">
+            <a:schemeClr val="lt1"/>
+          </a:lnRef>
+          <a:fillRef idx="1">
+            <a:schemeClr val="accent4"/>
+          </a:fillRef>
+          <a:effectRef idx="1">
+            <a:schemeClr val="accent4"/>
+          </a:effectRef>
+          <a:fontRef idx="minor">
+            <a:schemeClr val="lt1"/>
+          </a:fontRef>
+        </p:style>
+        <p:txBody>
+          <a:bodyPr wrap="none" rtlCol="0" anchor="ctr"/>
+          <a:lstStyle/>
+          <a:p>
+            <a:pPr algn="ctr"/>
+            <a:r>
+              <a:rPr lang="en-US" sz="1400" dirty="0" smtClean="0"/>
+              <a:t>Consistency Check</a:t>
+            </a:r>
+          </a:p>
+        </p:txBody>
+      </p:sp>
+      <p:sp>
+        <p:nvSpPr>
+          <p:cNvPr id="75" name="Zylinder 74"/>
+          <p:cNvSpPr/>
+          <p:nvPr/>
+        </p:nvSpPr>
+        <p:spPr>
+          <a:xfrm>
+            <a:off x="1831037" y="5712038"/>
+            <a:ext cx="1641960" cy="864096"/>
+          </a:xfrm>
+          <a:prstGeom prst="can">
+            <a:avLst/>
+          </a:prstGeom>
+          <a:solidFill>
+            <a:schemeClr val="tx1">
+              <a:lumMod val="75000"/>
+              <a:lumOff val="25000"/>
+            </a:schemeClr>
+          </a:solidFill>
+          <a:ln w="19050"/>
+        </p:spPr>
+        <p:style>
+          <a:lnRef idx="3">
+            <a:schemeClr val="lt1"/>
+          </a:lnRef>
+          <a:fillRef idx="1">
+            <a:schemeClr val="accent4"/>
+          </a:fillRef>
+          <a:effectRef idx="1">
+            <a:schemeClr val="accent4"/>
+          </a:effectRef>
+          <a:fontRef idx="minor">
+            <a:schemeClr val="lt1"/>
+          </a:fontRef>
+        </p:style>
+        <p:txBody>
+          <a:bodyPr tIns="144000" rtlCol="0" anchor="ctr"/>
+          <a:lstStyle/>
+          <a:p>
+            <a:pPr algn="ctr"/>
+            <a:r>
+              <a:rPr lang="en-US" sz="1400" dirty="0" smtClean="0"/>
+              <a:t>Matching Templates Repository</a:t>
+            </a:r>
+            <a:endParaRPr lang="en-US" sz="1400" dirty="0"/>
+          </a:p>
+        </p:txBody>
+      </p:sp>
+      <p:sp>
+        <p:nvSpPr>
+          <p:cNvPr id="76" name="Abgerundetes Rechteck 75"/>
+          <p:cNvSpPr/>
+          <p:nvPr/>
+        </p:nvSpPr>
+        <p:spPr>
+          <a:xfrm>
+            <a:off x="3544636" y="4755144"/>
+            <a:ext cx="1641960" cy="805180"/>
+          </a:xfrm>
+          <a:prstGeom prst="roundRect">
+            <a:avLst/>
+          </a:prstGeom>
+          <a:solidFill>
+            <a:schemeClr val="tx1">
+              <a:lumMod val="75000"/>
+              <a:lumOff val="25000"/>
+            </a:schemeClr>
+          </a:solidFill>
+          <a:ln w="19050"/>
+        </p:spPr>
+        <p:style>
+          <a:lnRef idx="3">
+            <a:schemeClr val="lt1"/>
+          </a:lnRef>
+          <a:fillRef idx="1">
+            <a:schemeClr val="accent4"/>
+          </a:fillRef>
+          <a:effectRef idx="1">
+            <a:schemeClr val="accent4"/>
+          </a:effectRef>
+          <a:fontRef idx="minor">
+            <a:schemeClr val="lt1"/>
+          </a:fontRef>
+        </p:style>
+        <p:txBody>
+          <a:bodyPr wrap="none" rtlCol="0" anchor="ctr"/>
+          <a:lstStyle/>
+          <a:p>
+            <a:pPr algn="ctr"/>
+            <a:r>
+              <a:rPr lang="en-US" sz="1400" dirty="0" smtClean="0"/>
+              <a:t>Compliance </a:t>
+            </a:r>
+          </a:p>
+          <a:p>
+            <a:pPr algn="ctr"/>
+            <a:r>
+              <a:rPr lang="en-US" sz="1400" dirty="0" smtClean="0"/>
+              <a:t>Checker</a:t>
+            </a:r>
+            <a:endParaRPr lang="en-US" sz="1400" dirty="0"/>
+          </a:p>
+        </p:txBody>
+      </p:sp>
+      <p:sp>
+        <p:nvSpPr>
+          <p:cNvPr id="77" name="Zylinder 76"/>
+          <p:cNvSpPr/>
+          <p:nvPr/>
+        </p:nvSpPr>
+        <p:spPr>
+          <a:xfrm>
+            <a:off x="3544636" y="5712038"/>
+            <a:ext cx="1641960" cy="864096"/>
+          </a:xfrm>
+          <a:prstGeom prst="can">
+            <a:avLst/>
+          </a:prstGeom>
+          <a:solidFill>
+            <a:schemeClr val="tx1">
+              <a:lumMod val="75000"/>
+              <a:lumOff val="25000"/>
+            </a:schemeClr>
+          </a:solidFill>
+          <a:ln w="19050"/>
+        </p:spPr>
+        <p:style>
+          <a:lnRef idx="3">
+            <a:schemeClr val="lt1"/>
+          </a:lnRef>
+          <a:fillRef idx="1">
+            <a:schemeClr val="accent4"/>
+          </a:fillRef>
+          <a:effectRef idx="1">
+            <a:schemeClr val="accent4"/>
+          </a:effectRef>
+          <a:fontRef idx="minor">
+            <a:schemeClr val="lt1"/>
+          </a:fontRef>
+        </p:style>
+        <p:txBody>
+          <a:bodyPr tIns="144000" rtlCol="0" anchor="ctr"/>
+          <a:lstStyle/>
+          <a:p>
+            <a:pPr algn="ctr"/>
+            <a:r>
+              <a:rPr lang="en-US" sz="1400" dirty="0" smtClean="0"/>
+              <a:t>Compliance Rules</a:t>
+            </a:r>
+          </a:p>
+          <a:p>
+            <a:pPr algn="ctr"/>
+            <a:r>
+              <a:rPr lang="en-US" sz="1400" dirty="0" smtClean="0"/>
+              <a:t>Repository</a:t>
+            </a:r>
+            <a:endParaRPr lang="en-US" sz="1400" dirty="0"/>
+          </a:p>
+        </p:txBody>
+      </p:sp>
+      <p:sp>
+        <p:nvSpPr>
+          <p:cNvPr id="78" name="Abgerundetes Rechteck 77"/>
+          <p:cNvSpPr/>
+          <p:nvPr/>
+        </p:nvSpPr>
+        <p:spPr>
+          <a:xfrm>
+            <a:off x="5258234" y="4755144"/>
+            <a:ext cx="1641960" cy="805180"/>
+          </a:xfrm>
+          <a:prstGeom prst="roundRect">
+            <a:avLst/>
+          </a:prstGeom>
+          <a:solidFill>
+            <a:schemeClr val="tx1">
+              <a:lumMod val="75000"/>
+              <a:lumOff val="25000"/>
+            </a:schemeClr>
+          </a:solidFill>
+          <a:ln w="19050"/>
+        </p:spPr>
+        <p:style>
+          <a:lnRef idx="3">
+            <a:schemeClr val="lt1"/>
+          </a:lnRef>
+          <a:fillRef idx="1">
+            <a:schemeClr val="accent4"/>
+          </a:fillRef>
+          <a:effectRef idx="1">
+            <a:schemeClr val="accent4"/>
+          </a:effectRef>
+          <a:fontRef idx="minor">
+            <a:schemeClr val="lt1"/>
+          </a:fontRef>
+        </p:style>
+        <p:txBody>
+          <a:bodyPr wrap="none" rtlCol="0" anchor="ctr"/>
+          <a:lstStyle/>
+          <a:p>
+            <a:pPr algn="ctr"/>
+            <a:r>
+              <a:rPr lang="en-US" sz="1400" dirty="0" smtClean="0"/>
+              <a:t>Key-based Policy</a:t>
+            </a:r>
+          </a:p>
+          <a:p>
+            <a:pPr algn="ctr"/>
+            <a:r>
+              <a:rPr lang="en-US" sz="1400" dirty="0" smtClean="0"/>
+              <a:t>Template Generator</a:t>
+            </a:r>
+            <a:endParaRPr lang="en-US" sz="1400" dirty="0"/>
+          </a:p>
+        </p:txBody>
+      </p:sp>
+      <p:sp>
+        <p:nvSpPr>
+          <p:cNvPr id="79" name="Abgerundetes Rechteck 78"/>
+          <p:cNvSpPr/>
+          <p:nvPr/>
+        </p:nvSpPr>
+        <p:spPr>
+          <a:xfrm>
+            <a:off x="6971832" y="4755144"/>
+            <a:ext cx="1641960" cy="805180"/>
+          </a:xfrm>
+          <a:prstGeom prst="roundRect">
+            <a:avLst/>
+          </a:prstGeom>
+          <a:solidFill>
+            <a:schemeClr val="tx1">
+              <a:lumMod val="75000"/>
+              <a:lumOff val="25000"/>
+            </a:schemeClr>
+          </a:solidFill>
+          <a:ln w="19050"/>
+        </p:spPr>
+        <p:style>
+          <a:lnRef idx="3">
+            <a:schemeClr val="lt1"/>
+          </a:lnRef>
+          <a:fillRef idx="1">
+            <a:schemeClr val="accent4"/>
+          </a:fillRef>
+          <a:effectRef idx="1">
+            <a:schemeClr val="accent4"/>
+          </a:effectRef>
+          <a:fontRef idx="minor">
+            <a:schemeClr val="lt1"/>
+          </a:fontRef>
+        </p:style>
+        <p:txBody>
+          <a:bodyPr wrap="none" rtlCol="0" anchor="ctr"/>
+          <a:lstStyle/>
+          <a:p>
+            <a:pPr algn="ctr"/>
+            <a:r>
+              <a:rPr lang="en-US" sz="1400" dirty="0" smtClean="0"/>
+              <a:t>Key &amp; Access Control </a:t>
+            </a:r>
+          </a:p>
+          <a:p>
+            <a:pPr algn="ctr"/>
+            <a:r>
+              <a:rPr lang="en-US" sz="1400" dirty="0" smtClean="0"/>
+              <a:t>List (ACL)</a:t>
+            </a:r>
+          </a:p>
+          <a:p>
+            <a:pPr algn="ctr"/>
+            <a:r>
+              <a:rPr lang="en-US" sz="1400" dirty="0" smtClean="0"/>
+              <a:t>Management</a:t>
+            </a:r>
+          </a:p>
+        </p:txBody>
+      </p:sp>
+      <p:sp>
+        <p:nvSpPr>
+          <p:cNvPr id="80" name="Abgerundetes Rechteck 79"/>
+          <p:cNvSpPr/>
+          <p:nvPr/>
+        </p:nvSpPr>
+        <p:spPr>
+          <a:xfrm>
+            <a:off x="2791733" y="438427"/>
+            <a:ext cx="2201659" cy="805180"/>
+          </a:xfrm>
+          <a:prstGeom prst="roundRect">
+            <a:avLst>
+              <a:gd name="adj" fmla="val 11729"/>
+            </a:avLst>
+          </a:prstGeom>
+          <a:solidFill>
+            <a:schemeClr val="tx1">
+              <a:lumMod val="75000"/>
+              <a:lumOff val="25000"/>
+            </a:schemeClr>
+          </a:solidFill>
+          <a:ln w="19050"/>
+        </p:spPr>
+        <p:style>
+          <a:lnRef idx="3">
+            <a:schemeClr val="lt1"/>
+          </a:lnRef>
+          <a:fillRef idx="1">
+            <a:schemeClr val="accent4"/>
+          </a:fillRef>
+          <a:effectRef idx="1">
+            <a:schemeClr val="accent4"/>
+          </a:effectRef>
+          <a:fontRef idx="minor">
+            <a:schemeClr val="lt1"/>
+          </a:fontRef>
+        </p:style>
+        <p:txBody>
+          <a:bodyPr rtlCol="0" anchor="ctr"/>
+          <a:lstStyle/>
+          <a:p>
+            <a:pPr algn="ctr"/>
+            <a:r>
+              <a:rPr lang="en-US" sz="1400" dirty="0" smtClean="0"/>
+              <a:t>Compliance Rule Editor</a:t>
+            </a:r>
+            <a:endParaRPr lang="en-US" sz="1400" dirty="0"/>
+          </a:p>
+        </p:txBody>
+      </p:sp>
+      <p:sp>
+        <p:nvSpPr>
+          <p:cNvPr id="81" name="Abgerundetes Rechteck 80"/>
+          <p:cNvSpPr/>
+          <p:nvPr/>
+        </p:nvSpPr>
+        <p:spPr>
+          <a:xfrm>
+            <a:off x="1831037" y="2017611"/>
+            <a:ext cx="1641960" cy="805180"/>
+          </a:xfrm>
+          <a:prstGeom prst="roundRect">
+            <a:avLst/>
+          </a:prstGeom>
+          <a:solidFill>
+            <a:schemeClr val="tx1">
+              <a:lumMod val="75000"/>
+              <a:lumOff val="25000"/>
+            </a:schemeClr>
+          </a:solidFill>
+          <a:ln w="19050"/>
+        </p:spPr>
+        <p:style>
+          <a:lnRef idx="3">
+            <a:schemeClr val="lt1"/>
+          </a:lnRef>
+          <a:fillRef idx="1">
+            <a:schemeClr val="accent4"/>
+          </a:fillRef>
+          <a:effectRef idx="1">
+            <a:schemeClr val="accent4"/>
+          </a:effectRef>
+          <a:fontRef idx="minor">
+            <a:schemeClr val="lt1"/>
+          </a:fontRef>
+        </p:style>
+        <p:txBody>
+          <a:bodyPr wrap="none" rtlCol="0" anchor="ctr"/>
+          <a:lstStyle/>
+          <a:p>
+            <a:pPr algn="ctr"/>
+            <a:r>
+              <a:rPr lang="en-US" sz="1400" dirty="0" err="1" smtClean="0"/>
+              <a:t>XaaS</a:t>
+            </a:r>
+            <a:r>
+              <a:rPr lang="en-US" sz="1400" dirty="0" smtClean="0"/>
+              <a:t> Packager</a:t>
+            </a:r>
+          </a:p>
+        </p:txBody>
+      </p:sp>
+      <p:sp>
+        <p:nvSpPr>
+          <p:cNvPr id="114" name="Freihandform 113"/>
+          <p:cNvSpPr/>
+          <p:nvPr/>
+        </p:nvSpPr>
+        <p:spPr>
+          <a:xfrm>
+            <a:off x="117438" y="2017611"/>
+            <a:ext cx="10224546" cy="2606967"/>
           </a:xfrm>
           <a:custGeom>
             <a:avLst/>
-            <a:gdLst/>
+            <a:gdLst>
+              <a:gd name="connsiteX0" fmla="*/ 8721069 w 10224546"/>
+              <a:gd name="connsiteY0" fmla="*/ 0 h 2606967"/>
+              <a:gd name="connsiteX1" fmla="*/ 10086063 w 10224546"/>
+              <a:gd name="connsiteY1" fmla="*/ 0 h 2606967"/>
+              <a:gd name="connsiteX2" fmla="*/ 10224546 w 10224546"/>
+              <a:gd name="connsiteY2" fmla="*/ 138483 h 2606967"/>
+              <a:gd name="connsiteX3" fmla="*/ 10224546 w 10224546"/>
+              <a:gd name="connsiteY3" fmla="*/ 2036523 h 2606967"/>
+              <a:gd name="connsiteX4" fmla="*/ 10224546 w 10224546"/>
+              <a:gd name="connsiteY4" fmla="*/ 2468484 h 2606967"/>
+              <a:gd name="connsiteX5" fmla="*/ 10224546 w 10224546"/>
+              <a:gd name="connsiteY5" fmla="*/ 2492875 h 2606967"/>
+              <a:gd name="connsiteX6" fmla="*/ 10110454 w 10224546"/>
+              <a:gd name="connsiteY6" fmla="*/ 2606967 h 2606967"/>
+              <a:gd name="connsiteX7" fmla="*/ 10086063 w 10224546"/>
+              <a:gd name="connsiteY7" fmla="*/ 2606967 h 2606967"/>
+              <a:gd name="connsiteX8" fmla="*/ 8721069 w 10224546"/>
+              <a:gd name="connsiteY8" fmla="*/ 2606967 h 2606967"/>
+              <a:gd name="connsiteX9" fmla="*/ 114092 w 10224546"/>
+              <a:gd name="connsiteY9" fmla="*/ 2606967 h 2606967"/>
+              <a:gd name="connsiteX10" fmla="*/ 0 w 10224546"/>
+              <a:gd name="connsiteY10" fmla="*/ 2492875 h 2606967"/>
+              <a:gd name="connsiteX11" fmla="*/ 0 w 10224546"/>
+              <a:gd name="connsiteY11" fmla="*/ 2036523 h 2606967"/>
+              <a:gd name="connsiteX12" fmla="*/ 114092 w 10224546"/>
+              <a:gd name="connsiteY12" fmla="*/ 1922431 h 2606967"/>
+              <a:gd name="connsiteX13" fmla="*/ 8582586 w 10224546"/>
+              <a:gd name="connsiteY13" fmla="*/ 1922431 h 2606967"/>
+              <a:gd name="connsiteX14" fmla="*/ 8582586 w 10224546"/>
+              <a:gd name="connsiteY14" fmla="*/ 138483 h 2606967"/>
+              <a:gd name="connsiteX15" fmla="*/ 8721069 w 10224546"/>
+              <a:gd name="connsiteY15" fmla="*/ 0 h 2606967"/>
+            </a:gdLst>
             <a:ahLst/>
-            <a:cxnLst/>
+            <a:cxnLst>
+              <a:cxn ang="0">
+                <a:pos x="connsiteX0" y="connsiteY0"/>
+              </a:cxn>
+              <a:cxn ang="0">
+                <a:pos x="connsiteX1" y="connsiteY1"/>
+              </a:cxn>
+              <a:cxn ang="0">
+                <a:pos x="connsiteX2" y="connsiteY2"/>
+              </a:cxn>
+              <a:cxn ang="0">
+                <a:pos x="connsiteX3" y="connsiteY3"/>
+              </a:cxn>
+              <a:cxn ang="0">
+                <a:pos x="connsiteX4" y="connsiteY4"/>
+              </a:cxn>
+              <a:cxn ang="0">
+                <a:pos x="connsiteX5" y="connsiteY5"/>
+              </a:cxn>
+              <a:cxn ang="0">
+                <a:pos x="connsiteX6" y="connsiteY6"/>
+              </a:cxn>
+              <a:cxn ang="0">
+                <a:pos x="connsiteX7" y="connsiteY7"/>
+              </a:cxn>
+              <a:cxn ang="0">
+                <a:pos x="connsiteX8" y="connsiteY8"/>
+              </a:cxn>
+              <a:cxn ang="0">
+                <a:pos x="connsiteX9" y="connsiteY9"/>
+              </a:cxn>
+              <a:cxn ang="0">
+                <a:pos x="connsiteX10" y="connsiteY10"/>
+              </a:cxn>
+              <a:cxn ang="0">
+                <a:pos x="connsiteX11" y="connsiteY11"/>
+              </a:cxn>
+              <a:cxn ang="0">
+                <a:pos x="connsiteX12" y="connsiteY12"/>
+              </a:cxn>
+              <a:cxn ang="0">
+                <a:pos x="connsiteX13" y="connsiteY13"/>
+              </a:cxn>
+              <a:cxn ang="0">
+                <a:pos x="connsiteX14" y="connsiteY14"/>
+              </a:cxn>
+              <a:cxn ang="0">
+                <a:pos x="connsiteX15" y="connsiteY15"/>
+              </a:cxn>
+            </a:cxnLst>
             <a:rect l="l" t="t" r="r" b="b"/>
             <a:pathLst>
-              <a:path w="8742748" h="2638180">
+              <a:path w="10224546" h="2606967">
                 <a:moveTo>
-                  <a:pt x="7269680" y="0"/>
+                  <a:pt x="8721069" y="0"/>
                 </a:moveTo>
                 <a:lnTo>
-                  <a:pt x="8162474" y="0"/>
+                  <a:pt x="10086063" y="0"/>
+                </a:lnTo>
+                <a:cubicBezTo>
+                  <a:pt x="10162545" y="0"/>
+                  <a:pt x="10224546" y="62001"/>
+                  <a:pt x="10224546" y="138483"/>
+                </a:cubicBezTo>
+                <a:lnTo>
+                  <a:pt x="10224546" y="2036523"/>
                 </a:lnTo>
                 <a:lnTo>
-                  <a:pt x="8573856" y="0"/>
+                  <a:pt x="10224546" y="2468484"/>
                 </a:lnTo>
                 <a:lnTo>
-                  <a:pt x="8626691" y="0"/>
+                  <a:pt x="10224546" y="2492875"/>
                 </a:lnTo>
                 <a:cubicBezTo>
-                  <a:pt x="8690788" y="0"/>
-                  <a:pt x="8742748" y="51960"/>
-                  <a:pt x="8742748" y="116057"/>
+                  <a:pt x="10224546" y="2555886"/>
+                  <a:pt x="10173465" y="2606967"/>
+                  <a:pt x="10110454" y="2606967"/>
                 </a:cubicBezTo>
                 <a:lnTo>
-                  <a:pt x="8742748" y="168892"/>
+                  <a:pt x="10086063" y="2606967"/>
                 </a:lnTo>
                 <a:lnTo>
-                  <a:pt x="8742748" y="2135364"/>
+                  <a:pt x="8721069" y="2606967"/>
                 </a:lnTo>
                 <a:lnTo>
-                  <a:pt x="8742748" y="2137977"/>
+                  <a:pt x="114092" y="2606967"/>
+                </a:lnTo>
+                <a:cubicBezTo>
+                  <a:pt x="51081" y="2606967"/>
+                  <a:pt x="0" y="2555886"/>
+                  <a:pt x="0" y="2492875"/>
+                </a:cubicBezTo>
+                <a:lnTo>
+                  <a:pt x="0" y="2036523"/>
+                </a:lnTo>
+                <a:cubicBezTo>
+                  <a:pt x="0" y="1973512"/>
+                  <a:pt x="51081" y="1922431"/>
+                  <a:pt x="114092" y="1922431"/>
+                </a:cubicBezTo>
+                <a:lnTo>
+                  <a:pt x="8582586" y="1922431"/>
                 </a:lnTo>
                 <a:lnTo>
-                  <a:pt x="8742748" y="2213112"/>
-                </a:lnTo>
-                <a:lnTo>
-                  <a:pt x="8742748" y="2538137"/>
+                  <a:pt x="8582586" y="138483"/>
                 </a:lnTo>
                 <a:cubicBezTo>
-                  <a:pt x="8742748" y="2593389"/>
-                  <a:pt x="8697957" y="2638180"/>
-                  <a:pt x="8642705" y="2638180"/>
-                </a:cubicBezTo>
-                <a:lnTo>
-                  <a:pt x="100043" y="2638180"/>
-                </a:lnTo>
-                <a:cubicBezTo>
-                  <a:pt x="44791" y="2638180"/>
-                  <a:pt x="0" y="2593389"/>
-                  <a:pt x="0" y="2538137"/>
-                </a:cubicBezTo>
-                <a:lnTo>
-                  <a:pt x="0" y="2137977"/>
-                </a:lnTo>
-                <a:cubicBezTo>
-                  <a:pt x="0" y="2082725"/>
-                  <a:pt x="44791" y="2037934"/>
-                  <a:pt x="100043" y="2037934"/>
-                </a:cubicBezTo>
-                <a:lnTo>
-                  <a:pt x="7100788" y="2037934"/>
-                </a:lnTo>
-                <a:lnTo>
-                  <a:pt x="7100788" y="168892"/>
-                </a:lnTo>
-                <a:cubicBezTo>
-                  <a:pt x="7100788" y="75616"/>
-                  <a:pt x="7176404" y="0"/>
-                  <a:pt x="7269680" y="0"/>
+                  <a:pt x="8582586" y="62001"/>
+                  <a:pt x="8644587" y="0"/>
+                  <a:pt x="8721069" y="0"/>
                 </a:cubicBezTo>
                 <a:close/>
               </a:path>
@@ -4147,32 +5197,44 @@
           </a:fontRef>
         </p:style>
         <p:txBody>
-          <a:bodyPr rot="0" spcFirstLastPara="0" vertOverflow="overflow" horzOverflow="overflow" vert="horz" wrap="square" lIns="91440" tIns="45720" rIns="91440" bIns="180000" numCol="1" spcCol="0" rtlCol="0" fromWordArt="0" anchor="b" anchorCtr="0" forceAA="0" compatLnSpc="1">
-            <a:prstTxWarp prst="textNoShape">
-              <a:avLst/>
-            </a:prstTxWarp>
+          <a:bodyPr wrap="square" rtlCol="0" anchor="b">
             <a:noAutofit/>
           </a:bodyPr>
           <a:lstStyle/>
           <a:p>
             <a:pPr algn="ctr"/>
             <a:r>
-              <a:rPr lang="de-DE" sz="1400" smtClean="0"/>
-              <a:t>Templates, Types, Plans &amp; CSARs Management</a:t>
-            </a:r>
-            <a:endParaRPr lang="en-US" sz="1400"/>
-          </a:p>
-        </p:txBody>
-      </p:sp>
-      <p:sp>
-        <p:nvSpPr>
-          <p:cNvPr id="51" name="Abgerundetes Rechteck 50"/>
+              <a:rPr lang="de-DE" sz="1400" dirty="0"/>
+              <a:t>Templates, </a:t>
+            </a:r>
+            <a:r>
+              <a:rPr lang="de-DE" sz="1400" dirty="0" err="1"/>
+              <a:t>Types</a:t>
+            </a:r>
+            <a:r>
+              <a:rPr lang="de-DE" sz="1400" dirty="0"/>
+              <a:t>, Plans &amp; CSARs </a:t>
+            </a:r>
+            <a:r>
+              <a:rPr lang="de-DE" sz="1400" dirty="0" smtClean="0"/>
+              <a:t>Management</a:t>
+            </a:r>
+          </a:p>
+          <a:p>
+            <a:pPr algn="ctr"/>
+            <a:endParaRPr lang="en-US" sz="1400" dirty="0"/>
+          </a:p>
+        </p:txBody>
+      </p:sp>
+      <p:sp>
+        <p:nvSpPr>
+          <p:cNvPr id="115" name="Abgerundetes Rechteck 114"/>
           <p:cNvSpPr/>
           <p:nvPr/>
         </p:nvSpPr>
         <p:spPr>
           <a:xfrm>
-            <a:off x="3748384" y="5157192"/>
+            <a:off x="3544636" y="2985519"/>
             <a:ext cx="1641960" cy="805180"/>
           </a:xfrm>
           <a:prstGeom prst="roundRect">
@@ -4201,253 +5263,102 @@
           </a:fontRef>
         </p:style>
         <p:txBody>
-          <a:bodyPr wrap="none" rtlCol="0" anchor="ctr"/>
+          <a:bodyPr rtlCol="0" anchor="ctr"/>
           <a:lstStyle/>
           <a:p>
             <a:pPr algn="ctr"/>
             <a:r>
-              <a:rPr lang="de-DE" sz="1400" smtClean="0"/>
-              <a:t>BPEL Provisioning</a:t>
-            </a:r>
-          </a:p>
-          <a:p>
-            <a:pPr algn="ctr"/>
-            <a:r>
-              <a:rPr lang="de-DE" sz="1400" smtClean="0"/>
-              <a:t>Plan Generator</a:t>
-            </a:r>
-            <a:endParaRPr lang="en-US" sz="1400"/>
-          </a:p>
-        </p:txBody>
-      </p:sp>
-      <p:sp>
-        <p:nvSpPr>
-          <p:cNvPr id="52" name="Abgerundetes Rechteck 51"/>
+              <a:rPr lang="en-US" sz="1400" dirty="0"/>
+              <a:t>Accountability</a:t>
+            </a:r>
+          </a:p>
+        </p:txBody>
+      </p:sp>
+      <p:sp>
+        <p:nvSpPr>
+          <p:cNvPr id="2" name="Abgerundetes Rechteck 1"/>
           <p:cNvSpPr/>
           <p:nvPr/>
         </p:nvSpPr>
         <p:spPr>
           <a:xfrm>
-            <a:off x="5518620" y="5157192"/>
-            <a:ext cx="1641960" cy="805180"/>
+            <a:off x="5258234" y="5696485"/>
+            <a:ext cx="5083750" cy="961442"/>
           </a:xfrm>
           <a:prstGeom prst="roundRect">
-            <a:avLst/>
+            <a:avLst>
+              <a:gd name="adj" fmla="val 10051"/>
+            </a:avLst>
           </a:prstGeom>
-          <a:solidFill>
-            <a:schemeClr val="tx1">
-              <a:lumMod val="75000"/>
-              <a:lumOff val="25000"/>
-            </a:schemeClr>
-          </a:solidFill>
-          <a:ln w="19050"/>
+          <a:noFill/>
+          <a:ln>
+            <a:solidFill>
+              <a:schemeClr val="tx1">
+                <a:lumMod val="75000"/>
+                <a:lumOff val="25000"/>
+              </a:schemeClr>
+            </a:solidFill>
+            <a:prstDash val="sysDot"/>
+          </a:ln>
         </p:spPr>
         <p:style>
-          <a:lnRef idx="3">
-            <a:schemeClr val="lt1"/>
+          <a:lnRef idx="2">
+            <a:schemeClr val="accent1">
+              <a:shade val="50000"/>
+            </a:schemeClr>
           </a:lnRef>
           <a:fillRef idx="1">
-            <a:schemeClr val="accent4"/>
+            <a:schemeClr val="accent1"/>
           </a:fillRef>
-          <a:effectRef idx="1">
-            <a:schemeClr val="accent4"/>
+          <a:effectRef idx="0">
+            <a:schemeClr val="accent1"/>
           </a:effectRef>
           <a:fontRef idx="minor">
             <a:schemeClr val="lt1"/>
           </a:fontRef>
         </p:style>
         <p:txBody>
-          <a:bodyPr wrap="none" rtlCol="0" anchor="ctr"/>
+          <a:bodyPr rtlCol="0" anchor="ctr"/>
           <a:lstStyle/>
           <a:p>
             <a:pPr algn="ctr"/>
-            <a:r>
-              <a:rPr lang="de-DE" sz="1400" smtClean="0"/>
-              <a:t>Implementation</a:t>
-            </a:r>
-          </a:p>
-          <a:p>
-            <a:pPr algn="ctr"/>
-            <a:r>
-              <a:rPr lang="de-DE" sz="1400" smtClean="0"/>
-              <a:t>Artifact Generator</a:t>
-            </a:r>
-            <a:endParaRPr lang="en-US" sz="1400"/>
-          </a:p>
-        </p:txBody>
-      </p:sp>
-      <p:sp>
-        <p:nvSpPr>
-          <p:cNvPr id="53" name="Abgerundetes Rechteck 52"/>
-          <p:cNvSpPr/>
+            <a:endParaRPr lang="de-DE"/>
+          </a:p>
+        </p:txBody>
+      </p:sp>
+      <p:sp>
+        <p:nvSpPr>
+          <p:cNvPr id="3" name="Textfeld 2"/>
+          <p:cNvSpPr txBox="1"/>
           <p:nvPr/>
         </p:nvSpPr>
         <p:spPr>
           <a:xfrm>
-            <a:off x="7298778" y="5157192"/>
-            <a:ext cx="1641960" cy="805180"/>
+            <a:off x="5348363" y="5807874"/>
+            <a:ext cx="3184751" cy="738664"/>
           </a:xfrm>
-          <a:prstGeom prst="roundRect">
+          <a:prstGeom prst="rect">
             <a:avLst/>
           </a:prstGeom>
-          <a:solidFill>
-            <a:schemeClr val="tx1">
-              <a:lumMod val="75000"/>
-              <a:lumOff val="25000"/>
-            </a:schemeClr>
-          </a:solidFill>
-          <a:ln w="19050"/>
+          <a:noFill/>
         </p:spPr>
-        <p:style>
-          <a:lnRef idx="3">
-            <a:schemeClr val="lt1"/>
-          </a:lnRef>
-          <a:fillRef idx="1">
-            <a:schemeClr val="accent4"/>
-          </a:fillRef>
-          <a:effectRef idx="1">
-            <a:schemeClr val="accent4"/>
-          </a:effectRef>
-          <a:fontRef idx="minor">
-            <a:schemeClr val="lt1"/>
-          </a:fontRef>
-        </p:style>
-        <p:txBody>
-          <a:bodyPr wrap="none" rtlCol="0" anchor="ctr"/>
-          <a:lstStyle/>
-          <a:p>
-            <a:pPr algn="ctr"/>
-            <a:r>
-              <a:rPr lang="de-DE" sz="1400" smtClean="0"/>
-              <a:t>CSAR Packager</a:t>
-            </a:r>
-            <a:endParaRPr lang="en-US" sz="1400"/>
-          </a:p>
-        </p:txBody>
-      </p:sp>
-      <p:sp>
-        <p:nvSpPr>
-          <p:cNvPr id="22" name="Abgerundetes Rechteck 21"/>
-          <p:cNvSpPr/>
-          <p:nvPr/>
-        </p:nvSpPr>
-        <p:spPr>
-          <a:xfrm>
-            <a:off x="197989" y="3402191"/>
-            <a:ext cx="1641960" cy="805180"/>
-          </a:xfrm>
-          <a:prstGeom prst="roundRect">
-            <a:avLst/>
-          </a:prstGeom>
-          <a:solidFill>
-            <a:schemeClr val="tx1">
-              <a:lumMod val="75000"/>
-              <a:lumOff val="25000"/>
-            </a:schemeClr>
-          </a:solidFill>
-          <a:ln w="19050"/>
-        </p:spPr>
-        <p:style>
-          <a:lnRef idx="3">
-            <a:schemeClr val="lt1"/>
-          </a:lnRef>
-          <a:fillRef idx="1">
-            <a:schemeClr val="accent4"/>
-          </a:fillRef>
-          <a:effectRef idx="1">
-            <a:schemeClr val="accent4"/>
-          </a:effectRef>
-          <a:fontRef idx="minor">
-            <a:schemeClr val="lt1"/>
-          </a:fontRef>
-        </p:style>
-        <p:txBody>
-          <a:bodyPr rtlCol="0" anchor="ctr"/>
-          <a:lstStyle/>
-          <a:p>
-            <a:pPr algn="ctr"/>
-            <a:r>
-              <a:rPr lang="de-DE" sz="1400" dirty="0" err="1" smtClean="0"/>
-              <a:t>Node</a:t>
-            </a:r>
-            <a:r>
-              <a:rPr lang="de-DE" sz="1400" dirty="0" smtClean="0"/>
-              <a:t> </a:t>
-            </a:r>
-            <a:r>
-              <a:rPr lang="de-DE" sz="1400" dirty="0" err="1" smtClean="0"/>
-              <a:t>Injection</a:t>
-            </a:r>
-            <a:endParaRPr lang="en-US" sz="1400" dirty="0"/>
-          </a:p>
-        </p:txBody>
-      </p:sp>
-      <p:sp>
-        <p:nvSpPr>
-          <p:cNvPr id="23" name="Abgerundetes Rechteck 22"/>
-          <p:cNvSpPr/>
-          <p:nvPr/>
-        </p:nvSpPr>
-        <p:spPr>
-          <a:xfrm>
-            <a:off x="1968225" y="5157192"/>
-            <a:ext cx="1641960" cy="805180"/>
-          </a:xfrm>
-          <a:prstGeom prst="roundRect">
-            <a:avLst/>
-          </a:prstGeom>
-          <a:solidFill>
-            <a:schemeClr val="tx1">
-              <a:lumMod val="75000"/>
-              <a:lumOff val="25000"/>
-            </a:schemeClr>
-          </a:solidFill>
-          <a:ln w="19050"/>
-        </p:spPr>
-        <p:style>
-          <a:lnRef idx="3">
-            <a:schemeClr val="lt1"/>
-          </a:lnRef>
-          <a:fillRef idx="1">
-            <a:schemeClr val="accent4"/>
-          </a:fillRef>
-          <a:effectRef idx="1">
-            <a:schemeClr val="accent4"/>
-          </a:effectRef>
-          <a:fontRef idx="minor">
-            <a:schemeClr val="lt1"/>
-          </a:fontRef>
-        </p:style>
-        <p:txBody>
-          <a:bodyPr wrap="none" rtlCol="0" anchor="ctr"/>
-          <a:lstStyle/>
-          <a:p>
-            <a:pPr algn="ctr"/>
-            <a:r>
-              <a:rPr lang="de-DE" sz="1400" dirty="0" err="1" smtClean="0"/>
-              <a:t>Versioning</a:t>
-            </a:r>
-            <a:r>
-              <a:rPr lang="de-DE" sz="1400" dirty="0" smtClean="0"/>
-              <a:t> &amp;</a:t>
-            </a:r>
-            <a:br>
-              <a:rPr lang="de-DE" sz="1400" dirty="0" smtClean="0"/>
-            </a:br>
-            <a:r>
-              <a:rPr lang="de-DE" sz="1400" dirty="0" err="1" smtClean="0"/>
-              <a:t>Difference</a:t>
-            </a:r>
-            <a:r>
-              <a:rPr lang="de-DE" sz="1400" dirty="0"/>
-              <a:t/>
-            </a:r>
-            <a:br>
-              <a:rPr lang="de-DE" sz="1400" dirty="0"/>
-            </a:br>
-            <a:r>
-              <a:rPr lang="de-DE" sz="1400" dirty="0" err="1" smtClean="0"/>
-              <a:t>Calculation</a:t>
+        <p:txBody>
+          <a:bodyPr wrap="square" rtlCol="0">
+            <a:spAutoFit/>
+          </a:bodyPr>
+          <a:lstStyle/>
+          <a:p>
+            <a:r>
+              <a:rPr lang="en-US" sz="1400" dirty="0" smtClean="0"/>
+              <a:t>Functionality provided by the </a:t>
+            </a:r>
+            <a:r>
+              <a:rPr lang="en-US" sz="1400" dirty="0" err="1" smtClean="0"/>
+              <a:t>OpenTOSCA</a:t>
+            </a:r>
+            <a:r>
+              <a:rPr lang="en-US" sz="1400" dirty="0" smtClean="0"/>
+              <a:t> Container and usable in the Winery if a Container instance is running</a:t>
             </a:r>
             <a:endParaRPr lang="en-US" sz="1400" dirty="0"/>
           </a:p>
@@ -4463,6 +5374,13 @@
   <p:clrMapOvr>
     <a:masterClrMapping/>
   </p:clrMapOvr>
+  <p:timing>
+    <p:tnLst>
+      <p:par>
+        <p:cTn id="1" dur="indefinite" restart="never" nodeType="tmRoot"/>
+      </p:par>
+    </p:tnLst>
+  </p:timing>
 </p:sld>
 </file>
 
@@ -4749,4 +5667,265 @@
   <a:objectDefaults/>
   <a:extraClrSchemeLst/>
 </a:theme>
+</file>
+
+<file path=ppt/theme/theme2.xml><?xml version="1.0" encoding="utf-8"?>
+<a:theme xmlns:a="http://schemas.openxmlformats.org/drawingml/2006/main" name="Office">
+  <a:themeElements>
+    <a:clrScheme name="Office">
+      <a:dk1>
+        <a:sysClr val="windowText" lastClr="000000"/>
+      </a:dk1>
+      <a:lt1>
+        <a:sysClr val="window" lastClr="FFFFFF"/>
+      </a:lt1>
+      <a:dk2>
+        <a:srgbClr val="44546A"/>
+      </a:dk2>
+      <a:lt2>
+        <a:srgbClr val="E7E6E6"/>
+      </a:lt2>
+      <a:accent1>
+        <a:srgbClr val="5B9BD5"/>
+      </a:accent1>
+      <a:accent2>
+        <a:srgbClr val="ED7D31"/>
+      </a:accent2>
+      <a:accent3>
+        <a:srgbClr val="A5A5A5"/>
+      </a:accent3>
+      <a:accent4>
+        <a:srgbClr val="FFC000"/>
+      </a:accent4>
+      <a:accent5>
+        <a:srgbClr val="4472C4"/>
+      </a:accent5>
+      <a:accent6>
+        <a:srgbClr val="70AD47"/>
+      </a:accent6>
+      <a:hlink>
+        <a:srgbClr val="0563C1"/>
+      </a:hlink>
+      <a:folHlink>
+        <a:srgbClr val="954F72"/>
+      </a:folHlink>
+    </a:clrScheme>
+    <a:fontScheme name="Office">
+      <a:majorFont>
+        <a:latin typeface="Calibri Light" panose="020F0302020204030204"/>
+        <a:ea typeface=""/>
+        <a:cs typeface=""/>
+        <a:font script="Jpan" typeface="游ゴシック Light"/>
+        <a:font script="Hang" typeface="맑은 고딕"/>
+        <a:font script="Hans" typeface="等线 Light"/>
+        <a:font script="Hant" typeface="新細明體"/>
+        <a:font script="Arab" typeface="Times New Roman"/>
+        <a:font script="Hebr" typeface="Times New Roman"/>
+        <a:font script="Thai" typeface="Angsana New"/>
+        <a:font script="Ethi" typeface="Nyala"/>
+        <a:font script="Beng" typeface="Vrinda"/>
+        <a:font script="Gujr" typeface="Shruti"/>
+        <a:font script="Khmr" typeface="MoolBoran"/>
+        <a:font script="Knda" typeface="Tunga"/>
+        <a:font script="Guru" typeface="Raavi"/>
+        <a:font script="Cans" typeface="Euphemia"/>
+        <a:font script="Cher" typeface="Plantagenet Cherokee"/>
+        <a:font script="Yiii" typeface="Microsoft Yi Baiti"/>
+        <a:font script="Tibt" typeface="Microsoft Himalaya"/>
+        <a:font script="Thaa" typeface="MV Boli"/>
+        <a:font script="Deva" typeface="Mangal"/>
+        <a:font script="Telu" typeface="Gautami"/>
+        <a:font script="Taml" typeface="Latha"/>
+        <a:font script="Syrc" typeface="Estrangelo Edessa"/>
+        <a:font script="Orya" typeface="Kalinga"/>
+        <a:font script="Mlym" typeface="Kartika"/>
+        <a:font script="Laoo" typeface="DokChampa"/>
+        <a:font script="Sinh" typeface="Iskoola Pota"/>
+        <a:font script="Mong" typeface="Mongolian Baiti"/>
+        <a:font script="Viet" typeface="Times New Roman"/>
+        <a:font script="Uigh" typeface="Microsoft Uighur"/>
+        <a:font script="Geor" typeface="Sylfaen"/>
+      </a:majorFont>
+      <a:minorFont>
+        <a:latin typeface="Calibri" panose="020F0502020204030204"/>
+        <a:ea typeface=""/>
+        <a:cs typeface=""/>
+        <a:font script="Jpan" typeface="游ゴシック"/>
+        <a:font script="Hang" typeface="맑은 고딕"/>
+        <a:font script="Hans" typeface="等线"/>
+        <a:font script="Hant" typeface="新細明體"/>
+        <a:font script="Arab" typeface="Arial"/>
+        <a:font script="Hebr" typeface="Arial"/>
+        <a:font script="Thai" typeface="Cordia New"/>
+        <a:font script="Ethi" typeface="Nyala"/>
+        <a:font script="Beng" typeface="Vrinda"/>
+        <a:font script="Gujr" typeface="Shruti"/>
+        <a:font script="Khmr" typeface="DaunPenh"/>
+        <a:font script="Knda" typeface="Tunga"/>
+        <a:font script="Guru" typeface="Raavi"/>
+        <a:font script="Cans" typeface="Euphemia"/>
+        <a:font script="Cher" typeface="Plantagenet Cherokee"/>
+        <a:font script="Yiii" typeface="Microsoft Yi Baiti"/>
+        <a:font script="Tibt" typeface="Microsoft Himalaya"/>
+        <a:font script="Thaa" typeface="MV Boli"/>
+        <a:font script="Deva" typeface="Mangal"/>
+        <a:font script="Telu" typeface="Gautami"/>
+        <a:font script="Taml" typeface="Latha"/>
+        <a:font script="Syrc" typeface="Estrangelo Edessa"/>
+        <a:font script="Orya" typeface="Kalinga"/>
+        <a:font script="Mlym" typeface="Kartika"/>
+        <a:font script="Laoo" typeface="DokChampa"/>
+        <a:font script="Sinh" typeface="Iskoola Pota"/>
+        <a:font script="Mong" typeface="Mongolian Baiti"/>
+        <a:font script="Viet" typeface="Arial"/>
+        <a:font script="Uigh" typeface="Microsoft Uighur"/>
+        <a:font script="Geor" typeface="Sylfaen"/>
+      </a:minorFont>
+    </a:fontScheme>
+    <a:fmtScheme name="Office">
+      <a:fillStyleLst>
+        <a:solidFill>
+          <a:schemeClr val="phClr"/>
+        </a:solidFill>
+        <a:gradFill rotWithShape="1">
+          <a:gsLst>
+            <a:gs pos="0">
+              <a:schemeClr val="phClr">
+                <a:lumMod val="110000"/>
+                <a:satMod val="105000"/>
+                <a:tint val="67000"/>
+              </a:schemeClr>
+            </a:gs>
+            <a:gs pos="50000">
+              <a:schemeClr val="phClr">
+                <a:lumMod val="105000"/>
+                <a:satMod val="103000"/>
+                <a:tint val="73000"/>
+              </a:schemeClr>
+            </a:gs>
+            <a:gs pos="100000">
+              <a:schemeClr val="phClr">
+                <a:lumMod val="105000"/>
+                <a:satMod val="109000"/>
+                <a:tint val="81000"/>
+              </a:schemeClr>
+            </a:gs>
+          </a:gsLst>
+          <a:lin ang="5400000" scaled="0"/>
+        </a:gradFill>
+        <a:gradFill rotWithShape="1">
+          <a:gsLst>
+            <a:gs pos="0">
+              <a:schemeClr val="phClr">
+                <a:satMod val="103000"/>
+                <a:lumMod val="102000"/>
+                <a:tint val="94000"/>
+              </a:schemeClr>
+            </a:gs>
+            <a:gs pos="50000">
+              <a:schemeClr val="phClr">
+                <a:satMod val="110000"/>
+                <a:lumMod val="100000"/>
+                <a:shade val="100000"/>
+              </a:schemeClr>
+            </a:gs>
+            <a:gs pos="100000">
+              <a:schemeClr val="phClr">
+                <a:lumMod val="99000"/>
+                <a:satMod val="120000"/>
+                <a:shade val="78000"/>
+              </a:schemeClr>
+            </a:gs>
+          </a:gsLst>
+          <a:lin ang="5400000" scaled="0"/>
+        </a:gradFill>
+      </a:fillStyleLst>
+      <a:lnStyleLst>
+        <a:ln w="6350" cap="flat" cmpd="sng" algn="ctr">
+          <a:solidFill>
+            <a:schemeClr val="phClr"/>
+          </a:solidFill>
+          <a:prstDash val="solid"/>
+          <a:miter lim="800000"/>
+        </a:ln>
+        <a:ln w="12700" cap="flat" cmpd="sng" algn="ctr">
+          <a:solidFill>
+            <a:schemeClr val="phClr"/>
+          </a:solidFill>
+          <a:prstDash val="solid"/>
+          <a:miter lim="800000"/>
+        </a:ln>
+        <a:ln w="19050" cap="flat" cmpd="sng" algn="ctr">
+          <a:solidFill>
+            <a:schemeClr val="phClr"/>
+          </a:solidFill>
+          <a:prstDash val="solid"/>
+          <a:miter lim="800000"/>
+        </a:ln>
+      </a:lnStyleLst>
+      <a:effectStyleLst>
+        <a:effectStyle>
+          <a:effectLst/>
+        </a:effectStyle>
+        <a:effectStyle>
+          <a:effectLst/>
+        </a:effectStyle>
+        <a:effectStyle>
+          <a:effectLst>
+            <a:outerShdw blurRad="57150" dist="19050" dir="5400000" algn="ctr" rotWithShape="0">
+              <a:srgbClr val="000000">
+                <a:alpha val="63000"/>
+              </a:srgbClr>
+            </a:outerShdw>
+          </a:effectLst>
+        </a:effectStyle>
+      </a:effectStyleLst>
+      <a:bgFillStyleLst>
+        <a:solidFill>
+          <a:schemeClr val="phClr"/>
+        </a:solidFill>
+        <a:solidFill>
+          <a:schemeClr val="phClr">
+            <a:tint val="95000"/>
+            <a:satMod val="170000"/>
+          </a:schemeClr>
+        </a:solidFill>
+        <a:gradFill rotWithShape="1">
+          <a:gsLst>
+            <a:gs pos="0">
+              <a:schemeClr val="phClr">
+                <a:tint val="93000"/>
+                <a:satMod val="150000"/>
+                <a:shade val="98000"/>
+                <a:lumMod val="102000"/>
+              </a:schemeClr>
+            </a:gs>
+            <a:gs pos="50000">
+              <a:schemeClr val="phClr">
+                <a:tint val="98000"/>
+                <a:satMod val="130000"/>
+                <a:shade val="90000"/>
+                <a:lumMod val="103000"/>
+              </a:schemeClr>
+            </a:gs>
+            <a:gs pos="100000">
+              <a:schemeClr val="phClr">
+                <a:shade val="63000"/>
+                <a:satMod val="120000"/>
+              </a:schemeClr>
+            </a:gs>
+          </a:gsLst>
+          <a:lin ang="5400000" scaled="0"/>
+        </a:gradFill>
+      </a:bgFillStyleLst>
+    </a:fmtScheme>
+  </a:themeElements>
+  <a:objectDefaults/>
+  <a:extraClrSchemeLst/>
+  <a:extLst>
+    <a:ext uri="{05A4C25C-085E-4340-85A3-A5531E510DB2}">
+      <thm15:themeFamily xmlns:thm15="http://schemas.microsoft.com/office/thememl/2012/main" name="Office Theme" id="{62F939B6-93AF-4DB8-9C6B-D6C7DFDC589F}" vid="{4A3C46E8-61CC-4603-A589-7422A47A8E4A}"/>
+    </a:ext>
+  </a:extLst>
+</a:theme>
 </file>
</xml_diff>